<commit_message>
atualização dos slides para 2019
</commit_message>
<xml_diff>
--- a/building-games-for-Android.pptx
+++ b/building-games-for-Android.pptx
@@ -5,45 +5,46 @@
     <p:sldMasterId id="2147483648" r:id="rId1"/>
   </p:sldMasterIdLst>
   <p:notesMasterIdLst>
-    <p:notesMasterId r:id="rId38"/>
+    <p:notesMasterId r:id="rId39"/>
   </p:notesMasterIdLst>
   <p:sldIdLst>
     <p:sldId id="256" r:id="rId2"/>
     <p:sldId id="298" r:id="rId3"/>
     <p:sldId id="299" r:id="rId4"/>
     <p:sldId id="320" r:id="rId5"/>
-    <p:sldId id="321" r:id="rId6"/>
-    <p:sldId id="322" r:id="rId7"/>
-    <p:sldId id="323" r:id="rId8"/>
-    <p:sldId id="324" r:id="rId9"/>
-    <p:sldId id="325" r:id="rId10"/>
-    <p:sldId id="326" r:id="rId11"/>
-    <p:sldId id="327" r:id="rId12"/>
-    <p:sldId id="331" r:id="rId13"/>
-    <p:sldId id="332" r:id="rId14"/>
-    <p:sldId id="333" r:id="rId15"/>
-    <p:sldId id="351" r:id="rId16"/>
-    <p:sldId id="328" r:id="rId17"/>
-    <p:sldId id="334" r:id="rId18"/>
-    <p:sldId id="330" r:id="rId19"/>
-    <p:sldId id="329" r:id="rId20"/>
-    <p:sldId id="335" r:id="rId21"/>
-    <p:sldId id="337" r:id="rId22"/>
-    <p:sldId id="336" r:id="rId23"/>
-    <p:sldId id="338" r:id="rId24"/>
-    <p:sldId id="339" r:id="rId25"/>
-    <p:sldId id="340" r:id="rId26"/>
-    <p:sldId id="341" r:id="rId27"/>
-    <p:sldId id="350" r:id="rId28"/>
-    <p:sldId id="342" r:id="rId29"/>
+    <p:sldId id="353" r:id="rId6"/>
+    <p:sldId id="355" r:id="rId7"/>
+    <p:sldId id="354" r:id="rId8"/>
+    <p:sldId id="321" r:id="rId9"/>
+    <p:sldId id="324" r:id="rId10"/>
+    <p:sldId id="325" r:id="rId11"/>
+    <p:sldId id="326" r:id="rId12"/>
+    <p:sldId id="327" r:id="rId13"/>
+    <p:sldId id="331" r:id="rId14"/>
+    <p:sldId id="332" r:id="rId15"/>
+    <p:sldId id="333" r:id="rId16"/>
+    <p:sldId id="351" r:id="rId17"/>
+    <p:sldId id="328" r:id="rId18"/>
+    <p:sldId id="334" r:id="rId19"/>
+    <p:sldId id="330" r:id="rId20"/>
+    <p:sldId id="329" r:id="rId21"/>
+    <p:sldId id="335" r:id="rId22"/>
+    <p:sldId id="337" r:id="rId23"/>
+    <p:sldId id="336" r:id="rId24"/>
+    <p:sldId id="338" r:id="rId25"/>
+    <p:sldId id="339" r:id="rId26"/>
+    <p:sldId id="340" r:id="rId27"/>
+    <p:sldId id="341" r:id="rId28"/>
+    <p:sldId id="350" r:id="rId29"/>
     <p:sldId id="349" r:id="rId30"/>
     <p:sldId id="346" r:id="rId31"/>
-    <p:sldId id="345" r:id="rId32"/>
-    <p:sldId id="319" r:id="rId33"/>
-    <p:sldId id="347" r:id="rId34"/>
-    <p:sldId id="344" r:id="rId35"/>
-    <p:sldId id="348" r:id="rId36"/>
-    <p:sldId id="352" r:id="rId37"/>
+    <p:sldId id="356" r:id="rId32"/>
+    <p:sldId id="345" r:id="rId33"/>
+    <p:sldId id="319" r:id="rId34"/>
+    <p:sldId id="347" r:id="rId35"/>
+    <p:sldId id="344" r:id="rId36"/>
+    <p:sldId id="348" r:id="rId37"/>
+    <p:sldId id="352" r:id="rId38"/>
   </p:sldIdLst>
   <p:sldSz cx="12192000" cy="6858000"/>
   <p:notesSz cx="6858000" cy="9144000"/>
@@ -232,7 +233,7 @@
           <a:p>
             <a:fld id="{94D3EB41-CF60-4C9F-BD83-AE56FA0945EB}" type="datetimeFigureOut">
               <a:rPr lang="pt-BR" smtClean="0"/>
-              <a:t>11/07/2019</a:t>
+              <a:t>22/07/2019</a:t>
             </a:fld>
             <a:endParaRPr lang="pt-BR"/>
           </a:p>
@@ -742,7 +743,7 @@
           <a:p>
             <a:fld id="{9642BF85-54FF-46CE-B398-87F998CFD60B}" type="datetimeFigureOut">
               <a:rPr lang="pt-BR" smtClean="0"/>
-              <a:t>11/07/2019</a:t>
+              <a:t>22/07/2019</a:t>
             </a:fld>
             <a:endParaRPr lang="pt-BR"/>
           </a:p>
@@ -910,7 +911,7 @@
           <a:p>
             <a:fld id="{9642BF85-54FF-46CE-B398-87F998CFD60B}" type="datetimeFigureOut">
               <a:rPr lang="pt-BR" smtClean="0"/>
-              <a:t>11/07/2019</a:t>
+              <a:t>22/07/2019</a:t>
             </a:fld>
             <a:endParaRPr lang="pt-BR"/>
           </a:p>
@@ -1088,7 +1089,7 @@
           <a:p>
             <a:fld id="{9642BF85-54FF-46CE-B398-87F998CFD60B}" type="datetimeFigureOut">
               <a:rPr lang="pt-BR" smtClean="0"/>
-              <a:t>11/07/2019</a:t>
+              <a:t>22/07/2019</a:t>
             </a:fld>
             <a:endParaRPr lang="pt-BR"/>
           </a:p>
@@ -1425,7 +1426,7 @@
           <a:p>
             <a:fld id="{9642BF85-54FF-46CE-B398-87F998CFD60B}" type="datetimeFigureOut">
               <a:rPr lang="pt-BR" smtClean="0"/>
-              <a:t>11/07/2019</a:t>
+              <a:t>22/07/2019</a:t>
             </a:fld>
             <a:endParaRPr lang="pt-BR"/>
           </a:p>
@@ -1696,7 +1697,7 @@
           <a:p>
             <a:fld id="{9642BF85-54FF-46CE-B398-87F998CFD60B}" type="datetimeFigureOut">
               <a:rPr lang="pt-BR" smtClean="0"/>
-              <a:t>11/07/2019</a:t>
+              <a:t>22/07/2019</a:t>
             </a:fld>
             <a:endParaRPr lang="pt-BR"/>
           </a:p>
@@ -1942,7 +1943,7 @@
           <a:p>
             <a:fld id="{9642BF85-54FF-46CE-B398-87F998CFD60B}" type="datetimeFigureOut">
               <a:rPr lang="pt-BR" smtClean="0"/>
-              <a:t>11/07/2019</a:t>
+              <a:t>22/07/2019</a:t>
             </a:fld>
             <a:endParaRPr lang="pt-BR"/>
           </a:p>
@@ -2306,7 +2307,7 @@
           <a:p>
             <a:fld id="{9642BF85-54FF-46CE-B398-87F998CFD60B}" type="datetimeFigureOut">
               <a:rPr lang="pt-BR" smtClean="0"/>
-              <a:t>11/07/2019</a:t>
+              <a:t>22/07/2019</a:t>
             </a:fld>
             <a:endParaRPr lang="pt-BR"/>
           </a:p>
@@ -2440,7 +2441,7 @@
           <a:p>
             <a:fld id="{9642BF85-54FF-46CE-B398-87F998CFD60B}" type="datetimeFigureOut">
               <a:rPr lang="pt-BR" smtClean="0"/>
-              <a:t>11/07/2019</a:t>
+              <a:t>22/07/2019</a:t>
             </a:fld>
             <a:endParaRPr lang="pt-BR"/>
           </a:p>
@@ -2535,7 +2536,7 @@
           <a:p>
             <a:fld id="{9642BF85-54FF-46CE-B398-87F998CFD60B}" type="datetimeFigureOut">
               <a:rPr lang="pt-BR" smtClean="0"/>
-              <a:t>11/07/2019</a:t>
+              <a:t>22/07/2019</a:t>
             </a:fld>
             <a:endParaRPr lang="pt-BR"/>
           </a:p>
@@ -2810,7 +2811,7 @@
           <a:p>
             <a:fld id="{9642BF85-54FF-46CE-B398-87F998CFD60B}" type="datetimeFigureOut">
               <a:rPr lang="pt-BR" smtClean="0"/>
-              <a:t>11/07/2019</a:t>
+              <a:t>22/07/2019</a:t>
             </a:fld>
             <a:endParaRPr lang="pt-BR"/>
           </a:p>
@@ -3062,7 +3063,7 @@
           <a:p>
             <a:fld id="{9642BF85-54FF-46CE-B398-87F998CFD60B}" type="datetimeFigureOut">
               <a:rPr lang="pt-BR" smtClean="0"/>
-              <a:t>11/07/2019</a:t>
+              <a:t>22/07/2019</a:t>
             </a:fld>
             <a:endParaRPr lang="pt-BR"/>
           </a:p>
@@ -3282,7 +3283,7 @@
           <a:p>
             <a:fld id="{9642BF85-54FF-46CE-B398-87F998CFD60B}" type="datetimeFigureOut">
               <a:rPr lang="pt-BR" smtClean="0"/>
-              <a:t>11/07/2019</a:t>
+              <a:t>22/07/2019</a:t>
             </a:fld>
             <a:endParaRPr lang="pt-BR"/>
           </a:p>
@@ -3842,12 +3843,8 @@
               <a:t>Instalar o </a:t>
             </a:r>
             <a:r>
-              <a:rPr lang="pt-BR" dirty="0" smtClean="0"/>
-              <a:t>SDK do </a:t>
-            </a:r>
-            <a:r>
-              <a:rPr lang="pt-BR" dirty="0" err="1" smtClean="0"/>
-              <a:t>Android</a:t>
+              <a:rPr lang="pt-BR" dirty="0" err="1"/>
+              <a:t>sdkmanager</a:t>
             </a:r>
             <a:endParaRPr lang="pt-BR" dirty="0"/>
           </a:p>
@@ -3872,69 +3869,29 @@
           <a:p>
             <a:r>
               <a:rPr lang="pt-BR" dirty="0" smtClean="0"/>
-              <a:t>Será necessário usar o aplicativo </a:t>
-            </a:r>
-            <a:r>
-              <a:rPr lang="pt-BR" b="1" i="1" dirty="0" err="1" smtClean="0"/>
-              <a:t>sdkmanager</a:t>
-            </a:r>
-            <a:r>
-              <a:rPr lang="pt-BR" dirty="0" smtClean="0"/>
-              <a:t>, por meio do </a:t>
+              <a:t>Descompacte o arquivo e salve o diretório em seu local de preferência. Exemplo: se você salvar o diretório com o nome “</a:t>
             </a:r>
             <a:r>
               <a:rPr lang="pt-BR" dirty="0" err="1" smtClean="0"/>
-              <a:t>Prompt</a:t>
-            </a:r>
-            <a:r>
-              <a:rPr lang="pt-BR" dirty="0" smtClean="0"/>
-              <a:t> de Comandos, para instalar os pacotes necessários para criar os dispositivos virtuais e emulá-los. Os comandos básico do </a:t>
-            </a:r>
-            <a:r>
-              <a:rPr lang="pt-BR" dirty="0" err="1" smtClean="0"/>
-              <a:t>sdkmanager</a:t>
-            </a:r>
-            <a:r>
-              <a:rPr lang="pt-BR" dirty="0" smtClean="0"/>
-              <a:t> podem ser encontrados no link abaixo:</a:t>
-            </a:r>
-          </a:p>
-          <a:p>
-            <a:r>
-              <a:rPr lang="pt-BR" b="1" i="1" dirty="0"/>
-              <a:t>https://developer.android.com/studio</a:t>
-            </a:r>
+              <a:t>android-sdk</a:t>
+            </a:r>
+            <a:r>
+              <a:rPr lang="pt-BR" dirty="0" smtClean="0"/>
+              <a:t>” no drive C, a estrutura ficará desta maneira:</a:t>
+            </a:r>
+          </a:p>
+          <a:p>
             <a:r>
               <a:rPr lang="pt-BR" b="1" i="1" dirty="0" smtClean="0"/>
-              <a:t>/</a:t>
-            </a:r>
-            <a:br>
-              <a:rPr lang="pt-BR" b="1" i="1" dirty="0" smtClean="0"/>
-            </a:br>
-            <a:r>
-              <a:rPr lang="pt-BR" b="1" i="1" dirty="0" err="1" smtClean="0"/>
-              <a:t>command-line</a:t>
-            </a:r>
-            <a:r>
-              <a:rPr lang="pt-BR" b="1" i="1" dirty="0" smtClean="0"/>
-              <a:t>/</a:t>
-            </a:r>
-            <a:r>
-              <a:rPr lang="pt-BR" b="1" i="1" dirty="0" err="1" smtClean="0"/>
-              <a:t>sdkmanager</a:t>
-            </a:r>
-            <a:r>
-              <a:rPr lang="pt-BR" dirty="0" smtClean="0"/>
-              <a:t> </a:t>
-            </a:r>
-            <a:endParaRPr lang="pt-BR" b="1" i="1" dirty="0" smtClean="0"/>
+              <a:t>C:\android-sdk\tools</a:t>
+            </a:r>
           </a:p>
         </p:txBody>
       </p:sp>
     </p:spTree>
     <p:extLst>
       <p:ext uri="{BB962C8B-B14F-4D97-AF65-F5344CB8AC3E}">
-        <p14:creationId xmlns:p14="http://schemas.microsoft.com/office/powerpoint/2010/main" val="1396620500"/>
+        <p14:creationId xmlns:p14="http://schemas.microsoft.com/office/powerpoint/2010/main" val="2856552240"/>
       </p:ext>
     </p:extLst>
   </p:cSld>
@@ -3987,19 +3944,19 @@
           <a:p>
             <a:r>
               <a:rPr lang="pt-BR" dirty="0" smtClean="0"/>
-              <a:t>2. </a:t>
-            </a:r>
-            <a:r>
-              <a:rPr lang="pt-BR" dirty="0"/>
-              <a:t>Instalar o </a:t>
-            </a:r>
-            <a:r>
-              <a:rPr lang="pt-BR" dirty="0" smtClean="0"/>
-              <a:t>SDK do </a:t>
-            </a:r>
-            <a:r>
-              <a:rPr lang="pt-BR" dirty="0" err="1" smtClean="0"/>
-              <a:t>Android</a:t>
+              <a:t>2.1. </a:t>
+            </a:r>
+            <a:r>
+              <a:rPr lang="pt-BR" dirty="0"/>
+              <a:t>Instalar </a:t>
+            </a:r>
+            <a:r>
+              <a:rPr lang="pt-BR" dirty="0"/>
+              <a:t>os </a:t>
+            </a:r>
+            <a:r>
+              <a:rPr lang="pt-BR" dirty="0" smtClean="0"/>
+              <a:t>pacotes</a:t>
             </a:r>
             <a:endParaRPr lang="pt-BR" dirty="0"/>
           </a:p>
@@ -4024,29 +3981,68 @@
           <a:p>
             <a:r>
               <a:rPr lang="pt-BR" dirty="0" smtClean="0"/>
-              <a:t>Para realizar o download e instalação da maioria dos pacotes necessários, digite o seguinte comando no </a:t>
+              <a:t>Será necessário usar o aplicativo </a:t>
+            </a:r>
+            <a:r>
+              <a:rPr lang="pt-BR" b="1" i="1" dirty="0" err="1" smtClean="0"/>
+              <a:t>sdkmanager</a:t>
+            </a:r>
+            <a:r>
+              <a:rPr lang="pt-BR" dirty="0" smtClean="0"/>
+              <a:t>, por meio do </a:t>
+            </a:r>
+            <a:r>
+              <a:rPr lang="pt-BR" dirty="0" smtClean="0"/>
+              <a:t>Windows </a:t>
             </a:r>
             <a:r>
               <a:rPr lang="pt-BR" dirty="0" err="1" smtClean="0"/>
-              <a:t>Prompt</a:t>
-            </a:r>
-            <a:r>
-              <a:rPr lang="pt-BR" dirty="0" smtClean="0"/>
-              <a:t> de Comandos:</a:t>
-            </a:r>
-          </a:p>
-          <a:p>
-            <a:r>
-              <a:rPr lang="pt-BR" dirty="0" smtClean="0"/>
-              <a:t>C:\android-sdk\tools\bin&gt;</a:t>
+              <a:t>PowerShell</a:t>
+            </a:r>
+            <a:r>
+              <a:rPr lang="pt-BR" dirty="0" smtClean="0"/>
+              <a:t>, </a:t>
+            </a:r>
+            <a:r>
+              <a:rPr lang="pt-BR" dirty="0" smtClean="0"/>
+              <a:t>para instalar os pacotes necessários para criar os dispositivos virtuais e emulá-los. Os comandos básico do </a:t>
+            </a:r>
+            <a:r>
+              <a:rPr lang="pt-BR" dirty="0" err="1" smtClean="0"/>
+              <a:t>sdkmanager</a:t>
+            </a:r>
+            <a:r>
+              <a:rPr lang="pt-BR" dirty="0" smtClean="0"/>
+              <a:t> podem ser encontrados no link abaixo:</a:t>
+            </a:r>
+          </a:p>
+          <a:p>
+            <a:r>
+              <a:rPr lang="pt-BR" b="1" i="1" dirty="0"/>
+              <a:t>https://developer.android.com/studio</a:t>
             </a:r>
             <a:r>
               <a:rPr lang="pt-BR" b="1" i="1" dirty="0" smtClean="0"/>
-              <a:t>sdkmanager --</a:t>
-            </a:r>
+              <a:t>/</a:t>
+            </a:r>
+            <a:br>
+              <a:rPr lang="pt-BR" b="1" i="1" dirty="0" smtClean="0"/>
+            </a:br>
             <a:r>
               <a:rPr lang="pt-BR" b="1" i="1" dirty="0" err="1" smtClean="0"/>
-              <a:t>update</a:t>
+              <a:t>command-line</a:t>
+            </a:r>
+            <a:r>
+              <a:rPr lang="pt-BR" b="1" i="1" dirty="0" smtClean="0"/>
+              <a:t>/</a:t>
+            </a:r>
+            <a:r>
+              <a:rPr lang="pt-BR" b="1" i="1" dirty="0" err="1" smtClean="0"/>
+              <a:t>sdkmanager</a:t>
+            </a:r>
+            <a:r>
+              <a:rPr lang="pt-BR" dirty="0" smtClean="0"/>
+              <a:t> </a:t>
             </a:r>
             <a:endParaRPr lang="pt-BR" b="1" i="1" dirty="0" smtClean="0"/>
           </a:p>
@@ -4055,7 +4051,7 @@
     </p:spTree>
     <p:extLst>
       <p:ext uri="{BB962C8B-B14F-4D97-AF65-F5344CB8AC3E}">
-        <p14:creationId xmlns:p14="http://schemas.microsoft.com/office/powerpoint/2010/main" val="1626986151"/>
+        <p14:creationId xmlns:p14="http://schemas.microsoft.com/office/powerpoint/2010/main" val="1396620500"/>
       </p:ext>
     </p:extLst>
   </p:cSld>
@@ -4108,19 +4104,15 @@
           <a:p>
             <a:r>
               <a:rPr lang="pt-BR" dirty="0" smtClean="0"/>
-              <a:t>2. </a:t>
-            </a:r>
-            <a:r>
-              <a:rPr lang="pt-BR" dirty="0"/>
-              <a:t>Instalar o </a:t>
-            </a:r>
-            <a:r>
-              <a:rPr lang="pt-BR" dirty="0" smtClean="0"/>
-              <a:t>SDK do </a:t>
-            </a:r>
-            <a:r>
-              <a:rPr lang="pt-BR" dirty="0" err="1" smtClean="0"/>
-              <a:t>Android</a:t>
+              <a:t>2.1. </a:t>
+            </a:r>
+            <a:r>
+              <a:rPr lang="pt-BR" dirty="0"/>
+              <a:t>Instalar </a:t>
+            </a:r>
+            <a:r>
+              <a:rPr lang="pt-BR" dirty="0" smtClean="0"/>
+              <a:t>os pacotes</a:t>
             </a:r>
             <a:endParaRPr lang="pt-BR" dirty="0"/>
           </a:p>
@@ -4145,8 +4137,21 @@
           <a:p>
             <a:r>
               <a:rPr lang="pt-BR" dirty="0" smtClean="0"/>
-              <a:t>Executando o comando abaixo:</a:t>
-            </a:r>
+              <a:t>Para realizar o download e instalação da maioria dos pacotes necessários, digite o seguinte comando no </a:t>
+            </a:r>
+            <a:r>
+              <a:rPr lang="pt-BR" dirty="0" smtClean="0"/>
+              <a:t>Windows </a:t>
+            </a:r>
+            <a:r>
+              <a:rPr lang="pt-BR" dirty="0" err="1" smtClean="0"/>
+              <a:t>PowerShell</a:t>
+            </a:r>
+            <a:r>
+              <a:rPr lang="pt-BR" dirty="0" smtClean="0"/>
+              <a:t>:</a:t>
+            </a:r>
+            <a:endParaRPr lang="pt-BR" dirty="0" smtClean="0"/>
           </a:p>
           <a:p>
             <a:r>
@@ -4159,62 +4164,16 @@
             </a:r>
             <a:r>
               <a:rPr lang="pt-BR" b="1" i="1" dirty="0" err="1" smtClean="0"/>
-              <a:t>list</a:t>
-            </a:r>
-            <a:r>
-              <a:rPr lang="pt-BR" b="1" i="1" dirty="0" smtClean="0"/>
-              <a:t> -- </a:t>
-            </a:r>
-            <a:r>
-              <a:rPr lang="pt-BR" b="1" i="1" dirty="0" err="1" smtClean="0"/>
-              <a:t>verbose</a:t>
+              <a:t>update</a:t>
             </a:r>
             <a:endParaRPr lang="pt-BR" b="1" i="1" dirty="0" smtClean="0"/>
-          </a:p>
-          <a:p>
-            <a:r>
-              <a:rPr lang="pt-BR" dirty="0" smtClean="0"/>
-              <a:t>é possível visualizar os pacotes instalados e os pacotes disponíveis, incluindo as imagens para a criação de dispositivos virtuais. Os pacotes </a:t>
-            </a:r>
-            <a:r>
-              <a:rPr lang="pt-BR" b="1" i="1" dirty="0" smtClean="0"/>
-              <a:t>Build Tools</a:t>
-            </a:r>
-            <a:r>
-              <a:rPr lang="pt-BR" dirty="0" smtClean="0"/>
-              <a:t>, </a:t>
-            </a:r>
-            <a:r>
-              <a:rPr lang="pt-BR" b="1" i="1" dirty="0" err="1" smtClean="0"/>
-              <a:t>Platfoms</a:t>
-            </a:r>
-            <a:r>
-              <a:rPr lang="pt-BR" dirty="0" smtClean="0"/>
-              <a:t>, </a:t>
-            </a:r>
-            <a:r>
-              <a:rPr lang="pt-BR" b="1" i="1" dirty="0" smtClean="0"/>
-              <a:t>Platform-tools</a:t>
-            </a:r>
-            <a:r>
-              <a:rPr lang="pt-BR" dirty="0" smtClean="0"/>
-              <a:t> e </a:t>
-            </a:r>
-            <a:r>
-              <a:rPr lang="pt-BR" b="1" i="1" dirty="0" smtClean="0"/>
-              <a:t>Tools</a:t>
-            </a:r>
-            <a:r>
-              <a:rPr lang="pt-BR" dirty="0" smtClean="0"/>
-              <a:t> são obrigatórios.</a:t>
-            </a:r>
           </a:p>
         </p:txBody>
       </p:sp>
     </p:spTree>
     <p:extLst>
       <p:ext uri="{BB962C8B-B14F-4D97-AF65-F5344CB8AC3E}">
-        <p14:creationId xmlns:p14="http://schemas.microsoft.com/office/powerpoint/2010/main" val="1642182597"/>
+        <p14:creationId xmlns:p14="http://schemas.microsoft.com/office/powerpoint/2010/main" val="1626986151"/>
       </p:ext>
     </p:extLst>
   </p:cSld>
@@ -4267,19 +4226,19 @@
           <a:p>
             <a:r>
               <a:rPr lang="pt-BR" dirty="0" smtClean="0"/>
-              <a:t>2. </a:t>
-            </a:r>
-            <a:r>
-              <a:rPr lang="pt-BR" dirty="0"/>
-              <a:t>Instalar o </a:t>
-            </a:r>
-            <a:r>
-              <a:rPr lang="pt-BR" dirty="0" smtClean="0"/>
-              <a:t>SDK do </a:t>
-            </a:r>
-            <a:r>
-              <a:rPr lang="pt-BR" dirty="0" err="1" smtClean="0"/>
-              <a:t>Android</a:t>
+              <a:t>2.1. </a:t>
+            </a:r>
+            <a:r>
+              <a:rPr lang="pt-BR" dirty="0"/>
+              <a:t>Instalar </a:t>
+            </a:r>
+            <a:r>
+              <a:rPr lang="pt-BR" dirty="0"/>
+              <a:t>os </a:t>
+            </a:r>
+            <a:r>
+              <a:rPr lang="pt-BR" dirty="0" smtClean="0"/>
+              <a:t>pacotes</a:t>
             </a:r>
             <a:endParaRPr lang="pt-BR" dirty="0"/>
           </a:p>
@@ -4304,46 +4263,90 @@
           <a:p>
             <a:r>
               <a:rPr lang="pt-BR" dirty="0" smtClean="0"/>
-              <a:t>Instale os pacotes que estiverem faltando por meio do comando:</a:t>
-            </a:r>
-          </a:p>
-          <a:p>
+              <a:t>Executando o comando abaixo:</a:t>
+            </a:r>
+          </a:p>
+          <a:p>
+            <a:r>
+              <a:rPr lang="pt-BR" dirty="0" smtClean="0"/>
+              <a:t>C:\android-sdk\tools\bin&gt;</a:t>
+            </a:r>
+            <a:r>
+              <a:rPr lang="pt-BR" b="1" i="1" dirty="0" smtClean="0"/>
+              <a:t>sdkmanager --</a:t>
+            </a:r>
             <a:r>
               <a:rPr lang="pt-BR" b="1" i="1" dirty="0" err="1" smtClean="0"/>
-              <a:t>sdkmanager</a:t>
+              <a:t>list</a:t>
             </a:r>
             <a:r>
               <a:rPr lang="pt-BR" b="1" i="1" dirty="0" smtClean="0"/>
-              <a:t> “nome-do-pacote”</a:t>
-            </a:r>
-          </a:p>
-          <a:p>
-            <a:r>
-              <a:rPr lang="pt-BR" dirty="0" smtClean="0"/>
-              <a:t>Por exemplo:</a:t>
-            </a:r>
-          </a:p>
-          <a:p>
-            <a:r>
-              <a:rPr lang="pt-BR" dirty="0"/>
-              <a:t>C:\android-sdk\tools\bin&gt;</a:t>
-            </a:r>
-            <a:r>
-              <a:rPr lang="pt-BR" b="1" i="1" dirty="0"/>
-              <a:t>sdkmanager “</a:t>
+              <a:t> -- </a:t>
+            </a:r>
+            <a:r>
+              <a:rPr lang="pt-BR" b="1" i="1" dirty="0" err="1" smtClean="0"/>
+              <a:t>verbose</a:t>
+            </a:r>
+            <a:endParaRPr lang="pt-BR" b="1" i="1" dirty="0" smtClean="0"/>
+          </a:p>
+          <a:p>
+            <a:r>
+              <a:rPr lang="pt-BR" dirty="0" smtClean="0"/>
+              <a:t>é possível visualizar os pacotes instalados e os pacotes disponíveis, incluindo as imagens para a criação de dispositivos </a:t>
+            </a:r>
+            <a:r>
+              <a:rPr lang="pt-BR" dirty="0" smtClean="0"/>
+              <a:t>virtuais.</a:t>
+            </a:r>
+          </a:p>
+          <a:p>
+            <a:r>
+              <a:rPr lang="pt-BR" dirty="0" smtClean="0"/>
+              <a:t>Os </a:t>
+            </a:r>
+            <a:r>
+              <a:rPr lang="pt-BR" dirty="0" smtClean="0"/>
+              <a:t>pacotes </a:t>
             </a:r>
             <a:r>
               <a:rPr lang="pt-BR" b="1" i="1" dirty="0" smtClean="0"/>
-              <a:t>build-tools;27.0.3”</a:t>
-            </a:r>
-            <a:endParaRPr lang="pt-BR" dirty="0" smtClean="0"/>
+              <a:t>Build Tools</a:t>
+            </a:r>
+            <a:r>
+              <a:rPr lang="pt-BR" dirty="0" smtClean="0"/>
+              <a:t>, </a:t>
+            </a:r>
+            <a:r>
+              <a:rPr lang="pt-BR" b="1" i="1" dirty="0" err="1" smtClean="0"/>
+              <a:t>Platfoms</a:t>
+            </a:r>
+            <a:r>
+              <a:rPr lang="pt-BR" dirty="0" smtClean="0"/>
+              <a:t>, </a:t>
+            </a:r>
+            <a:r>
+              <a:rPr lang="pt-BR" b="1" i="1" dirty="0" smtClean="0"/>
+              <a:t>Platform-tools</a:t>
+            </a:r>
+            <a:r>
+              <a:rPr lang="pt-BR" dirty="0" smtClean="0"/>
+              <a:t> e </a:t>
+            </a:r>
+            <a:r>
+              <a:rPr lang="pt-BR" b="1" i="1" dirty="0" smtClean="0"/>
+              <a:t>Tools</a:t>
+            </a:r>
+            <a:r>
+              <a:rPr lang="pt-BR" dirty="0" smtClean="0"/>
+              <a:t> são obrigatórios.</a:t>
+            </a:r>
           </a:p>
         </p:txBody>
       </p:sp>
     </p:spTree>
     <p:extLst>
       <p:ext uri="{BB962C8B-B14F-4D97-AF65-F5344CB8AC3E}">
-        <p14:creationId xmlns:p14="http://schemas.microsoft.com/office/powerpoint/2010/main" val="2661399238"/>
+        <p14:creationId xmlns:p14="http://schemas.microsoft.com/office/powerpoint/2010/main" val="1642182597"/>
       </p:ext>
     </p:extLst>
   </p:cSld>
@@ -4396,19 +4399,15 @@
           <a:p>
             <a:r>
               <a:rPr lang="pt-BR" dirty="0" smtClean="0"/>
-              <a:t>2. </a:t>
-            </a:r>
-            <a:r>
-              <a:rPr lang="pt-BR" dirty="0"/>
-              <a:t>Instalar o </a:t>
-            </a:r>
-            <a:r>
-              <a:rPr lang="pt-BR" dirty="0" smtClean="0"/>
-              <a:t>SDK do </a:t>
-            </a:r>
-            <a:r>
-              <a:rPr lang="pt-BR" dirty="0" err="1" smtClean="0"/>
-              <a:t>Android</a:t>
+              <a:t>2.1. </a:t>
+            </a:r>
+            <a:r>
+              <a:rPr lang="pt-BR" dirty="0"/>
+              <a:t>Instalar </a:t>
+            </a:r>
+            <a:r>
+              <a:rPr lang="pt-BR" dirty="0" smtClean="0"/>
+              <a:t>os pacotes</a:t>
             </a:r>
             <a:endParaRPr lang="pt-BR" dirty="0"/>
           </a:p>
@@ -4433,53 +4432,37 @@
           <a:p>
             <a:r>
               <a:rPr lang="pt-BR" dirty="0" smtClean="0"/>
-              <a:t>É também por meio do </a:t>
-            </a:r>
-            <a:r>
-              <a:rPr lang="pt-BR" dirty="0" err="1" smtClean="0"/>
+              <a:t>Instale os pacotes que estiverem faltando por meio do comando:</a:t>
+            </a:r>
+          </a:p>
+          <a:p>
+            <a:r>
+              <a:rPr lang="pt-BR" b="1" i="1" dirty="0" err="1" smtClean="0"/>
               <a:t>sdkmanager</a:t>
             </a:r>
             <a:r>
-              <a:rPr lang="pt-BR" dirty="0" smtClean="0"/>
-              <a:t> </a:t>
-            </a:r>
-            <a:r>
-              <a:rPr lang="pt-BR" dirty="0"/>
-              <a:t>que são instaladas as </a:t>
-            </a:r>
-            <a:r>
-              <a:rPr lang="pt-BR" dirty="0" smtClean="0"/>
-              <a:t>imagens usadas para a criação de dispositivos virtuais. O comando abaixo instala a imagem necessária para criar dispositivos virtuais com a arquitetura x86, API-27 do </a:t>
-            </a:r>
-            <a:r>
-              <a:rPr lang="pt-BR" dirty="0" err="1" smtClean="0"/>
-              <a:t>Android</a:t>
-            </a:r>
-            <a:r>
-              <a:rPr lang="pt-BR" dirty="0"/>
-              <a:t> </a:t>
-            </a:r>
-            <a:r>
-              <a:rPr lang="pt-BR" dirty="0" smtClean="0"/>
-              <a:t>e API do Google:</a:t>
-            </a:r>
-          </a:p>
-          <a:p>
-            <a:r>
-              <a:rPr lang="pt-BR" dirty="0" smtClean="0"/>
-              <a:t>C</a:t>
-            </a:r>
-            <a:r>
-              <a:rPr lang="pt-BR" dirty="0"/>
-              <a:t>:\android-sdk\tools\bin&gt;</a:t>
+              <a:rPr lang="pt-BR" b="1" i="1" dirty="0" smtClean="0"/>
+              <a:t> “nome-do-pacote”</a:t>
+            </a:r>
+          </a:p>
+          <a:p>
+            <a:r>
+              <a:rPr lang="pt-BR" dirty="0" smtClean="0"/>
+              <a:t>Por exemplo:</a:t>
+            </a:r>
+          </a:p>
+          <a:p>
+            <a:r>
+              <a:rPr lang="pt-BR" dirty="0"/>
+              <a:t>C:\android-sdk\tools\bin&gt;</a:t>
             </a:r>
             <a:r>
               <a:rPr lang="pt-BR" b="1" i="1" dirty="0"/>
-              <a:t>sdkmanager </a:t>
+              <a:t>sdkmanager “</a:t>
             </a:r>
             <a:r>
               <a:rPr lang="pt-BR" b="1" i="1" dirty="0" smtClean="0"/>
-              <a:t>“system-images;android-27;google_apis;x86”</a:t>
+              <a:t>build-tools;27.0.3”</a:t>
             </a:r>
             <a:endParaRPr lang="pt-BR" dirty="0" smtClean="0"/>
           </a:p>
@@ -4488,7 +4471,7 @@
     </p:spTree>
     <p:extLst>
       <p:ext uri="{BB962C8B-B14F-4D97-AF65-F5344CB8AC3E}">
-        <p14:creationId xmlns:p14="http://schemas.microsoft.com/office/powerpoint/2010/main" val="122899924"/>
+        <p14:creationId xmlns:p14="http://schemas.microsoft.com/office/powerpoint/2010/main" val="2661399238"/>
       </p:ext>
     </p:extLst>
   </p:cSld>
@@ -4541,19 +4524,15 @@
           <a:p>
             <a:r>
               <a:rPr lang="pt-BR" dirty="0" smtClean="0"/>
-              <a:t>2. </a:t>
-            </a:r>
-            <a:r>
-              <a:rPr lang="pt-BR" dirty="0"/>
-              <a:t>Instalar o </a:t>
-            </a:r>
-            <a:r>
-              <a:rPr lang="pt-BR" dirty="0" smtClean="0"/>
-              <a:t>SDK do </a:t>
-            </a:r>
-            <a:r>
-              <a:rPr lang="pt-BR" dirty="0" err="1" smtClean="0"/>
-              <a:t>Android</a:t>
+              <a:t>2.2. </a:t>
+            </a:r>
+            <a:r>
+              <a:rPr lang="pt-BR" dirty="0"/>
+              <a:t>Instalar </a:t>
+            </a:r>
+            <a:r>
+              <a:rPr lang="pt-BR" dirty="0" smtClean="0"/>
+              <a:t>as imagens</a:t>
             </a:r>
             <a:endParaRPr lang="pt-BR" dirty="0"/>
           </a:p>
@@ -4578,108 +4557,62 @@
           <a:p>
             <a:r>
               <a:rPr lang="pt-BR" dirty="0" smtClean="0"/>
-              <a:t>Pode </a:t>
-            </a:r>
-            <a:r>
-              <a:rPr lang="pt-BR" dirty="0"/>
-              <a:t>ser necessário criar o arquivo </a:t>
-            </a:r>
-            <a:r>
-              <a:rPr lang="pt-BR" b="1" i="1" dirty="0" err="1"/>
-              <a:t>repositories.cfg</a:t>
-            </a:r>
-            <a:r>
-              <a:rPr lang="pt-BR" dirty="0"/>
-              <a:t> dentro </a:t>
-            </a:r>
-            <a:r>
-              <a:rPr lang="pt-BR" dirty="0" smtClean="0"/>
-              <a:t>do diretório</a:t>
-            </a:r>
-            <a:r>
-              <a:rPr lang="pt-BR" dirty="0"/>
-              <a:t> </a:t>
+              <a:t>É também por meio do </a:t>
+            </a:r>
+            <a:r>
+              <a:rPr lang="pt-BR" dirty="0" err="1" smtClean="0"/>
+              <a:t>sdkmanager</a:t>
+            </a:r>
+            <a:r>
+              <a:rPr lang="pt-BR" dirty="0" smtClean="0"/>
+              <a:t> </a:t>
+            </a:r>
+            <a:r>
+              <a:rPr lang="pt-BR" dirty="0"/>
+              <a:t>que são instaladas as </a:t>
+            </a:r>
+            <a:r>
+              <a:rPr lang="pt-BR" dirty="0" smtClean="0"/>
+              <a:t>imagens usadas para a criação de dispositivos virtuais. O comando abaixo instala a imagem necessária para criar dispositivos virtuais com a arquitetura x86, API-27 do </a:t>
+            </a:r>
+            <a:r>
+              <a:rPr lang="pt-BR" dirty="0" err="1" smtClean="0"/>
+              <a:t>Android</a:t>
+            </a:r>
+            <a:r>
+              <a:rPr lang="pt-BR" dirty="0"/>
+              <a:t> </a:t>
+            </a:r>
+            <a:r>
+              <a:rPr lang="pt-BR" dirty="0" smtClean="0"/>
+              <a:t>e API do Google:</a:t>
+            </a:r>
+          </a:p>
+          <a:p>
+            <a:r>
+              <a:rPr lang="pt-BR" dirty="0" smtClean="0"/>
+              <a:t>C</a:t>
+            </a:r>
+            <a:r>
+              <a:rPr lang="pt-BR" dirty="0"/>
+              <a:t>:\android-sdk\tools\bin&gt;</a:t>
             </a:r>
             <a:r>
               <a:rPr lang="pt-BR" b="1" i="1" dirty="0"/>
-              <a:t>.</a:t>
-            </a:r>
-            <a:r>
-              <a:rPr lang="pt-BR" b="1" i="1" dirty="0" err="1"/>
-              <a:t>android</a:t>
-            </a:r>
-            <a:r>
-              <a:rPr lang="pt-BR" dirty="0"/>
-              <a:t>, </a:t>
-            </a:r>
-            <a:r>
-              <a:rPr lang="pt-BR" dirty="0" smtClean="0"/>
-              <a:t>localizado no diretório do </a:t>
-            </a:r>
-            <a:r>
-              <a:rPr lang="pt-BR" dirty="0"/>
-              <a:t>usuário</a:t>
-            </a:r>
-            <a:r>
-              <a:rPr lang="pt-BR" dirty="0" smtClean="0"/>
-              <a:t>.</a:t>
-            </a:r>
-          </a:p>
-          <a:p>
-            <a:r>
-              <a:rPr lang="pt-BR" dirty="0" smtClean="0"/>
-              <a:t>C</a:t>
-            </a:r>
-            <a:r>
-              <a:rPr lang="pt-BR" dirty="0"/>
-              <a:t>:\Users\Administrador\.</a:t>
-            </a:r>
-            <a:r>
-              <a:rPr lang="pt-BR" dirty="0" smtClean="0"/>
-              <a:t>android\repositories.cfg</a:t>
-            </a:r>
-            <a:endParaRPr lang="pt-BR" dirty="0"/>
-          </a:p>
-          <a:p>
-            <a:r>
-              <a:rPr lang="pt-BR" dirty="0"/>
-              <a:t>No Windows, basta criar um arquivo texto vazio </a:t>
-            </a:r>
-            <a:r>
-              <a:rPr lang="pt-BR" dirty="0" smtClean="0"/>
-              <a:t>nessa </a:t>
-            </a:r>
-            <a:r>
-              <a:rPr lang="pt-BR" dirty="0"/>
-              <a:t>pasta, </a:t>
-            </a:r>
-            <a:r>
-              <a:rPr lang="pt-BR" dirty="0" err="1" smtClean="0"/>
-              <a:t>renomeá-lo</a:t>
-            </a:r>
-            <a:r>
-              <a:rPr lang="pt-BR" dirty="0" smtClean="0"/>
-              <a:t> </a:t>
-            </a:r>
-            <a:r>
-              <a:rPr lang="pt-BR" dirty="0"/>
-              <a:t>para </a:t>
-            </a:r>
-            <a:r>
-              <a:rPr lang="pt-BR" b="1" i="1" dirty="0" err="1"/>
-              <a:t>repositories.cfg</a:t>
-            </a:r>
-            <a:r>
-              <a:rPr lang="pt-BR" dirty="0" smtClean="0"/>
-              <a:t>.</a:t>
-            </a:r>
+              <a:t>sdkmanager </a:t>
+            </a:r>
+            <a:r>
+              <a:rPr lang="pt-BR" b="1" i="1" dirty="0" smtClean="0"/>
+              <a:t>“system-images;android-27;google_apis;x86”</a:t>
+            </a:r>
+            <a:endParaRPr lang="pt-BR" dirty="0" smtClean="0"/>
           </a:p>
         </p:txBody>
       </p:sp>
     </p:spTree>
     <p:extLst>
       <p:ext uri="{BB962C8B-B14F-4D97-AF65-F5344CB8AC3E}">
-        <p14:creationId xmlns:p14="http://schemas.microsoft.com/office/powerpoint/2010/main" val="1713603079"/>
+        <p14:creationId xmlns:p14="http://schemas.microsoft.com/office/powerpoint/2010/main" val="122899924"/>
       </p:ext>
     </p:extLst>
   </p:cSld>
@@ -4732,19 +4665,15 @@
           <a:p>
             <a:r>
               <a:rPr lang="pt-BR" dirty="0" smtClean="0"/>
-              <a:t>2. </a:t>
-            </a:r>
-            <a:r>
-              <a:rPr lang="pt-BR" dirty="0"/>
-              <a:t>Instalar o </a:t>
-            </a:r>
-            <a:r>
-              <a:rPr lang="pt-BR" dirty="0" smtClean="0"/>
-              <a:t>SDK do </a:t>
-            </a:r>
-            <a:r>
-              <a:rPr lang="pt-BR" dirty="0" err="1" smtClean="0"/>
-              <a:t>Android</a:t>
+              <a:t>2.2. </a:t>
+            </a:r>
+            <a:r>
+              <a:rPr lang="pt-BR" dirty="0"/>
+              <a:t>Instalar </a:t>
+            </a:r>
+            <a:r>
+              <a:rPr lang="pt-BR" dirty="0" smtClean="0"/>
+              <a:t>as imagens</a:t>
             </a:r>
             <a:endParaRPr lang="pt-BR" dirty="0"/>
           </a:p>
@@ -4769,38 +4698,108 @@
           <a:p>
             <a:r>
               <a:rPr lang="pt-BR" dirty="0" smtClean="0"/>
-              <a:t>O próximo passo é criar os dispositivos virtuais por meio do aplicativo </a:t>
-            </a:r>
-            <a:r>
-              <a:rPr lang="pt-BR" b="1" i="1" dirty="0" err="1" smtClean="0"/>
-              <a:t>avdmanager</a:t>
-            </a:r>
-            <a:r>
-              <a:rPr lang="pt-BR" dirty="0" smtClean="0"/>
-              <a:t>. Para visualizar as definições de dispositivos disponíveis, execute o comando:</a:t>
-            </a:r>
-          </a:p>
-          <a:p>
-            <a:r>
-              <a:rPr lang="pt-BR" dirty="0"/>
-              <a:t>C:\android-sdk\tools\bin&gt;</a:t>
+              <a:t>Pode </a:t>
+            </a:r>
+            <a:r>
+              <a:rPr lang="pt-BR" dirty="0"/>
+              <a:t>ser necessário criar o arquivo </a:t>
+            </a:r>
+            <a:r>
+              <a:rPr lang="pt-BR" b="1" i="1" dirty="0" err="1"/>
+              <a:t>repositories.cfg</a:t>
+            </a:r>
+            <a:r>
+              <a:rPr lang="pt-BR" dirty="0"/>
+              <a:t> dentro </a:t>
+            </a:r>
+            <a:r>
+              <a:rPr lang="pt-BR" dirty="0" smtClean="0"/>
+              <a:t>do diretório</a:t>
+            </a:r>
+            <a:r>
+              <a:rPr lang="pt-BR" dirty="0"/>
+              <a:t> </a:t>
             </a:r>
             <a:r>
               <a:rPr lang="pt-BR" b="1" i="1" dirty="0"/>
-              <a:t>avdmanager </a:t>
-            </a:r>
-            <a:r>
-              <a:rPr lang="pt-BR" b="1" i="1" dirty="0" err="1" smtClean="0"/>
-              <a:t>list</a:t>
-            </a:r>
-            <a:endParaRPr lang="pt-BR" dirty="0" smtClean="0"/>
+              <a:t>.</a:t>
+            </a:r>
+            <a:r>
+              <a:rPr lang="pt-BR" b="1" i="1" dirty="0" err="1"/>
+              <a:t>android</a:t>
+            </a:r>
+            <a:r>
+              <a:rPr lang="pt-BR" dirty="0"/>
+              <a:t>, </a:t>
+            </a:r>
+            <a:r>
+              <a:rPr lang="pt-BR" dirty="0" smtClean="0"/>
+              <a:t>localizado no diretório do </a:t>
+            </a:r>
+            <a:r>
+              <a:rPr lang="pt-BR" dirty="0"/>
+              <a:t>usuário</a:t>
+            </a:r>
+            <a:r>
+              <a:rPr lang="pt-BR" dirty="0" smtClean="0"/>
+              <a:t>.</a:t>
+            </a:r>
+          </a:p>
+          <a:p>
+            <a:r>
+              <a:rPr lang="pt-BR" dirty="0" smtClean="0"/>
+              <a:t>C</a:t>
+            </a:r>
+            <a:r>
+              <a:rPr lang="pt-BR" dirty="0"/>
+              <a:t>:\Users\Administrador\.</a:t>
+            </a:r>
+            <a:r>
+              <a:rPr lang="pt-BR" dirty="0" smtClean="0"/>
+              <a:t>android\repositories.cfg</a:t>
+            </a:r>
+            <a:endParaRPr lang="pt-BR" dirty="0"/>
+          </a:p>
+          <a:p>
+            <a:r>
+              <a:rPr lang="pt-BR" dirty="0"/>
+              <a:t>No Windows, basta criar um arquivo texto vazio </a:t>
+            </a:r>
+            <a:r>
+              <a:rPr lang="pt-BR" dirty="0" smtClean="0"/>
+              <a:t>nessa </a:t>
+            </a:r>
+            <a:r>
+              <a:rPr lang="pt-BR" dirty="0"/>
+              <a:t>pasta, </a:t>
+            </a:r>
+            <a:r>
+              <a:rPr lang="pt-BR" dirty="0" err="1" smtClean="0"/>
+              <a:t>renomeá-lo</a:t>
+            </a:r>
+            <a:r>
+              <a:rPr lang="pt-BR" dirty="0" smtClean="0"/>
+              <a:t> </a:t>
+            </a:r>
+            <a:r>
+              <a:rPr lang="pt-BR" dirty="0"/>
+              <a:t>para </a:t>
+            </a:r>
+            <a:r>
+              <a:rPr lang="pt-BR" b="1" i="1" dirty="0" err="1"/>
+              <a:t>repositories.cfg</a:t>
+            </a:r>
+            <a:r>
+              <a:rPr lang="pt-BR" dirty="0" smtClean="0"/>
+              <a:t>.</a:t>
+            </a:r>
           </a:p>
         </p:txBody>
       </p:sp>
     </p:spTree>
     <p:extLst>
       <p:ext uri="{BB962C8B-B14F-4D97-AF65-F5344CB8AC3E}">
-        <p14:creationId xmlns:p14="http://schemas.microsoft.com/office/powerpoint/2010/main" val="2118035447"/>
+        <p14:creationId xmlns:p14="http://schemas.microsoft.com/office/powerpoint/2010/main" val="1713603079"/>
       </p:ext>
     </p:extLst>
   </p:cSld>
@@ -4853,19 +4852,19 @@
           <a:p>
             <a:r>
               <a:rPr lang="pt-BR" dirty="0" smtClean="0"/>
-              <a:t>2. </a:t>
-            </a:r>
-            <a:r>
-              <a:rPr lang="pt-BR" dirty="0"/>
-              <a:t>Instalar o </a:t>
-            </a:r>
-            <a:r>
-              <a:rPr lang="pt-BR" dirty="0" smtClean="0"/>
-              <a:t>SDK do </a:t>
+              <a:t>2.3. </a:t>
+            </a:r>
+            <a:r>
+              <a:rPr lang="pt-BR" dirty="0"/>
+              <a:t>Instalar </a:t>
+            </a:r>
+            <a:r>
+              <a:rPr lang="pt-BR" dirty="0" smtClean="0"/>
+              <a:t>os </a:t>
             </a:r>
             <a:r>
               <a:rPr lang="pt-BR" dirty="0" err="1" smtClean="0"/>
-              <a:t>Android</a:t>
+              <a:t>AVDs</a:t>
             </a:r>
             <a:endParaRPr lang="pt-BR" dirty="0"/>
           </a:p>
@@ -4890,96 +4889,38 @@
           <a:p>
             <a:r>
               <a:rPr lang="pt-BR" dirty="0" smtClean="0"/>
-              <a:t>O </a:t>
-            </a:r>
-            <a:r>
-              <a:rPr lang="pt-BR" dirty="0"/>
-              <a:t>comando abaixo </a:t>
-            </a:r>
-            <a:r>
-              <a:rPr lang="pt-BR" dirty="0" smtClean="0"/>
-              <a:t>cria um dispositivo virtual </a:t>
-            </a:r>
-            <a:r>
-              <a:rPr lang="pt-BR" dirty="0" err="1" smtClean="0"/>
-              <a:t>android</a:t>
-            </a:r>
-            <a:r>
-              <a:rPr lang="pt-BR" dirty="0" smtClean="0"/>
-              <a:t>:</a:t>
-            </a:r>
-          </a:p>
-          <a:p>
+              <a:t>O próximo passo é criar os dispositivos virtuais por meio do aplicativo </a:t>
+            </a:r>
             <a:r>
               <a:rPr lang="pt-BR" b="1" i="1" dirty="0" err="1" smtClean="0"/>
               <a:t>avdmanager</a:t>
             </a:r>
             <a:r>
-              <a:rPr lang="pt-BR" b="1" i="1" dirty="0" smtClean="0"/>
-              <a:t> </a:t>
+              <a:rPr lang="pt-BR" dirty="0" smtClean="0"/>
+              <a:t>. Para visualizar as definições de dispositivos disponíveis, execute o comando:</a:t>
+            </a:r>
+          </a:p>
+          <a:p>
+            <a:r>
+              <a:rPr lang="pt-BR" dirty="0"/>
+              <a:t>C:\android-sdk\tools\bin&gt;</a:t>
+            </a:r>
+            <a:r>
+              <a:rPr lang="pt-BR" b="1" i="1" dirty="0"/>
+              <a:t>avdmanager </a:t>
             </a:r>
             <a:r>
               <a:rPr lang="pt-BR" b="1" i="1" dirty="0" err="1" smtClean="0"/>
-              <a:t>create</a:t>
-            </a:r>
-            <a:r>
-              <a:rPr lang="pt-BR" b="1" i="1" dirty="0" smtClean="0"/>
-              <a:t> </a:t>
-            </a:r>
-            <a:r>
-              <a:rPr lang="pt-BR" b="1" i="1" dirty="0" err="1" smtClean="0"/>
-              <a:t>avd</a:t>
-            </a:r>
-            <a:r>
-              <a:rPr lang="pt-BR" b="1" i="1" dirty="0" smtClean="0"/>
-              <a:t> -n </a:t>
-            </a:r>
-            <a:r>
-              <a:rPr lang="pt-BR" b="1" i="1" dirty="0" err="1" smtClean="0"/>
-              <a:t>name</a:t>
-            </a:r>
-            <a:r>
-              <a:rPr lang="pt-BR" b="1" i="1" dirty="0" smtClean="0"/>
-              <a:t> </a:t>
-            </a:r>
-            <a:r>
-              <a:rPr lang="pt-BR" b="1" i="1" dirty="0"/>
-              <a:t>-</a:t>
-            </a:r>
-            <a:r>
-              <a:rPr lang="pt-BR" b="1" i="1" dirty="0" smtClean="0"/>
-              <a:t>k “</a:t>
-            </a:r>
-            <a:r>
-              <a:rPr lang="pt-BR" b="1" i="1" dirty="0"/>
-              <a:t>imagem” -g </a:t>
-            </a:r>
-            <a:r>
-              <a:rPr lang="pt-BR" b="1" i="1" dirty="0" err="1"/>
-              <a:t>google_apis</a:t>
-            </a:r>
-            <a:r>
-              <a:rPr lang="pt-BR" b="1" i="1" dirty="0"/>
-              <a:t> -d </a:t>
-            </a:r>
-            <a:r>
-              <a:rPr lang="pt-BR" b="1" i="1" dirty="0" err="1" smtClean="0"/>
-              <a:t>id_definição</a:t>
-            </a:r>
-            <a:endParaRPr lang="pt-BR" b="1" i="1" dirty="0" smtClean="0"/>
-          </a:p>
-          <a:p>
-            <a:r>
-              <a:rPr lang="pt-BR" dirty="0" smtClean="0"/>
-              <a:t>Onde ...</a:t>
-            </a:r>
+              <a:t>list</a:t>
+            </a:r>
+            <a:endParaRPr lang="pt-BR" dirty="0" smtClean="0"/>
           </a:p>
         </p:txBody>
       </p:sp>
     </p:spTree>
     <p:extLst>
       <p:ext uri="{BB962C8B-B14F-4D97-AF65-F5344CB8AC3E}">
-        <p14:creationId xmlns:p14="http://schemas.microsoft.com/office/powerpoint/2010/main" val="25351945"/>
+        <p14:creationId xmlns:p14="http://schemas.microsoft.com/office/powerpoint/2010/main" val="2118035447"/>
       </p:ext>
     </p:extLst>
   </p:cSld>
@@ -5032,19 +4973,19 @@
           <a:p>
             <a:r>
               <a:rPr lang="pt-BR" dirty="0" smtClean="0"/>
-              <a:t>2. </a:t>
-            </a:r>
-            <a:r>
-              <a:rPr lang="pt-BR" dirty="0"/>
-              <a:t>Instalar o </a:t>
-            </a:r>
-            <a:r>
-              <a:rPr lang="pt-BR" dirty="0" smtClean="0"/>
-              <a:t>SDK do </a:t>
-            </a:r>
-            <a:r>
-              <a:rPr lang="pt-BR" dirty="0" err="1" smtClean="0"/>
-              <a:t>Android</a:t>
+              <a:t>2.3. </a:t>
+            </a:r>
+            <a:r>
+              <a:rPr lang="pt-BR" dirty="0"/>
+              <a:t>Instalar </a:t>
+            </a:r>
+            <a:r>
+              <a:rPr lang="pt-BR" dirty="0"/>
+              <a:t>os </a:t>
+            </a:r>
+            <a:r>
+              <a:rPr lang="pt-BR" dirty="0" err="1"/>
+              <a:t>AVDs</a:t>
             </a:r>
             <a:endParaRPr lang="pt-BR" dirty="0"/>
           </a:p>
@@ -5067,71 +5008,90 @@
           </a:bodyPr>
           <a:lstStyle/>
           <a:p>
-            <a:pPr algn="l"/>
+            <a:r>
+              <a:rPr lang="pt-BR" dirty="0" smtClean="0"/>
+              <a:t>O </a:t>
+            </a:r>
+            <a:r>
+              <a:rPr lang="pt-BR" dirty="0"/>
+              <a:t>comando abaixo </a:t>
+            </a:r>
+            <a:r>
+              <a:rPr lang="pt-BR" dirty="0" smtClean="0"/>
+              <a:t>cria um dispositivo virtual </a:t>
+            </a:r>
+            <a:r>
+              <a:rPr lang="pt-BR" dirty="0" err="1" smtClean="0"/>
+              <a:t>android</a:t>
+            </a:r>
+            <a:r>
+              <a:rPr lang="pt-BR" dirty="0" smtClean="0"/>
+              <a:t>:</a:t>
+            </a:r>
+          </a:p>
+          <a:p>
+            <a:r>
+              <a:rPr lang="pt-BR" b="1" i="1" dirty="0" err="1" smtClean="0"/>
+              <a:t>avdmanager</a:t>
+            </a:r>
             <a:r>
               <a:rPr lang="pt-BR" b="1" i="1" dirty="0" smtClean="0"/>
-              <a:t>-n </a:t>
+              <a:t> </a:t>
+            </a:r>
+            <a:r>
+              <a:rPr lang="pt-BR" b="1" i="1" dirty="0" err="1" smtClean="0"/>
+              <a:t>create</a:t>
+            </a:r>
+            <a:r>
+              <a:rPr lang="pt-BR" b="1" i="1" dirty="0" smtClean="0"/>
+              <a:t> </a:t>
+            </a:r>
+            <a:r>
+              <a:rPr lang="pt-BR" b="1" i="1" dirty="0" err="1" smtClean="0"/>
+              <a:t>avd</a:t>
+            </a:r>
+            <a:r>
+              <a:rPr lang="pt-BR" b="1" i="1" dirty="0" smtClean="0"/>
+              <a:t> -n </a:t>
             </a:r>
             <a:r>
               <a:rPr lang="pt-BR" b="1" i="1" dirty="0" err="1" smtClean="0"/>
               <a:t>name</a:t>
             </a:r>
             <a:r>
-              <a:rPr lang="pt-BR" dirty="0" smtClean="0"/>
-              <a:t>: o nome que deseja para identificar o dispositivo virtual;</a:t>
-            </a:r>
-          </a:p>
-          <a:p>
-            <a:pPr algn="l"/>
-            <a:r>
               <a:rPr lang="pt-BR" b="1" i="1" dirty="0" smtClean="0"/>
-              <a:t>-k “imagem”</a:t>
-            </a:r>
-            <a:r>
-              <a:rPr lang="pt-BR" dirty="0" smtClean="0"/>
-              <a:t>: o nome da imagem que será usada;</a:t>
-            </a:r>
-          </a:p>
-          <a:p>
-            <a:pPr algn="l"/>
+              <a:t> </a:t>
+            </a:r>
             <a:r>
               <a:rPr lang="pt-BR" b="1" i="1" dirty="0"/>
-              <a:t>-g </a:t>
+              <a:t>-</a:t>
+            </a:r>
+            <a:r>
+              <a:rPr lang="pt-BR" b="1" i="1" dirty="0" smtClean="0"/>
+              <a:t>k “</a:t>
+            </a:r>
+            <a:r>
+              <a:rPr lang="pt-BR" b="1" i="1" dirty="0"/>
+              <a:t>imagem” -g </a:t>
             </a:r>
             <a:r>
               <a:rPr lang="pt-BR" b="1" i="1" dirty="0" err="1"/>
               <a:t>google_apis</a:t>
             </a:r>
             <a:r>
-              <a:rPr lang="pt-BR" dirty="0"/>
-              <a:t>: indica o uso da API do Google para comunicação com o </a:t>
-            </a:r>
-            <a:r>
-              <a:rPr lang="pt-BR" i="1" dirty="0"/>
-              <a:t>Google Services</a:t>
-            </a:r>
-            <a:r>
-              <a:rPr lang="pt-BR" dirty="0"/>
-              <a:t> e integração com outros serviços</a:t>
-            </a:r>
-            <a:r>
-              <a:rPr lang="pt-BR" dirty="0" smtClean="0"/>
-              <a:t>; e</a:t>
-            </a:r>
-          </a:p>
-          <a:p>
-            <a:pPr algn="l"/>
-            <a:r>
-              <a:rPr lang="pt-BR" b="1" i="1" dirty="0" smtClean="0"/>
-              <a:t>-d </a:t>
+              <a:rPr lang="pt-BR" b="1" i="1" dirty="0"/>
+              <a:t> -d </a:t>
             </a:r>
             <a:r>
               <a:rPr lang="pt-BR" b="1" i="1" dirty="0" err="1" smtClean="0"/>
               <a:t>id_definição</a:t>
             </a:r>
-            <a:r>
-              <a:rPr lang="pt-BR" dirty="0" smtClean="0"/>
-              <a:t>: id da definição do dispositivo desejado.</a:t>
+            <a:endParaRPr lang="pt-BR" b="1" i="1" dirty="0" smtClean="0"/>
+          </a:p>
+          <a:p>
+            <a:r>
+              <a:rPr lang="pt-BR" dirty="0" smtClean="0"/>
+              <a:t>Onde ...</a:t>
             </a:r>
           </a:p>
         </p:txBody>
@@ -5139,7 +5099,7 @@
     </p:spTree>
     <p:extLst>
       <p:ext uri="{BB962C8B-B14F-4D97-AF65-F5344CB8AC3E}">
-        <p14:creationId xmlns:p14="http://schemas.microsoft.com/office/powerpoint/2010/main" val="697835615"/>
+        <p14:creationId xmlns:p14="http://schemas.microsoft.com/office/powerpoint/2010/main" val="25351945"/>
       </p:ext>
     </p:extLst>
   </p:cSld>
@@ -5192,19 +5152,19 @@
           <a:p>
             <a:r>
               <a:rPr lang="pt-BR" dirty="0" smtClean="0"/>
-              <a:t>2. </a:t>
-            </a:r>
-            <a:r>
-              <a:rPr lang="pt-BR" dirty="0"/>
-              <a:t>Instalar o </a:t>
-            </a:r>
-            <a:r>
-              <a:rPr lang="pt-BR" dirty="0" smtClean="0"/>
-              <a:t>SDK do </a:t>
-            </a:r>
-            <a:r>
-              <a:rPr lang="pt-BR" dirty="0" err="1" smtClean="0"/>
-              <a:t>Android</a:t>
+              <a:t>2.3. </a:t>
+            </a:r>
+            <a:r>
+              <a:rPr lang="pt-BR" dirty="0"/>
+              <a:t>Instalar </a:t>
+            </a:r>
+            <a:r>
+              <a:rPr lang="pt-BR" dirty="0"/>
+              <a:t>os </a:t>
+            </a:r>
+            <a:r>
+              <a:rPr lang="pt-BR" dirty="0" err="1"/>
+              <a:t>AVDs</a:t>
             </a:r>
             <a:endParaRPr lang="pt-BR" dirty="0"/>
           </a:p>
@@ -5227,99 +5187,63 @@
           </a:bodyPr>
           <a:lstStyle/>
           <a:p>
-            <a:r>
-              <a:rPr lang="pt-BR" dirty="0" smtClean="0"/>
-              <a:t>Por exemplo, para criar um dispositivo virtual com o nome </a:t>
-            </a:r>
-            <a:r>
-              <a:rPr lang="pt-BR" dirty="0" err="1" smtClean="0"/>
-              <a:t>Galaxy_Nexus</a:t>
-            </a:r>
-            <a:r>
-              <a:rPr lang="pt-BR" dirty="0"/>
-              <a:t> </a:t>
-            </a:r>
-            <a:r>
-              <a:rPr lang="pt-BR" dirty="0" smtClean="0"/>
-              <a:t>a partir da imagem instalada no passo anterior, basta executar o comando abaixo:</a:t>
-            </a:r>
-          </a:p>
-          <a:p>
-            <a:r>
-              <a:rPr lang="pt-BR" dirty="0" smtClean="0"/>
-              <a:t>C</a:t>
-            </a:r>
-            <a:r>
-              <a:rPr lang="pt-BR" dirty="0"/>
-              <a:t>:\android-sdk\tools\bin&gt;</a:t>
-            </a:r>
-            <a:r>
-              <a:rPr lang="pt-BR" b="1" i="1" dirty="0"/>
-              <a:t>avdmanager </a:t>
-            </a:r>
+            <a:pPr algn="l"/>
             <a:r>
               <a:rPr lang="pt-BR" b="1" i="1" dirty="0" err="1" smtClean="0"/>
-              <a:t>create</a:t>
-            </a:r>
+              <a:t>name</a:t>
+            </a:r>
+            <a:r>
+              <a:rPr lang="pt-BR" dirty="0" smtClean="0"/>
+              <a:t>: o nome que deseja para identificar o dispositivo virtual;</a:t>
+            </a:r>
+          </a:p>
+          <a:p>
+            <a:pPr algn="l"/>
             <a:r>
               <a:rPr lang="pt-BR" b="1" i="1" dirty="0" smtClean="0"/>
-              <a:t> </a:t>
-            </a:r>
-            <a:r>
-              <a:rPr lang="pt-BR" b="1" i="1" dirty="0" err="1"/>
-              <a:t>avd</a:t>
-            </a:r>
-            <a:r>
-              <a:rPr lang="pt-BR" b="1" i="1" dirty="0"/>
-              <a:t> </a:t>
+              <a:t>“</a:t>
             </a:r>
             <a:r>
               <a:rPr lang="pt-BR" b="1" i="1" dirty="0" smtClean="0"/>
-              <a:t>-n </a:t>
-            </a:r>
-            <a:r>
-              <a:rPr lang="pt-BR" b="1" i="1" dirty="0" err="1"/>
-              <a:t>Galaxy_Nexus</a:t>
-            </a:r>
-            <a:r>
-              <a:rPr lang="pt-BR" b="1" i="1" dirty="0"/>
-              <a:t> </a:t>
-            </a:r>
-            <a:r>
-              <a:rPr lang="pt-BR" b="1" i="1" dirty="0" smtClean="0"/>
-              <a:t>-k </a:t>
-            </a:r>
-            <a:r>
-              <a:rPr lang="pt-BR" b="1" i="1" dirty="0"/>
-              <a:t>“system-images;android-27;google_apis;x86</a:t>
-            </a:r>
-            <a:r>
-              <a:rPr lang="pt-BR" b="1" i="1" dirty="0" smtClean="0"/>
-              <a:t>”</a:t>
-            </a:r>
-            <a:r>
-              <a:rPr lang="pt-BR" b="1" i="1" dirty="0"/>
-              <a:t> -g </a:t>
-            </a:r>
-            <a:r>
-              <a:rPr lang="pt-BR" b="1" i="1" dirty="0" err="1"/>
+              <a:t>imagem”</a:t>
+            </a:r>
+            <a:r>
+              <a:rPr lang="pt-BR" dirty="0" smtClean="0"/>
+              <a:t>: o nome da imagem que será usada;</a:t>
+            </a:r>
+          </a:p>
+          <a:p>
+            <a:pPr algn="l"/>
+            <a:r>
+              <a:rPr lang="pt-BR" b="1" i="1" dirty="0" err="1" smtClean="0"/>
               <a:t>google_apis</a:t>
             </a:r>
             <a:r>
-              <a:rPr lang="pt-BR" b="1" i="1" dirty="0"/>
-              <a:t> </a:t>
-            </a:r>
-            <a:r>
-              <a:rPr lang="pt-BR" b="1" i="1" dirty="0" smtClean="0"/>
-              <a:t>-</a:t>
-            </a:r>
-            <a:r>
-              <a:rPr lang="pt-BR" b="1" i="1" dirty="0"/>
-              <a:t>d </a:t>
-            </a:r>
-            <a:r>
-              <a:rPr lang="pt-BR" b="1" i="1" dirty="0" smtClean="0"/>
-              <a:t>5</a:t>
+              <a:rPr lang="pt-BR" dirty="0"/>
+              <a:t>: indica o uso da API do Google para comunicação com o </a:t>
+            </a:r>
+            <a:r>
+              <a:rPr lang="pt-BR" i="1" dirty="0"/>
+              <a:t>Google Services</a:t>
+            </a:r>
+            <a:r>
+              <a:rPr lang="pt-BR" dirty="0"/>
+              <a:t> e integração com outros serviços</a:t>
+            </a:r>
+            <a:r>
+              <a:rPr lang="pt-BR" dirty="0" smtClean="0"/>
+              <a:t>; e</a:t>
+            </a:r>
+          </a:p>
+          <a:p>
+            <a:pPr algn="l"/>
+            <a:r>
+              <a:rPr lang="pt-BR" b="1" i="1" dirty="0" err="1" smtClean="0"/>
+              <a:t>id_definição</a:t>
+            </a:r>
+            <a:r>
+              <a:rPr lang="pt-BR" dirty="0" smtClean="0"/>
+              <a:t>: id da definição do dispositivo desejado.</a:t>
             </a:r>
           </a:p>
         </p:txBody>
@@ -5327,7 +5251,7 @@
     </p:spTree>
     <p:extLst>
       <p:ext uri="{BB962C8B-B14F-4D97-AF65-F5344CB8AC3E}">
-        <p14:creationId xmlns:p14="http://schemas.microsoft.com/office/powerpoint/2010/main" val="2245948239"/>
+        <p14:creationId xmlns:p14="http://schemas.microsoft.com/office/powerpoint/2010/main" val="697835615"/>
       </p:ext>
     </p:extLst>
   </p:cSld>
@@ -5422,15 +5346,7 @@
             </a:r>
             <a:r>
               <a:rPr lang="pt-BR" dirty="0" smtClean="0"/>
-              <a:t>3D </a:t>
-            </a:r>
-            <a:r>
-              <a:rPr lang="pt-BR" dirty="0" smtClean="0"/>
-              <a:t>2019.1.4f1 </a:t>
-            </a:r>
-            <a:r>
-              <a:rPr lang="pt-BR" dirty="0" smtClean="0"/>
-              <a:t>(64 bits) em dispositivos móveis com o sistema operacional </a:t>
+              <a:t>3D 2019.1.4f1 (64 bits) em dispositivos móveis com o sistema operacional </a:t>
             </a:r>
             <a:r>
               <a:rPr lang="pt-BR" dirty="0" err="1" smtClean="0"/>
@@ -5451,15 +5367,7 @@
             </a:br>
             <a:r>
               <a:rPr lang="pt-BR" dirty="0" smtClean="0"/>
-              <a:t>julho </a:t>
-            </a:r>
-            <a:r>
-              <a:rPr lang="pt-BR" dirty="0" smtClean="0"/>
-              <a:t>de </a:t>
-            </a:r>
-            <a:r>
-              <a:rPr lang="pt-BR" dirty="0" smtClean="0"/>
-              <a:t>2019.</a:t>
+              <a:t>julho de 2019.</a:t>
             </a:r>
             <a:endParaRPr lang="pt-BR" dirty="0"/>
           </a:p>
@@ -5520,20 +5428,20 @@
           <a:lstStyle/>
           <a:p>
             <a:r>
-              <a:rPr lang="pt-BR" dirty="0"/>
-              <a:t>3</a:t>
-            </a:r>
-            <a:r>
-              <a:rPr lang="pt-BR" dirty="0" smtClean="0"/>
-              <a:t>. </a:t>
-            </a:r>
-            <a:r>
-              <a:rPr lang="pt-BR" dirty="0"/>
-              <a:t>Emular um </a:t>
-            </a:r>
-            <a:r>
-              <a:rPr lang="pt-BR" dirty="0" smtClean="0"/>
-              <a:t>dispositivo móvel</a:t>
+              <a:rPr lang="pt-BR" dirty="0" smtClean="0"/>
+              <a:t>2.3. </a:t>
+            </a:r>
+            <a:r>
+              <a:rPr lang="pt-BR" dirty="0"/>
+              <a:t>Instalar </a:t>
+            </a:r>
+            <a:r>
+              <a:rPr lang="pt-BR" dirty="0"/>
+              <a:t>os </a:t>
+            </a:r>
+            <a:r>
+              <a:rPr lang="pt-BR" dirty="0" err="1"/>
+              <a:t>AVDs</a:t>
             </a:r>
             <a:endParaRPr lang="pt-BR" dirty="0"/>
           </a:p>
@@ -5558,105 +5466,105 @@
           <a:p>
             <a:r>
               <a:rPr lang="pt-BR" dirty="0" smtClean="0"/>
-              <a:t>Para emular um </a:t>
+              <a:t>Por exemplo, para criar um dispositivo virtual com o nome </a:t>
             </a:r>
             <a:r>
               <a:rPr lang="pt-BR" dirty="0" err="1" smtClean="0"/>
-              <a:t>avd</a:t>
-            </a:r>
-            <a:r>
-              <a:rPr lang="pt-BR" dirty="0" smtClean="0"/>
-              <a:t>, é necessário executar o aplicativo </a:t>
+              <a:t>Galaxy_Nexus</a:t>
+            </a:r>
+            <a:r>
+              <a:rPr lang="pt-BR" dirty="0"/>
+              <a:t> </a:t>
+            </a:r>
+            <a:r>
+              <a:rPr lang="pt-BR" dirty="0" smtClean="0"/>
+              <a:t>a partir da imagem instalada no passo anterior, basta executar o comando abaixo:</a:t>
+            </a:r>
+          </a:p>
+          <a:p>
+            <a:r>
+              <a:rPr lang="pt-BR" dirty="0" smtClean="0"/>
+              <a:t>C</a:t>
+            </a:r>
+            <a:r>
+              <a:rPr lang="pt-BR" dirty="0"/>
+              <a:t>:\android-sdk\tools\bin&gt;</a:t>
+            </a:r>
+            <a:r>
+              <a:rPr lang="pt-BR" b="1" i="1" dirty="0"/>
+              <a:t>avdmanager </a:t>
             </a:r>
             <a:r>
               <a:rPr lang="pt-BR" b="1" i="1" dirty="0" err="1" smtClean="0"/>
-              <a:t>emulator</a:t>
-            </a:r>
-            <a:r>
-              <a:rPr lang="pt-BR" dirty="0" smtClean="0"/>
-              <a:t> que está no diretório </a:t>
-            </a:r>
-            <a:r>
-              <a:rPr lang="pt-BR" dirty="0" err="1" smtClean="0"/>
-              <a:t>emulator</a:t>
-            </a:r>
-            <a:r>
-              <a:rPr lang="pt-BR" dirty="0" smtClean="0"/>
-              <a:t>:</a:t>
-            </a:r>
-          </a:p>
-          <a:p>
-            <a:r>
-              <a:rPr lang="pt-BR" dirty="0"/>
-              <a:t>C:\android-sdk\tools\bin&gt;</a:t>
-            </a:r>
-            <a:r>
-              <a:rPr lang="pt-BR" b="1" i="1" dirty="0" smtClean="0"/>
-              <a:t>cd ..\..</a:t>
-            </a:r>
-          </a:p>
-          <a:p>
-            <a:r>
-              <a:rPr lang="pt-BR" dirty="0"/>
-              <a:t>C:\</a:t>
-            </a:r>
-            <a:r>
-              <a:rPr lang="pt-BR" dirty="0" smtClean="0"/>
-              <a:t>android-sdk\&gt;</a:t>
-            </a:r>
-            <a:r>
-              <a:rPr lang="pt-BR" b="1" i="1" dirty="0" smtClean="0"/>
-              <a:t>cd </a:t>
-            </a:r>
-            <a:r>
-              <a:rPr lang="pt-BR" b="1" i="1" dirty="0" err="1" smtClean="0"/>
-              <a:t>emulator</a:t>
-            </a:r>
-            <a:endParaRPr lang="pt-BR" b="1" i="1" dirty="0" smtClean="0"/>
-          </a:p>
-          <a:p>
-            <a:r>
-              <a:rPr lang="pt-BR" dirty="0" smtClean="0"/>
-              <a:t>O comando abaixo emula um </a:t>
-            </a:r>
-            <a:r>
-              <a:rPr lang="pt-BR" dirty="0" err="1" smtClean="0"/>
-              <a:t>avd</a:t>
-            </a:r>
-            <a:r>
-              <a:rPr lang="pt-BR" dirty="0" smtClean="0"/>
-              <a:t> disponível:</a:t>
-            </a:r>
-          </a:p>
-          <a:p>
-            <a:r>
-              <a:rPr lang="pt-BR" b="1" i="1" dirty="0" err="1" smtClean="0"/>
-              <a:t>emulator</a:t>
-            </a:r>
-            <a:r>
-              <a:rPr lang="pt-BR" b="1" i="1" dirty="0" smtClean="0"/>
-              <a:t> -</a:t>
-            </a:r>
-            <a:r>
-              <a:rPr lang="pt-BR" b="1" i="1" dirty="0" err="1" smtClean="0"/>
-              <a:t>avd</a:t>
+              <a:t>create</a:t>
             </a:r>
             <a:r>
               <a:rPr lang="pt-BR" b="1" i="1" dirty="0" smtClean="0"/>
               <a:t> </a:t>
             </a:r>
             <a:r>
-              <a:rPr lang="pt-BR" b="1" i="1" dirty="0" err="1" smtClean="0"/>
-              <a:t>avd_name</a:t>
-            </a:r>
-            <a:endParaRPr lang="pt-BR" b="1" i="1" dirty="0" smtClean="0"/>
+              <a:rPr lang="pt-BR" b="1" i="1" dirty="0" err="1"/>
+              <a:t>avd</a:t>
+            </a:r>
+            <a:r>
+              <a:rPr lang="pt-BR" b="1" i="1" dirty="0"/>
+              <a:t> </a:t>
+            </a:r>
+            <a:r>
+              <a:rPr lang="pt-BR" b="1" i="1" dirty="0" smtClean="0"/>
+              <a:t>-n </a:t>
+            </a:r>
+            <a:r>
+              <a:rPr lang="pt-BR" b="1" i="1" dirty="0" err="1"/>
+              <a:t>Galaxy_Nexus</a:t>
+            </a:r>
+            <a:r>
+              <a:rPr lang="pt-BR" b="1" i="1" dirty="0"/>
+              <a:t> </a:t>
+            </a:r>
+            <a:r>
+              <a:rPr lang="pt-BR" b="1" i="1" dirty="0" smtClean="0"/>
+              <a:t>-k </a:t>
+            </a:r>
+            <a:r>
+              <a:rPr lang="pt-BR" b="1" i="1" dirty="0"/>
+              <a:t>“system-images;android-27;google_apis;x86</a:t>
+            </a:r>
+            <a:r>
+              <a:rPr lang="pt-BR" b="1" i="1" dirty="0" smtClean="0"/>
+              <a:t>”</a:t>
+            </a:r>
+            <a:r>
+              <a:rPr lang="pt-BR" b="1" i="1" dirty="0"/>
+              <a:t> -g </a:t>
+            </a:r>
+            <a:r>
+              <a:rPr lang="pt-BR" b="1" i="1" dirty="0" err="1"/>
+              <a:t>google_apis</a:t>
+            </a:r>
+            <a:r>
+              <a:rPr lang="pt-BR" b="1" i="1" dirty="0"/>
+              <a:t> </a:t>
+            </a:r>
+            <a:r>
+              <a:rPr lang="pt-BR" b="1" i="1" dirty="0" smtClean="0"/>
+              <a:t>-</a:t>
+            </a:r>
+            <a:r>
+              <a:rPr lang="pt-BR" b="1" i="1" dirty="0"/>
+              <a:t>d </a:t>
+            </a:r>
+            <a:r>
+              <a:rPr lang="pt-BR" b="1" i="1" dirty="0" smtClean="0"/>
+              <a:t>5</a:t>
+            </a:r>
           </a:p>
         </p:txBody>
       </p:sp>
     </p:spTree>
     <p:extLst>
       <p:ext uri="{BB962C8B-B14F-4D97-AF65-F5344CB8AC3E}">
-        <p14:creationId xmlns:p14="http://schemas.microsoft.com/office/powerpoint/2010/main" val="1865462072"/>
+        <p14:creationId xmlns:p14="http://schemas.microsoft.com/office/powerpoint/2010/main" val="2245948239"/>
       </p:ext>
     </p:extLst>
   </p:cSld>
@@ -5746,7 +5654,7 @@
           <a:p>
             <a:r>
               <a:rPr lang="pt-BR" dirty="0" smtClean="0"/>
-              <a:t>Para emular o </a:t>
+              <a:t>Para emular um </a:t>
             </a:r>
             <a:r>
               <a:rPr lang="pt-BR" dirty="0" err="1" smtClean="0"/>
@@ -5754,25 +5662,76 @@
             </a:r>
             <a:r>
               <a:rPr lang="pt-BR" dirty="0" smtClean="0"/>
-              <a:t> criado no passo anterior, execute o comando abaixo:</a:t>
-            </a:r>
-          </a:p>
-          <a:p>
-            <a:r>
-              <a:rPr lang="pt-BR" dirty="0" smtClean="0"/>
-              <a:t>C</a:t>
-            </a:r>
-            <a:r>
-              <a:rPr lang="pt-BR" dirty="0"/>
-              <a:t>:\</a:t>
-            </a:r>
-            <a:r>
-              <a:rPr lang="pt-BR" dirty="0" smtClean="0"/>
-              <a:t>android-sdk\emulator&gt;</a:t>
+              <a:t>, é necessário executar o aplicativo </a:t>
+            </a:r>
+            <a:r>
+              <a:rPr lang="pt-BR" b="1" i="1" dirty="0" err="1" smtClean="0"/>
+              <a:t>emulator</a:t>
+            </a:r>
+            <a:r>
+              <a:rPr lang="pt-BR" dirty="0" smtClean="0"/>
+              <a:t> que está no diretório </a:t>
+            </a:r>
+            <a:r>
+              <a:rPr lang="pt-BR" dirty="0" err="1" smtClean="0"/>
+              <a:t>emulator</a:t>
+            </a:r>
+            <a:r>
+              <a:rPr lang="pt-BR" dirty="0" smtClean="0"/>
+              <a:t>:</a:t>
+            </a:r>
+          </a:p>
+          <a:p>
+            <a:r>
+              <a:rPr lang="pt-BR" dirty="0"/>
+              <a:t>C:\android-sdk\tools\bin&gt;</a:t>
             </a:r>
             <a:r>
               <a:rPr lang="pt-BR" b="1" i="1" dirty="0" smtClean="0"/>
-              <a:t>emulator -</a:t>
+              <a:t>cd ..\..</a:t>
+            </a:r>
+          </a:p>
+          <a:p>
+            <a:r>
+              <a:rPr lang="pt-BR" dirty="0"/>
+              <a:t>C:\</a:t>
+            </a:r>
+            <a:r>
+              <a:rPr lang="pt-BR" dirty="0" smtClean="0"/>
+              <a:t>android-sdk\&gt;</a:t>
+            </a:r>
+            <a:r>
+              <a:rPr lang="pt-BR" b="1" i="1" dirty="0" smtClean="0"/>
+              <a:t>cd </a:t>
+            </a:r>
+            <a:r>
+              <a:rPr lang="pt-BR" b="1" i="1" dirty="0" err="1" smtClean="0"/>
+              <a:t>emulator</a:t>
+            </a:r>
+            <a:endParaRPr lang="pt-BR" b="1" i="1" dirty="0" smtClean="0"/>
+          </a:p>
+          <a:p>
+            <a:r>
+              <a:rPr lang="pt-BR" dirty="0" smtClean="0"/>
+              <a:t>O comando abaixo emula um </a:t>
+            </a:r>
+            <a:r>
+              <a:rPr lang="pt-BR" dirty="0" err="1" smtClean="0"/>
+              <a:t>avd</a:t>
+            </a:r>
+            <a:r>
+              <a:rPr lang="pt-BR" dirty="0" smtClean="0"/>
+              <a:t> disponível:</a:t>
+            </a:r>
+          </a:p>
+          <a:p>
+            <a:r>
+              <a:rPr lang="pt-BR" b="1" i="1" dirty="0" err="1" smtClean="0"/>
+              <a:t>emulator</a:t>
+            </a:r>
+            <a:r>
+              <a:rPr lang="pt-BR" b="1" i="1" dirty="0" smtClean="0"/>
+              <a:t> -</a:t>
             </a:r>
             <a:r>
               <a:rPr lang="pt-BR" b="1" i="1" dirty="0" err="1" smtClean="0"/>
@@ -5784,25 +5743,16 @@
             </a:r>
             <a:r>
               <a:rPr lang="pt-BR" b="1" i="1" dirty="0" err="1" smtClean="0"/>
-              <a:t>Galaxy_Nexus</a:t>
+              <a:t>avd_name</a:t>
             </a:r>
             <a:endParaRPr lang="pt-BR" b="1" i="1" dirty="0" smtClean="0"/>
-          </a:p>
-          <a:p>
-            <a:endParaRPr lang="pt-BR" dirty="0"/>
-          </a:p>
-          <a:p>
-            <a:r>
-              <a:rPr lang="pt-BR" dirty="0" smtClean="0"/>
-              <a:t>Possíveis problemas ...</a:t>
-            </a:r>
           </a:p>
         </p:txBody>
       </p:sp>
     </p:spTree>
     <p:extLst>
       <p:ext uri="{BB962C8B-B14F-4D97-AF65-F5344CB8AC3E}">
-        <p14:creationId xmlns:p14="http://schemas.microsoft.com/office/powerpoint/2010/main" val="2462839328"/>
+        <p14:creationId xmlns:p14="http://schemas.microsoft.com/office/powerpoint/2010/main" val="1865462072"/>
       </p:ext>
     </p:extLst>
   </p:cSld>
@@ -5892,76 +5842,63 @@
           <a:p>
             <a:r>
               <a:rPr lang="pt-BR" dirty="0" smtClean="0"/>
-              <a:t>Se o emulador não abrir </a:t>
-            </a:r>
-            <a:r>
-              <a:rPr lang="pt-BR" dirty="0"/>
-              <a:t>e o </a:t>
-            </a:r>
-            <a:r>
-              <a:rPr lang="pt-BR" dirty="0" err="1"/>
-              <a:t>Prompt</a:t>
-            </a:r>
-            <a:r>
-              <a:rPr lang="pt-BR" dirty="0"/>
-              <a:t> de </a:t>
-            </a:r>
-            <a:r>
-              <a:rPr lang="pt-BR" dirty="0" smtClean="0"/>
-              <a:t>Comandos exibir a seguinte mensagem:</a:t>
-            </a:r>
-          </a:p>
-          <a:p>
-            <a:pPr marL="914400" lvl="2" indent="0">
-              <a:buNone/>
-            </a:pPr>
-            <a:r>
-              <a:rPr lang="en-US" sz="2400" i="1" dirty="0"/>
-              <a:t>PANIC: Cannot find AVD system path. Please define ANDROID_SDK_ROOT</a:t>
-            </a:r>
-            <a:endParaRPr lang="pt-BR" sz="2400" i="1" dirty="0" smtClean="0"/>
-          </a:p>
-          <a:p>
-            <a:r>
-              <a:rPr lang="pt-BR" dirty="0" smtClean="0"/>
-              <a:t>verifique se os </a:t>
-            </a:r>
-            <a:r>
-              <a:rPr lang="pt-BR" dirty="0" smtClean="0">
-                <a:hlinkClick r:id="rId2" action="ppaction://hlinksldjump"/>
-              </a:rPr>
-              <a:t>pacotes obrigatórios</a:t>
-            </a:r>
-            <a:r>
-              <a:rPr lang="pt-BR" dirty="0" smtClean="0"/>
-              <a:t> foram instalados por meio do aplicativo </a:t>
+              <a:t>Para emular o </a:t>
             </a:r>
             <a:r>
               <a:rPr lang="pt-BR" dirty="0" err="1" smtClean="0"/>
-              <a:t>sdkmanager</a:t>
-            </a:r>
-            <a:r>
-              <a:rPr lang="pt-BR" dirty="0" smtClean="0"/>
-              <a:t>. </a:t>
-            </a:r>
-            <a:r>
-              <a:rPr lang="pt-BR" dirty="0" smtClean="0">
-                <a:hlinkClick r:id="rId3" action="ppaction://hlinksldjump"/>
-              </a:rPr>
-              <a:t>Instale os pacotes</a:t>
-            </a:r>
-            <a:r>
-              <a:rPr lang="pt-BR" dirty="0" smtClean="0"/>
-              <a:t> que estiverem faltando e tente emular o dispositivo novamente.</a:t>
+              <a:t>avd</a:t>
+            </a:r>
+            <a:r>
+              <a:rPr lang="pt-BR" dirty="0" smtClean="0"/>
+              <a:t> criado no passo anterior, execute o comando abaixo:</a:t>
+            </a:r>
+          </a:p>
+          <a:p>
+            <a:r>
+              <a:rPr lang="pt-BR" dirty="0" smtClean="0"/>
+              <a:t>C</a:t>
+            </a:r>
+            <a:r>
+              <a:rPr lang="pt-BR" dirty="0"/>
+              <a:t>:\</a:t>
+            </a:r>
+            <a:r>
+              <a:rPr lang="pt-BR" dirty="0" smtClean="0"/>
+              <a:t>android-sdk\emulator&gt;</a:t>
+            </a:r>
+            <a:r>
+              <a:rPr lang="pt-BR" b="1" i="1" dirty="0" smtClean="0"/>
+              <a:t>emulator -</a:t>
+            </a:r>
+            <a:r>
+              <a:rPr lang="pt-BR" b="1" i="1" dirty="0" err="1" smtClean="0"/>
+              <a:t>avd</a:t>
+            </a:r>
+            <a:r>
+              <a:rPr lang="pt-BR" b="1" i="1" dirty="0" smtClean="0"/>
+              <a:t> </a:t>
+            </a:r>
+            <a:r>
+              <a:rPr lang="pt-BR" b="1" i="1" dirty="0" err="1" smtClean="0"/>
+              <a:t>Galaxy_Nexus</a:t>
             </a:r>
             <a:endParaRPr lang="pt-BR" b="1" i="1" dirty="0" smtClean="0"/>
+          </a:p>
+          <a:p>
+            <a:endParaRPr lang="pt-BR" dirty="0"/>
+          </a:p>
+          <a:p>
+            <a:r>
+              <a:rPr lang="pt-BR" dirty="0" smtClean="0"/>
+              <a:t>Possíveis problemas ...</a:t>
+            </a:r>
           </a:p>
         </p:txBody>
       </p:sp>
     </p:spTree>
     <p:extLst>
       <p:ext uri="{BB962C8B-B14F-4D97-AF65-F5344CB8AC3E}">
-        <p14:creationId xmlns:p14="http://schemas.microsoft.com/office/powerpoint/2010/main" val="155332983"/>
+        <p14:creationId xmlns:p14="http://schemas.microsoft.com/office/powerpoint/2010/main" val="2462839328"/>
       </p:ext>
     </p:extLst>
   </p:cSld>
@@ -6042,12 +5979,7 @@
             <p:ph idx="1"/>
           </p:nvPr>
         </p:nvSpPr>
-        <p:spPr>
-          <a:xfrm>
-            <a:off x="317694" y="1291051"/>
-            <a:ext cx="11705493" cy="5254127"/>
-          </a:xfrm>
-        </p:spPr>
+        <p:spPr/>
         <p:txBody>
           <a:bodyPr>
             <a:normAutofit/>
@@ -6072,7 +6004,7 @@
             </a:r>
             <a:r>
               <a:rPr lang="pt-BR" dirty="0" smtClean="0"/>
-              <a:t>Comandos exibir uma mensagem semelhante a esta:</a:t>
+              <a:t>Comandos exibir a seguinte mensagem:</a:t>
             </a:r>
           </a:p>
           <a:p>
@@ -6081,78 +6013,42 @@
             </a:pPr>
             <a:r>
               <a:rPr lang="en-US" sz="2400" i="1" dirty="0"/>
-              <a:t>emulator: WARNING: Crash service did not </a:t>
-            </a:r>
-            <a:r>
-              <a:rPr lang="en-US" sz="2400" i="1" dirty="0" smtClean="0"/>
-              <a:t>start</a:t>
-            </a:r>
-            <a:br>
-              <a:rPr lang="en-US" sz="2400" i="1" dirty="0" smtClean="0"/>
-            </a:br>
-            <a:r>
-              <a:rPr lang="en-US" sz="2400" i="1" dirty="0" smtClean="0"/>
-              <a:t>emulator</a:t>
-            </a:r>
-            <a:r>
-              <a:rPr lang="en-US" sz="2400" i="1" dirty="0"/>
-              <a:t>: ERROR: x86 emulation currently requires hardware </a:t>
-            </a:r>
-            <a:r>
-              <a:rPr lang="en-US" sz="2400" i="1" dirty="0" smtClean="0"/>
-              <a:t>acceleration!</a:t>
-            </a:r>
-            <a:br>
-              <a:rPr lang="en-US" sz="2400" i="1" dirty="0" smtClean="0"/>
-            </a:br>
-            <a:r>
-              <a:rPr lang="en-US" sz="2400" i="1" dirty="0" smtClean="0"/>
-              <a:t>Please </a:t>
-            </a:r>
-            <a:r>
-              <a:rPr lang="en-US" sz="2400" i="1" dirty="0"/>
-              <a:t>ensure Windows Hypervisor Platform (WHPX) is properly installed and </a:t>
-            </a:r>
-            <a:r>
-              <a:rPr lang="en-US" sz="2400" i="1" dirty="0" smtClean="0"/>
-              <a:t>usable.</a:t>
-            </a:r>
-            <a:br>
-              <a:rPr lang="en-US" sz="2400" i="1" dirty="0" smtClean="0"/>
-            </a:br>
-            <a:r>
-              <a:rPr lang="en-US" sz="2400" i="1" dirty="0" smtClean="0"/>
-              <a:t>CPU </a:t>
-            </a:r>
-            <a:r>
-              <a:rPr lang="en-US" sz="2400" i="1" dirty="0"/>
-              <a:t>acceleration status: HAXM is not installed on this </a:t>
-            </a:r>
-            <a:r>
-              <a:rPr lang="en-US" sz="2400" i="1" dirty="0" smtClean="0"/>
-              <a:t>machine</a:t>
-            </a:r>
-          </a:p>
-          <a:p>
-            <a:r>
-              <a:rPr lang="pt-BR" dirty="0" smtClean="0"/>
-              <a:t>o software Hardware </a:t>
+              <a:t>PANIC: Cannot find AVD system path. Please define ANDROID_SDK_ROOT</a:t>
+            </a:r>
+            <a:endParaRPr lang="pt-BR" sz="2400" i="1" dirty="0" smtClean="0"/>
+          </a:p>
+          <a:p>
+            <a:r>
+              <a:rPr lang="pt-BR" dirty="0" smtClean="0"/>
+              <a:t>verifique se os </a:t>
+            </a:r>
+            <a:r>
+              <a:rPr lang="pt-BR" dirty="0" smtClean="0">
+                <a:hlinkClick r:id="rId2" action="ppaction://hlinksldjump"/>
+              </a:rPr>
+              <a:t>pacotes obrigatórios</a:t>
+            </a:r>
+            <a:r>
+              <a:rPr lang="pt-BR" dirty="0" smtClean="0"/>
+              <a:t> foram instalados por meio do aplicativo </a:t>
             </a:r>
             <a:r>
               <a:rPr lang="pt-BR" dirty="0" err="1" smtClean="0"/>
-              <a:t>Accelerated</a:t>
-            </a:r>
-            <a:r>
-              <a:rPr lang="pt-BR" dirty="0" smtClean="0"/>
-              <a:t> </a:t>
-            </a:r>
-            <a:r>
-              <a:rPr lang="pt-BR" dirty="0" err="1" smtClean="0"/>
-              <a:t>Execution</a:t>
-            </a:r>
-            <a:r>
-              <a:rPr lang="pt-BR" dirty="0" smtClean="0"/>
-              <a:t> Manager (HAXM) não foi instalado</a:t>
+              <a:t>sdkmanager</a:t>
+            </a:r>
+            <a:r>
+              <a:rPr lang="pt-BR" dirty="0" smtClean="0"/>
+              <a:t>. </a:t>
+            </a:r>
+            <a:r>
+              <a:rPr lang="pt-BR" dirty="0" smtClean="0">
+                <a:hlinkClick r:id="rId3" action="ppaction://hlinksldjump"/>
+              </a:rPr>
+              <a:t>Instale os pacotes</a:t>
+            </a:r>
+            <a:r>
+              <a:rPr lang="pt-BR" dirty="0" smtClean="0"/>
+              <a:t> que estiverem faltando e tente emular o dispositivo novamente.</a:t>
             </a:r>
             <a:endParaRPr lang="pt-BR" b="1" i="1" dirty="0" smtClean="0"/>
           </a:p>
@@ -6161,7 +6057,7 @@
     </p:spTree>
     <p:extLst>
       <p:ext uri="{BB962C8B-B14F-4D97-AF65-F5344CB8AC3E}">
-        <p14:creationId xmlns:p14="http://schemas.microsoft.com/office/powerpoint/2010/main" val="3464435962"/>
+        <p14:creationId xmlns:p14="http://schemas.microsoft.com/office/powerpoint/2010/main" val="155332983"/>
       </p:ext>
     </p:extLst>
   </p:cSld>
@@ -6256,6 +6152,206 @@
           <a:p>
             <a:r>
               <a:rPr lang="pt-BR" dirty="0" smtClean="0"/>
+              <a:t>Se o emulador não abrir </a:t>
+            </a:r>
+            <a:r>
+              <a:rPr lang="pt-BR" dirty="0"/>
+              <a:t>e o </a:t>
+            </a:r>
+            <a:r>
+              <a:rPr lang="pt-BR" dirty="0" err="1"/>
+              <a:t>Prompt</a:t>
+            </a:r>
+            <a:r>
+              <a:rPr lang="pt-BR" dirty="0"/>
+              <a:t> de </a:t>
+            </a:r>
+            <a:r>
+              <a:rPr lang="pt-BR" dirty="0" smtClean="0"/>
+              <a:t>Comandos exibir uma mensagem semelhante a esta:</a:t>
+            </a:r>
+          </a:p>
+          <a:p>
+            <a:pPr marL="914400" lvl="2" indent="0">
+              <a:buNone/>
+            </a:pPr>
+            <a:r>
+              <a:rPr lang="en-US" sz="2400" i="1" dirty="0"/>
+              <a:t>emulator: WARNING: Crash service did not </a:t>
+            </a:r>
+            <a:r>
+              <a:rPr lang="en-US" sz="2400" i="1" dirty="0" smtClean="0"/>
+              <a:t>start</a:t>
+            </a:r>
+            <a:br>
+              <a:rPr lang="en-US" sz="2400" i="1" dirty="0" smtClean="0"/>
+            </a:br>
+            <a:r>
+              <a:rPr lang="en-US" sz="2400" i="1" dirty="0" smtClean="0"/>
+              <a:t>emulator</a:t>
+            </a:r>
+            <a:r>
+              <a:rPr lang="en-US" sz="2400" i="1" dirty="0"/>
+              <a:t>: ERROR: x86 emulation currently requires hardware </a:t>
+            </a:r>
+            <a:r>
+              <a:rPr lang="en-US" sz="2400" i="1" dirty="0" smtClean="0"/>
+              <a:t>acceleration!</a:t>
+            </a:r>
+            <a:br>
+              <a:rPr lang="en-US" sz="2400" i="1" dirty="0" smtClean="0"/>
+            </a:br>
+            <a:r>
+              <a:rPr lang="en-US" sz="2400" i="1" dirty="0" smtClean="0"/>
+              <a:t>Please </a:t>
+            </a:r>
+            <a:r>
+              <a:rPr lang="en-US" sz="2400" i="1" dirty="0"/>
+              <a:t>ensure Windows Hypervisor Platform (WHPX) is properly installed and </a:t>
+            </a:r>
+            <a:r>
+              <a:rPr lang="en-US" sz="2400" i="1" dirty="0" smtClean="0"/>
+              <a:t>usable.</a:t>
+            </a:r>
+            <a:br>
+              <a:rPr lang="en-US" sz="2400" i="1" dirty="0" smtClean="0"/>
+            </a:br>
+            <a:r>
+              <a:rPr lang="en-US" sz="2400" i="1" dirty="0" smtClean="0"/>
+              <a:t>CPU </a:t>
+            </a:r>
+            <a:r>
+              <a:rPr lang="en-US" sz="2400" i="1" dirty="0"/>
+              <a:t>acceleration status: HAXM is not installed on this </a:t>
+            </a:r>
+            <a:r>
+              <a:rPr lang="en-US" sz="2400" i="1" dirty="0" smtClean="0"/>
+              <a:t>machine</a:t>
+            </a:r>
+          </a:p>
+          <a:p>
+            <a:r>
+              <a:rPr lang="pt-BR" dirty="0" smtClean="0"/>
+              <a:t>o software Hardware </a:t>
+            </a:r>
+            <a:r>
+              <a:rPr lang="pt-BR" dirty="0" err="1" smtClean="0"/>
+              <a:t>Accelerated</a:t>
+            </a:r>
+            <a:r>
+              <a:rPr lang="pt-BR" dirty="0" smtClean="0"/>
+              <a:t> </a:t>
+            </a:r>
+            <a:r>
+              <a:rPr lang="pt-BR" dirty="0" err="1" smtClean="0"/>
+              <a:t>Execution</a:t>
+            </a:r>
+            <a:r>
+              <a:rPr lang="pt-BR" dirty="0" smtClean="0"/>
+              <a:t> Manager (HAXM) não foi instalado</a:t>
+            </a:r>
+            <a:endParaRPr lang="pt-BR" b="1" i="1" dirty="0" smtClean="0"/>
+          </a:p>
+        </p:txBody>
+      </p:sp>
+    </p:spTree>
+    <p:extLst>
+      <p:ext uri="{BB962C8B-B14F-4D97-AF65-F5344CB8AC3E}">
+        <p14:creationId xmlns:p14="http://schemas.microsoft.com/office/powerpoint/2010/main" val="3464435962"/>
+      </p:ext>
+    </p:extLst>
+  </p:cSld>
+  <p:clrMapOvr>
+    <a:masterClrMapping/>
+  </p:clrMapOvr>
+  <p:timing>
+    <p:tnLst>
+      <p:par>
+        <p:cTn id="1" dur="indefinite" restart="never" nodeType="tmRoot"/>
+      </p:par>
+    </p:tnLst>
+  </p:timing>
+</p:sld>
+</file>
+
+<file path=ppt/slides/slide25.xml><?xml version="1.0" encoding="utf-8"?>
+<p:sld xmlns:a="http://schemas.openxmlformats.org/drawingml/2006/main" xmlns:r="http://schemas.openxmlformats.org/officeDocument/2006/relationships" xmlns:p="http://schemas.openxmlformats.org/presentationml/2006/main">
+  <p:cSld>
+    <p:spTree>
+      <p:nvGrpSpPr>
+        <p:cNvPr id="1" name=""/>
+        <p:cNvGrpSpPr/>
+        <p:nvPr/>
+      </p:nvGrpSpPr>
+      <p:grpSpPr>
+        <a:xfrm>
+          <a:off x="0" y="0"/>
+          <a:ext cx="0" cy="0"/>
+          <a:chOff x="0" y="0"/>
+          <a:chExt cx="0" cy="0"/>
+        </a:xfrm>
+      </p:grpSpPr>
+      <p:sp>
+        <p:nvSpPr>
+          <p:cNvPr id="5" name="Título 4"/>
+          <p:cNvSpPr>
+            <a:spLocks noGrp="1"/>
+          </p:cNvSpPr>
+          <p:nvPr>
+            <p:ph type="title"/>
+          </p:nvPr>
+        </p:nvSpPr>
+        <p:spPr/>
+        <p:txBody>
+          <a:bodyPr>
+            <a:normAutofit/>
+          </a:bodyPr>
+          <a:lstStyle/>
+          <a:p>
+            <a:r>
+              <a:rPr lang="pt-BR" dirty="0"/>
+              <a:t>3</a:t>
+            </a:r>
+            <a:r>
+              <a:rPr lang="pt-BR" dirty="0" smtClean="0"/>
+              <a:t>. </a:t>
+            </a:r>
+            <a:r>
+              <a:rPr lang="pt-BR" dirty="0"/>
+              <a:t>Emular um </a:t>
+            </a:r>
+            <a:r>
+              <a:rPr lang="pt-BR" dirty="0" smtClean="0"/>
+              <a:t>dispositivo móvel</a:t>
+            </a:r>
+            <a:endParaRPr lang="pt-BR" dirty="0"/>
+          </a:p>
+        </p:txBody>
+      </p:sp>
+      <p:sp>
+        <p:nvSpPr>
+          <p:cNvPr id="6" name="Espaço Reservado para Conteúdo 5"/>
+          <p:cNvSpPr>
+            <a:spLocks noGrp="1"/>
+          </p:cNvSpPr>
+          <p:nvPr>
+            <p:ph idx="1"/>
+          </p:nvPr>
+        </p:nvSpPr>
+        <p:spPr>
+          <a:xfrm>
+            <a:off x="317694" y="1291051"/>
+            <a:ext cx="11705493" cy="5254127"/>
+          </a:xfrm>
+        </p:spPr>
+        <p:txBody>
+          <a:bodyPr>
+            <a:normAutofit/>
+          </a:bodyPr>
+          <a:lstStyle/>
+          <a:p>
+            <a:r>
+              <a:rPr lang="pt-BR" dirty="0" smtClean="0"/>
               <a:t>O comando </a:t>
             </a:r>
             <a:r>
@@ -6346,7 +6442,7 @@
 </p:sld>
 </file>
 
-<file path=ppt/slides/slide25.xml><?xml version="1.0" encoding="utf-8"?>
+<file path=ppt/slides/slide26.xml><?xml version="1.0" encoding="utf-8"?>
 <p:sld xmlns:a="http://schemas.openxmlformats.org/drawingml/2006/main" xmlns:r="http://schemas.openxmlformats.org/officeDocument/2006/relationships" xmlns:p="http://schemas.openxmlformats.org/presentationml/2006/main">
   <p:cSld>
     <p:spTree>
@@ -6524,7 +6620,7 @@
 </p:sld>
 </file>
 
-<file path=ppt/slides/slide26.xml><?xml version="1.0" encoding="utf-8"?>
+<file path=ppt/slides/slide27.xml><?xml version="1.0" encoding="utf-8"?>
 <p:sld xmlns:a="http://schemas.openxmlformats.org/drawingml/2006/main" xmlns:r="http://schemas.openxmlformats.org/officeDocument/2006/relationships" xmlns:p="http://schemas.openxmlformats.org/presentationml/2006/main">
   <p:cSld>
     <p:spTree>
@@ -6657,181 +6753,6 @@
 </p:sld>
 </file>
 
-<file path=ppt/slides/slide27.xml><?xml version="1.0" encoding="utf-8"?>
-<p:sld xmlns:a="http://schemas.openxmlformats.org/drawingml/2006/main" xmlns:r="http://schemas.openxmlformats.org/officeDocument/2006/relationships" xmlns:p="http://schemas.openxmlformats.org/presentationml/2006/main">
-  <p:cSld>
-    <p:spTree>
-      <p:nvGrpSpPr>
-        <p:cNvPr id="1" name=""/>
-        <p:cNvGrpSpPr/>
-        <p:nvPr/>
-      </p:nvGrpSpPr>
-      <p:grpSpPr>
-        <a:xfrm>
-          <a:off x="0" y="0"/>
-          <a:ext cx="0" cy="0"/>
-          <a:chOff x="0" y="0"/>
-          <a:chExt cx="0" cy="0"/>
-        </a:xfrm>
-      </p:grpSpPr>
-      <p:sp>
-        <p:nvSpPr>
-          <p:cNvPr id="5" name="Título 4"/>
-          <p:cNvSpPr>
-            <a:spLocks noGrp="1"/>
-          </p:cNvSpPr>
-          <p:nvPr>
-            <p:ph type="title"/>
-          </p:nvPr>
-        </p:nvSpPr>
-        <p:spPr/>
-        <p:txBody>
-          <a:bodyPr>
-            <a:normAutofit/>
-          </a:bodyPr>
-          <a:lstStyle/>
-          <a:p>
-            <a:r>
-              <a:rPr lang="pt-BR" dirty="0"/>
-              <a:t>3</a:t>
-            </a:r>
-            <a:r>
-              <a:rPr lang="pt-BR" dirty="0" smtClean="0"/>
-              <a:t>. </a:t>
-            </a:r>
-            <a:r>
-              <a:rPr lang="pt-BR" dirty="0"/>
-              <a:t>Emular um </a:t>
-            </a:r>
-            <a:r>
-              <a:rPr lang="pt-BR" dirty="0" smtClean="0"/>
-              <a:t>dispositivo móvel</a:t>
-            </a:r>
-            <a:endParaRPr lang="pt-BR" dirty="0"/>
-          </a:p>
-        </p:txBody>
-      </p:sp>
-      <p:sp>
-        <p:nvSpPr>
-          <p:cNvPr id="6" name="Espaço Reservado para Conteúdo 5"/>
-          <p:cNvSpPr>
-            <a:spLocks noGrp="1"/>
-          </p:cNvSpPr>
-          <p:nvPr>
-            <p:ph idx="1"/>
-          </p:nvPr>
-        </p:nvSpPr>
-        <p:spPr>
-          <a:xfrm>
-            <a:off x="317694" y="1291051"/>
-            <a:ext cx="11705493" cy="5254127"/>
-          </a:xfrm>
-        </p:spPr>
-        <p:txBody>
-          <a:bodyPr>
-            <a:normAutofit/>
-          </a:bodyPr>
-          <a:lstStyle/>
-          <a:p>
-            <a:r>
-              <a:rPr lang="pt-BR" dirty="0" smtClean="0"/>
-              <a:t>O dispositivo virtual </a:t>
-            </a:r>
-            <a:r>
-              <a:rPr lang="pt-BR" dirty="0" err="1" smtClean="0"/>
-              <a:t>android</a:t>
-            </a:r>
-            <a:r>
-              <a:rPr lang="pt-BR" dirty="0" smtClean="0"/>
-              <a:t> pode ser emulado em diferentes resoluções usando o parâmetro </a:t>
-            </a:r>
-            <a:r>
-              <a:rPr lang="pt-BR" b="1" i="1" dirty="0" smtClean="0"/>
-              <a:t>-</a:t>
-            </a:r>
-            <a:r>
-              <a:rPr lang="pt-BR" b="1" i="1" dirty="0" err="1" smtClean="0"/>
-              <a:t>skin</a:t>
-            </a:r>
-            <a:r>
-              <a:rPr lang="pt-BR" b="1" i="1" dirty="0" smtClean="0"/>
-              <a:t> </a:t>
-            </a:r>
-            <a:r>
-              <a:rPr lang="pt-BR" b="1" i="1" dirty="0" err="1" smtClean="0"/>
-              <a:t>LarguraxAltura</a:t>
-            </a:r>
-            <a:r>
-              <a:rPr lang="pt-BR" dirty="0" smtClean="0"/>
-              <a:t>.</a:t>
-            </a:r>
-          </a:p>
-          <a:p>
-            <a:r>
-              <a:rPr lang="pt-BR" dirty="0" smtClean="0"/>
-              <a:t>Por exemplo:</a:t>
-            </a:r>
-          </a:p>
-          <a:p>
-            <a:r>
-              <a:rPr lang="pt-BR" dirty="0"/>
-              <a:t>C:\android-sdk\emulator&gt;</a:t>
-            </a:r>
-            <a:r>
-              <a:rPr lang="pt-BR" b="1" i="1" dirty="0"/>
-              <a:t>emulator -</a:t>
-            </a:r>
-            <a:r>
-              <a:rPr lang="pt-BR" b="1" i="1" dirty="0" err="1"/>
-              <a:t>avd</a:t>
-            </a:r>
-            <a:r>
-              <a:rPr lang="pt-BR" b="1" i="1" dirty="0"/>
-              <a:t> </a:t>
-            </a:r>
-            <a:r>
-              <a:rPr lang="pt-BR" b="1" i="1" dirty="0" err="1" smtClean="0"/>
-              <a:t>Galaxy_Nexus</a:t>
-            </a:r>
-            <a:r>
-              <a:rPr lang="pt-BR" b="1" i="1" dirty="0" smtClean="0"/>
-              <a:t> -</a:t>
-            </a:r>
-            <a:r>
-              <a:rPr lang="pt-BR" b="1" i="1" dirty="0" err="1" smtClean="0"/>
-              <a:t>skin</a:t>
-            </a:r>
-            <a:r>
-              <a:rPr lang="pt-BR" b="1" i="1" dirty="0" smtClean="0"/>
-              <a:t> 768x1280</a:t>
-            </a:r>
-            <a:endParaRPr lang="pt-BR" b="1" i="1" dirty="0"/>
-          </a:p>
-          <a:p>
-            <a:endParaRPr lang="pt-BR" dirty="0" smtClean="0"/>
-          </a:p>
-        </p:txBody>
-      </p:sp>
-    </p:spTree>
-    <p:extLst>
-      <p:ext uri="{BB962C8B-B14F-4D97-AF65-F5344CB8AC3E}">
-        <p14:creationId xmlns:p14="http://schemas.microsoft.com/office/powerpoint/2010/main" val="636510755"/>
-      </p:ext>
-    </p:extLst>
-  </p:cSld>
-  <p:clrMapOvr>
-    <a:masterClrMapping/>
-  </p:clrMapOvr>
-  <p:timing>
-    <p:tnLst>
-      <p:par>
-        <p:cTn id="1" dur="indefinite" restart="never" nodeType="tmRoot"/>
-      </p:par>
-    </p:tnLst>
-  </p:timing>
-</p:sld>
-</file>
-
 <file path=ppt/slides/slide28.xml><?xml version="1.0" encoding="utf-8"?>
 <p:sld xmlns:a="http://schemas.openxmlformats.org/drawingml/2006/main" xmlns:r="http://schemas.openxmlformats.org/officeDocument/2006/relationships" xmlns:p="http://schemas.openxmlformats.org/presentationml/2006/main">
   <p:cSld>
@@ -6867,13 +6788,22 @@
           <a:lstStyle/>
           <a:p>
             <a:r>
-              <a:rPr lang="pt-BR" dirty="0" smtClean="0"/>
-              <a:t>4. </a:t>
-            </a:r>
-            <a:r>
-              <a:rPr lang="pt-BR" dirty="0"/>
-              <a:t>Gerar o arquivo APK do jogo</a:t>
-            </a:r>
+              <a:rPr lang="pt-BR" dirty="0"/>
+              <a:t>3</a:t>
+            </a:r>
+            <a:r>
+              <a:rPr lang="pt-BR" dirty="0" smtClean="0"/>
+              <a:t>. </a:t>
+            </a:r>
+            <a:r>
+              <a:rPr lang="pt-BR" dirty="0"/>
+              <a:t>Emular um </a:t>
+            </a:r>
+            <a:r>
+              <a:rPr lang="pt-BR" dirty="0" smtClean="0"/>
+              <a:t>dispositivo móvel</a:t>
+            </a:r>
+            <a:endParaRPr lang="pt-BR" dirty="0"/>
           </a:p>
         </p:txBody>
       </p:sp>
@@ -6901,80 +6831,87 @@
           <a:p>
             <a:r>
               <a:rPr lang="pt-BR" dirty="0" smtClean="0"/>
-              <a:t>É importante que seu </a:t>
+              <a:t>O dispositivo virtual </a:t>
             </a:r>
             <a:r>
               <a:rPr lang="pt-BR" dirty="0" err="1" smtClean="0"/>
-              <a:t>Unity</a:t>
-            </a:r>
-            <a:r>
-              <a:rPr lang="pt-BR" dirty="0" smtClean="0"/>
+              <a:t>android</a:t>
+            </a:r>
+            <a:r>
+              <a:rPr lang="pt-BR" dirty="0" smtClean="0"/>
+              <a:t> pode ser emulado em diferentes resoluções usando o parâmetro </a:t>
+            </a:r>
+            <a:r>
+              <a:rPr lang="pt-BR" b="1" i="1" dirty="0" smtClean="0"/>
+              <a:t>-</a:t>
+            </a:r>
+            <a:r>
+              <a:rPr lang="pt-BR" b="1" i="1" dirty="0" err="1" smtClean="0"/>
+              <a:t>skin</a:t>
+            </a:r>
+            <a:r>
+              <a:rPr lang="pt-BR" b="1" i="1" dirty="0" smtClean="0"/>
               <a:t> </a:t>
             </a:r>
             <a:r>
-              <a:rPr lang="pt-BR" dirty="0"/>
-              <a:t>3D </a:t>
-            </a:r>
-            <a:r>
-              <a:rPr lang="pt-BR" dirty="0" smtClean="0"/>
-              <a:t>esteja com o componente </a:t>
-            </a:r>
-            <a:r>
               <a:rPr lang="pt-BR" b="1" i="1" dirty="0" err="1" smtClean="0"/>
-              <a:t>Android</a:t>
+              <a:t>LarguraxAltura</a:t>
+            </a:r>
+            <a:r>
+              <a:rPr lang="pt-BR" dirty="0" smtClean="0"/>
+              <a:t>.</a:t>
+            </a:r>
+          </a:p>
+          <a:p>
+            <a:r>
+              <a:rPr lang="pt-BR" dirty="0" smtClean="0"/>
+              <a:t>Por exemplo:</a:t>
+            </a:r>
+          </a:p>
+          <a:p>
+            <a:r>
+              <a:rPr lang="pt-BR" dirty="0"/>
+              <a:t>C:\android-sdk\emulator&gt;</a:t>
+            </a:r>
+            <a:r>
+              <a:rPr lang="pt-BR" b="1" i="1" dirty="0"/>
+              <a:t>emulator -</a:t>
+            </a:r>
+            <a:r>
+              <a:rPr lang="pt-BR" b="1" i="1" dirty="0" err="1"/>
+              <a:t>avd</a:t>
+            </a:r>
+            <a:r>
+              <a:rPr lang="pt-BR" b="1" i="1" dirty="0"/>
+              <a:t> </a:t>
+            </a:r>
+            <a:r>
+              <a:rPr lang="pt-BR" b="1" i="1" dirty="0" err="1" smtClean="0"/>
+              <a:t>Galaxy_Nexus</a:t>
             </a:r>
             <a:r>
               <a:rPr lang="pt-BR" b="1" i="1" dirty="0" smtClean="0"/>
-              <a:t> Build </a:t>
+              <a:t> -</a:t>
             </a:r>
             <a:r>
               <a:rPr lang="pt-BR" b="1" i="1" dirty="0" err="1" smtClean="0"/>
-              <a:t>Support</a:t>
-            </a:r>
-            <a:r>
-              <a:rPr lang="pt-BR" dirty="0" smtClean="0"/>
-              <a:t> instalado. Caso o ele não tenha sido instalado, basta executar o instalador do </a:t>
-            </a:r>
-            <a:r>
-              <a:rPr lang="pt-BR" dirty="0" err="1" smtClean="0"/>
-              <a:t>Unity</a:t>
-            </a:r>
-            <a:r>
-              <a:rPr lang="pt-BR" dirty="0" smtClean="0"/>
-              <a:t> novamente para instalar componentes adicionais.</a:t>
+              <a:t>skin</a:t>
+            </a:r>
+            <a:r>
+              <a:rPr lang="pt-BR" b="1" i="1" dirty="0" smtClean="0"/>
+              <a:t> 768x1280</a:t>
             </a:r>
             <a:endParaRPr lang="pt-BR" b="1" i="1" dirty="0"/>
           </a:p>
-        </p:txBody>
-      </p:sp>
-      <p:pic>
-        <p:nvPicPr>
-          <p:cNvPr id="4" name="Espaço Reservado para Conteúdo 1"/>
-          <p:cNvPicPr>
-            <a:picLocks noChangeAspect="1"/>
-          </p:cNvPicPr>
-          <p:nvPr/>
-        </p:nvPicPr>
-        <p:blipFill>
-          <a:blip r:embed="rId2"/>
-          <a:stretch>
-            <a:fillRect/>
-          </a:stretch>
-        </p:blipFill>
-        <p:spPr>
-          <a:xfrm>
-            <a:off x="4134583" y="3355306"/>
-            <a:ext cx="3922834" cy="3050220"/>
-          </a:xfrm>
-          <a:prstGeom prst="rect">
-            <a:avLst/>
-          </a:prstGeom>
-        </p:spPr>
-      </p:pic>
+          <a:p>
+            <a:endParaRPr lang="pt-BR" dirty="0" smtClean="0"/>
+          </a:p>
+        </p:txBody>
+      </p:sp>
     </p:spTree>
     <p:extLst>
       <p:ext uri="{BB962C8B-B14F-4D97-AF65-F5344CB8AC3E}">
-        <p14:creationId xmlns:p14="http://schemas.microsoft.com/office/powerpoint/2010/main" val="1485963244"/>
+        <p14:creationId xmlns:p14="http://schemas.microsoft.com/office/powerpoint/2010/main" val="636510755"/>
       </p:ext>
     </p:extLst>
   </p:cSld>
@@ -7072,7 +7009,11 @@
             </a:r>
             <a:r>
               <a:rPr lang="pt-BR" dirty="0"/>
-              <a:t>3D e </a:t>
+              <a:t>3D </a:t>
+            </a:r>
+            <a:r>
+              <a:rPr lang="pt-BR" dirty="0" smtClean="0"/>
+              <a:t>e, se necessário, </a:t>
             </a:r>
             <a:r>
               <a:rPr lang="pt-BR" dirty="0" smtClean="0"/>
@@ -7083,20 +7024,28 @@
               <a:t>Android</a:t>
             </a:r>
             <a:r>
-              <a:rPr lang="pt-BR" dirty="0" smtClean="0"/>
-              <a:t> e do JDK do Java na caixa </a:t>
+              <a:rPr lang="pt-BR" dirty="0"/>
+              <a:t>,</a:t>
+            </a:r>
+            <a:r>
+              <a:rPr lang="pt-BR" dirty="0" smtClean="0"/>
+              <a:t> </a:t>
+            </a:r>
+            <a:r>
+              <a:rPr lang="pt-BR" dirty="0" smtClean="0"/>
+              <a:t>do JDK do </a:t>
+            </a:r>
+            <a:r>
+              <a:rPr lang="pt-BR" dirty="0" smtClean="0"/>
+              <a:t>Java e do NDK </a:t>
+            </a:r>
+            <a:r>
+              <a:rPr lang="pt-BR" dirty="0" smtClean="0"/>
+              <a:t>na caixa </a:t>
             </a:r>
             <a:r>
               <a:rPr lang="pt-BR" dirty="0"/>
               <a:t>de diálogo </a:t>
-            </a:r>
-            <a:r>
-              <a:rPr lang="pt-BR" b="1" i="1" dirty="0" err="1" smtClean="0"/>
-              <a:t>Unity</a:t>
-            </a:r>
-            <a:r>
-              <a:rPr lang="pt-BR" b="1" i="1" dirty="0" smtClean="0"/>
-              <a:t> </a:t>
             </a:r>
             <a:r>
               <a:rPr lang="pt-BR" b="1" i="1" dirty="0" err="1" smtClean="0"/>
@@ -7104,7 +7053,7 @@
             </a:r>
             <a:r>
               <a:rPr lang="pt-BR" dirty="0" smtClean="0"/>
-              <a:t>, </a:t>
+              <a:t> </a:t>
             </a:r>
             <a:r>
               <a:rPr lang="pt-BR" dirty="0"/>
@@ -7236,18 +7185,19 @@
               <a:rPr lang="pt-BR" dirty="0" smtClean="0">
                 <a:hlinkClick r:id="rId3" action="ppaction://hlinksldjump"/>
               </a:rPr>
-              <a:t>Instalar o SDK do </a:t>
+              <a:t>Instalar o </a:t>
             </a:r>
             <a:r>
               <a:rPr lang="pt-BR" dirty="0" err="1" smtClean="0">
                 <a:hlinkClick r:id="rId3" action="ppaction://hlinksldjump"/>
               </a:rPr>
-              <a:t>Android</a:t>
+              <a:t>sdkmanager</a:t>
             </a:r>
             <a:r>
               <a:rPr lang="pt-BR" dirty="0" smtClean="0"/>
               <a:t>;</a:t>
             </a:r>
+            <a:endParaRPr lang="pt-BR" dirty="0" smtClean="0"/>
           </a:p>
           <a:p>
             <a:pPr marL="514350" indent="-514350" algn="l">
@@ -7430,8 +7380,12 @@
               <a:t>SDK</a:t>
             </a:r>
             <a:r>
-              <a:rPr lang="pt-BR" dirty="0" smtClean="0"/>
-              <a:t> e </a:t>
+              <a:rPr lang="pt-BR" dirty="0"/>
+              <a:t>,</a:t>
+            </a:r>
+            <a:r>
+              <a:rPr lang="pt-BR" dirty="0" smtClean="0"/>
+              <a:t> </a:t>
             </a:r>
             <a:r>
               <a:rPr lang="pt-BR" b="1" i="1" dirty="0" smtClean="0"/>
@@ -7439,36 +7393,34 @@
             </a:r>
             <a:r>
               <a:rPr lang="pt-BR" dirty="0" smtClean="0"/>
+              <a:t> e </a:t>
+            </a:r>
+            <a:r>
+              <a:rPr lang="pt-BR" b="1" i="1" dirty="0" smtClean="0"/>
+              <a:t>NDK</a:t>
+            </a:r>
+            <a:r>
+              <a:rPr lang="pt-BR" dirty="0" smtClean="0"/>
+              <a:t>, se necessário.</a:t>
+            </a:r>
+          </a:p>
+          <a:p>
+            <a:r>
+              <a:rPr lang="pt-BR" dirty="0" smtClean="0"/>
+              <a:t>É recomendável usar as versões instaladas pelo </a:t>
+            </a:r>
+            <a:r>
+              <a:rPr lang="pt-BR" dirty="0" err="1" smtClean="0"/>
+              <a:t>Unity</a:t>
+            </a:r>
+            <a:r>
+              <a:rPr lang="pt-BR" dirty="0" smtClean="0"/>
               <a:t>.</a:t>
             </a:r>
-            <a:endParaRPr lang="pt-BR" b="1" i="1" dirty="0"/>
-          </a:p>
-        </p:txBody>
-      </p:sp>
-      <p:pic>
-        <p:nvPicPr>
-          <p:cNvPr id="3" name="Imagem 2"/>
-          <p:cNvPicPr>
-            <a:picLocks noChangeAspect="1"/>
-          </p:cNvPicPr>
-          <p:nvPr/>
-        </p:nvPicPr>
-        <p:blipFill>
-          <a:blip r:embed="rId2"/>
-          <a:stretch>
-            <a:fillRect/>
-          </a:stretch>
-        </p:blipFill>
-        <p:spPr>
-          <a:xfrm>
-            <a:off x="3671136" y="2499310"/>
-            <a:ext cx="4849729" cy="3870802"/>
-          </a:xfrm>
-          <a:prstGeom prst="rect">
-            <a:avLst/>
-          </a:prstGeom>
-        </p:spPr>
-      </p:pic>
+            <a:endParaRPr lang="pt-BR" dirty="0"/>
+          </a:p>
+        </p:txBody>
+      </p:sp>
     </p:spTree>
     <p:extLst>
       <p:ext uri="{BB962C8B-B14F-4D97-AF65-F5344CB8AC3E}">
@@ -7534,77 +7486,34 @@
           </a:p>
         </p:txBody>
       </p:sp>
-      <p:sp>
-        <p:nvSpPr>
-          <p:cNvPr id="6" name="Espaço Reservado para Conteúdo 5"/>
-          <p:cNvSpPr>
-            <a:spLocks noGrp="1"/>
-          </p:cNvSpPr>
-          <p:nvPr>
-            <p:ph idx="1"/>
-          </p:nvPr>
-        </p:nvSpPr>
+      <p:pic>
+        <p:nvPicPr>
+          <p:cNvPr id="2" name="Imagem 1"/>
+          <p:cNvPicPr>
+            <a:picLocks noChangeAspect="1"/>
+          </p:cNvPicPr>
+          <p:nvPr/>
+        </p:nvPicPr>
+        <p:blipFill>
+          <a:blip r:embed="rId2"/>
+          <a:stretch>
+            <a:fillRect/>
+          </a:stretch>
+        </p:blipFill>
         <p:spPr>
           <a:xfrm>
-            <a:off x="317694" y="1291051"/>
-            <a:ext cx="11705493" cy="5254127"/>
+            <a:off x="3269446" y="1291051"/>
+            <a:ext cx="5653109" cy="4932768"/>
           </a:xfrm>
+          <a:prstGeom prst="rect">
+            <a:avLst/>
+          </a:prstGeom>
         </p:spPr>
-        <p:txBody>
-          <a:bodyPr>
-            <a:normAutofit/>
-          </a:bodyPr>
-          <a:lstStyle/>
-          <a:p>
-            <a:r>
-              <a:rPr lang="pt-BR" dirty="0"/>
-              <a:t>Abra o projeto do seu jogo </a:t>
-            </a:r>
-            <a:r>
-              <a:rPr lang="pt-BR" dirty="0" smtClean="0"/>
-              <a:t>e </a:t>
-            </a:r>
-            <a:r>
-              <a:rPr lang="pt-BR" dirty="0"/>
-              <a:t>abra a caixa de diálogo </a:t>
-            </a:r>
-            <a:r>
-              <a:rPr lang="pt-BR" b="1" i="1" dirty="0"/>
-              <a:t>Build Settings</a:t>
-            </a:r>
-            <a:r>
-              <a:rPr lang="pt-BR" dirty="0"/>
-              <a:t>, seguindo o caminho abaixo:</a:t>
-            </a:r>
-          </a:p>
-          <a:p>
-            <a:endParaRPr lang="pt-BR" dirty="0"/>
-          </a:p>
-          <a:p>
-            <a:r>
-              <a:rPr lang="pt-BR" b="1" i="1" dirty="0"/>
-              <a:t>File</a:t>
-            </a:r>
-            <a:r>
-              <a:rPr lang="pt-BR" dirty="0"/>
-              <a:t> &gt;&gt; </a:t>
-            </a:r>
-            <a:r>
-              <a:rPr lang="pt-BR" b="1" i="1" dirty="0"/>
-              <a:t>Build </a:t>
-            </a:r>
-            <a:r>
-              <a:rPr lang="pt-BR" b="1" i="1" dirty="0" smtClean="0"/>
-              <a:t>Settings</a:t>
-            </a:r>
-            <a:endParaRPr lang="pt-BR" b="1" i="1" dirty="0"/>
-          </a:p>
-        </p:txBody>
-      </p:sp>
+      </p:pic>
     </p:spTree>
     <p:extLst>
       <p:ext uri="{BB962C8B-B14F-4D97-AF65-F5344CB8AC3E}">
-        <p14:creationId xmlns:p14="http://schemas.microsoft.com/office/powerpoint/2010/main" val="633825324"/>
+        <p14:creationId xmlns:p14="http://schemas.microsoft.com/office/powerpoint/2010/main" val="3393688842"/>
       </p:ext>
     </p:extLst>
   </p:cSld>
@@ -7640,6 +7549,138 @@
       </p:grpSpPr>
       <p:sp>
         <p:nvSpPr>
+          <p:cNvPr id="5" name="Título 4"/>
+          <p:cNvSpPr>
+            <a:spLocks noGrp="1"/>
+          </p:cNvSpPr>
+          <p:nvPr>
+            <p:ph type="title"/>
+          </p:nvPr>
+        </p:nvSpPr>
+        <p:spPr/>
+        <p:txBody>
+          <a:bodyPr>
+            <a:normAutofit/>
+          </a:bodyPr>
+          <a:lstStyle/>
+          <a:p>
+            <a:r>
+              <a:rPr lang="pt-BR" dirty="0" smtClean="0"/>
+              <a:t>4. </a:t>
+            </a:r>
+            <a:r>
+              <a:rPr lang="pt-BR" dirty="0"/>
+              <a:t>Gerar o arquivo APK do jogo</a:t>
+            </a:r>
+          </a:p>
+        </p:txBody>
+      </p:sp>
+      <p:sp>
+        <p:nvSpPr>
+          <p:cNvPr id="6" name="Espaço Reservado para Conteúdo 5"/>
+          <p:cNvSpPr>
+            <a:spLocks noGrp="1"/>
+          </p:cNvSpPr>
+          <p:nvPr>
+            <p:ph idx="1"/>
+          </p:nvPr>
+        </p:nvSpPr>
+        <p:spPr>
+          <a:xfrm>
+            <a:off x="317694" y="1291051"/>
+            <a:ext cx="11705493" cy="5254127"/>
+          </a:xfrm>
+        </p:spPr>
+        <p:txBody>
+          <a:bodyPr>
+            <a:normAutofit/>
+          </a:bodyPr>
+          <a:lstStyle/>
+          <a:p>
+            <a:r>
+              <a:rPr lang="pt-BR" dirty="0"/>
+              <a:t>Abra o projeto do seu jogo </a:t>
+            </a:r>
+            <a:r>
+              <a:rPr lang="pt-BR" dirty="0" smtClean="0"/>
+              <a:t>e </a:t>
+            </a:r>
+            <a:r>
+              <a:rPr lang="pt-BR" dirty="0"/>
+              <a:t>abra a caixa de diálogo </a:t>
+            </a:r>
+            <a:r>
+              <a:rPr lang="pt-BR" b="1" i="1" dirty="0"/>
+              <a:t>Build Settings</a:t>
+            </a:r>
+            <a:r>
+              <a:rPr lang="pt-BR" dirty="0"/>
+              <a:t>, seguindo o caminho abaixo:</a:t>
+            </a:r>
+          </a:p>
+          <a:p>
+            <a:endParaRPr lang="pt-BR" dirty="0"/>
+          </a:p>
+          <a:p>
+            <a:r>
+              <a:rPr lang="pt-BR" b="1" i="1" dirty="0"/>
+              <a:t>File</a:t>
+            </a:r>
+            <a:r>
+              <a:rPr lang="pt-BR" dirty="0"/>
+              <a:t> &gt;&gt; </a:t>
+            </a:r>
+            <a:r>
+              <a:rPr lang="pt-BR" b="1" i="1" dirty="0"/>
+              <a:t>Build </a:t>
+            </a:r>
+            <a:r>
+              <a:rPr lang="pt-BR" b="1" i="1" dirty="0" smtClean="0"/>
+              <a:t>Settings</a:t>
+            </a:r>
+            <a:endParaRPr lang="pt-BR" b="1" i="1" dirty="0"/>
+          </a:p>
+        </p:txBody>
+      </p:sp>
+    </p:spTree>
+    <p:extLst>
+      <p:ext uri="{BB962C8B-B14F-4D97-AF65-F5344CB8AC3E}">
+        <p14:creationId xmlns:p14="http://schemas.microsoft.com/office/powerpoint/2010/main" val="633825324"/>
+      </p:ext>
+    </p:extLst>
+  </p:cSld>
+  <p:clrMapOvr>
+    <a:masterClrMapping/>
+  </p:clrMapOvr>
+  <p:timing>
+    <p:tnLst>
+      <p:par>
+        <p:cTn id="1" dur="indefinite" restart="never" nodeType="tmRoot"/>
+      </p:par>
+    </p:tnLst>
+  </p:timing>
+</p:sld>
+</file>
+
+<file path=ppt/slides/slide33.xml><?xml version="1.0" encoding="utf-8"?>
+<p:sld xmlns:a="http://schemas.openxmlformats.org/drawingml/2006/main" xmlns:r="http://schemas.openxmlformats.org/officeDocument/2006/relationships" xmlns:p="http://schemas.openxmlformats.org/presentationml/2006/main">
+  <p:cSld>
+    <p:spTree>
+      <p:nvGrpSpPr>
+        <p:cNvPr id="1" name=""/>
+        <p:cNvGrpSpPr/>
+        <p:nvPr/>
+      </p:nvGrpSpPr>
+      <p:grpSpPr>
+        <a:xfrm>
+          <a:off x="0" y="0"/>
+          <a:ext cx="0" cy="0"/>
+          <a:chOff x="0" y="0"/>
+          <a:chExt cx="0" cy="0"/>
+        </a:xfrm>
+      </p:grpSpPr>
+      <p:sp>
+        <p:nvSpPr>
           <p:cNvPr id="12" name="Content Placeholder 11">
             <a:extLst>
               <a:ext uri="{FF2B5EF4-FFF2-40B4-BE49-F238E27FC236}">
@@ -7875,7 +7916,7 @@
       </p:sp>
       <p:pic>
         <p:nvPicPr>
-          <p:cNvPr id="3" name="Imagem 2"/>
+          <p:cNvPr id="2" name="Imagem 1"/>
           <p:cNvPicPr>
             <a:picLocks noChangeAspect="1"/>
           </p:cNvPicPr>
@@ -7889,8 +7930,8 @@
         </p:blipFill>
         <p:spPr>
           <a:xfrm>
-            <a:off x="6919073" y="1825625"/>
-            <a:ext cx="4229775" cy="4102210"/>
+            <a:off x="6836565" y="1825624"/>
+            <a:ext cx="4230824" cy="4103228"/>
           </a:xfrm>
           <a:prstGeom prst="rect">
             <a:avLst/>
@@ -7910,7 +7951,7 @@
 </p:sld>
 </file>
 
-<file path=ppt/slides/slide33.xml><?xml version="1.0" encoding="utf-8"?>
+<file path=ppt/slides/slide34.xml><?xml version="1.0" encoding="utf-8"?>
 <p:sld xmlns:a="http://schemas.openxmlformats.org/drawingml/2006/main" xmlns:r="http://schemas.openxmlformats.org/officeDocument/2006/relationships" xmlns:p="http://schemas.openxmlformats.org/presentationml/2006/main">
   <p:cSld>
     <p:spTree>
@@ -8168,7 +8209,7 @@
       </p:sp>
       <p:pic>
         <p:nvPicPr>
-          <p:cNvPr id="4" name="Imagem 3"/>
+          <p:cNvPr id="2" name="Imagem 1"/>
           <p:cNvPicPr>
             <a:picLocks noChangeAspect="1"/>
           </p:cNvPicPr>
@@ -8182,8 +8223,32 @@
         </p:blipFill>
         <p:spPr>
           <a:xfrm>
-            <a:off x="6919073" y="1825624"/>
-            <a:ext cx="4229776" cy="4102211"/>
+            <a:off x="6994423" y="1825624"/>
+            <a:ext cx="4214351" cy="4067649"/>
+          </a:xfrm>
+          <a:prstGeom prst="rect">
+            <a:avLst/>
+          </a:prstGeom>
+        </p:spPr>
+      </p:pic>
+      <p:pic>
+        <p:nvPicPr>
+          <p:cNvPr id="3" name="Imagem 2"/>
+          <p:cNvPicPr>
+            <a:picLocks noChangeAspect="1"/>
+          </p:cNvPicPr>
+          <p:nvPr/>
+        </p:nvPicPr>
+        <p:blipFill>
+          <a:blip r:embed="rId3"/>
+          <a:stretch>
+            <a:fillRect/>
+          </a:stretch>
+        </p:blipFill>
+        <p:spPr>
+          <a:xfrm>
+            <a:off x="10003524" y="4477549"/>
+            <a:ext cx="2188476" cy="587762"/>
           </a:xfrm>
           <a:prstGeom prst="rect">
             <a:avLst/>
@@ -8210,7 +8275,7 @@
 </p:sld>
 </file>
 
-<file path=ppt/slides/slide34.xml><?xml version="1.0" encoding="utf-8"?>
+<file path=ppt/slides/slide35.xml><?xml version="1.0" encoding="utf-8"?>
 <p:sld xmlns:a="http://schemas.openxmlformats.org/drawingml/2006/main" xmlns:r="http://schemas.openxmlformats.org/officeDocument/2006/relationships" xmlns:p="http://schemas.openxmlformats.org/presentationml/2006/main">
   <p:cSld>
     <p:spTree>
@@ -8251,7 +8316,7 @@
         </p:spPr>
         <p:txBody>
           <a:bodyPr>
-            <a:normAutofit lnSpcReduction="10000"/>
+            <a:normAutofit fontScale="92500" lnSpcReduction="20000"/>
           </a:bodyPr>
           <a:lstStyle/>
           <a:p>
@@ -8272,7 +8337,15 @@
             </a:r>
             <a:r>
               <a:rPr lang="en-US" b="1" i="1" dirty="0" smtClean="0"/>
-              <a:t>Inspector</a:t>
+              <a:t>Project Settings</a:t>
+            </a:r>
+            <a:r>
+              <a:rPr lang="en-US" dirty="0" smtClean="0"/>
+              <a:t>, item </a:t>
+            </a:r>
+            <a:r>
+              <a:rPr lang="en-US" b="1" i="1" dirty="0" smtClean="0"/>
+              <a:t>Player</a:t>
             </a:r>
             <a:r>
               <a:rPr lang="en-US" dirty="0" smtClean="0"/>
@@ -8371,8 +8444,33 @@
             </a:r>
             <a:r>
               <a:rPr lang="en-US" dirty="0" smtClean="0"/>
-              <a:t>).</a:t>
-            </a:r>
+              <a:t>) </a:t>
+            </a:r>
+            <a:r>
+              <a:rPr lang="en-US" dirty="0" err="1" smtClean="0"/>
+              <a:t>na</a:t>
+            </a:r>
+            <a:r>
+              <a:rPr lang="en-US" dirty="0" smtClean="0"/>
+              <a:t> </a:t>
+            </a:r>
+            <a:r>
+              <a:rPr lang="en-US" dirty="0" err="1" smtClean="0"/>
+              <a:t>seção</a:t>
+            </a:r>
+            <a:r>
+              <a:rPr lang="en-US" dirty="0" smtClean="0"/>
+              <a:t> </a:t>
+            </a:r>
+            <a:r>
+              <a:rPr lang="en-US" b="1" i="1" dirty="0" smtClean="0"/>
+              <a:t>Other Settings</a:t>
+            </a:r>
+            <a:r>
+              <a:rPr lang="en-US" dirty="0" smtClean="0"/>
+              <a:t>.</a:t>
+            </a:r>
+            <a:endParaRPr lang="en-US" dirty="0" smtClean="0"/>
           </a:p>
           <a:p>
             <a:pPr marL="0" indent="0">
@@ -8455,13 +8553,14 @@
               <a:t> </a:t>
             </a:r>
             <a:r>
-              <a:rPr lang="en-US" b="1" i="1" dirty="0"/>
-              <a:t>Build</a:t>
-            </a:r>
-            <a:r>
-              <a:rPr lang="en-US" dirty="0"/>
+              <a:rPr lang="en-US" b="1" i="1" dirty="0" smtClean="0"/>
+              <a:t>Build And Run</a:t>
+            </a:r>
+            <a:r>
+              <a:rPr lang="en-US" dirty="0" smtClean="0"/>
               <a:t>.</a:t>
             </a:r>
+            <a:endParaRPr lang="en-US" dirty="0"/>
           </a:p>
         </p:txBody>
       </p:sp>
@@ -8517,69 +8616,52 @@
           </a:p>
         </p:txBody>
       </p:sp>
-      <p:grpSp>
-        <p:nvGrpSpPr>
-          <p:cNvPr id="5" name="Agrupar 4"/>
-          <p:cNvGrpSpPr/>
+      <p:pic>
+        <p:nvPicPr>
+          <p:cNvPr id="7" name="Imagem 6"/>
+          <p:cNvPicPr>
+            <a:picLocks noChangeAspect="1"/>
+          </p:cNvPicPr>
           <p:nvPr/>
-        </p:nvGrpSpPr>
-        <p:grpSpPr>
+        </p:nvPicPr>
+        <p:blipFill rotWithShape="1">
+          <a:blip r:embed="rId2"/>
+          <a:srcRect b="72429"/>
+          <a:stretch/>
+        </p:blipFill>
+        <p:spPr>
           <a:xfrm>
             <a:off x="7090611" y="1825624"/>
-            <a:ext cx="4058237" cy="3406346"/>
-            <a:chOff x="7977023" y="1825624"/>
-            <a:chExt cx="3171825" cy="2662322"/>
+            <a:ext cx="4979589" cy="1387476"/>
           </a:xfrm>
-        </p:grpSpPr>
-        <p:pic>
-          <p:nvPicPr>
-            <p:cNvPr id="2" name="Imagem 1"/>
-            <p:cNvPicPr>
-              <a:picLocks noChangeAspect="1"/>
-            </p:cNvPicPr>
-            <p:nvPr/>
-          </p:nvPicPr>
-          <p:blipFill>
-            <a:blip r:embed="rId2"/>
-            <a:stretch>
-              <a:fillRect/>
-            </a:stretch>
-          </p:blipFill>
-          <p:spPr>
-            <a:xfrm>
-              <a:off x="7977023" y="1825624"/>
-              <a:ext cx="3171825" cy="1038225"/>
-            </a:xfrm>
-            <a:prstGeom prst="rect">
-              <a:avLst/>
-            </a:prstGeom>
-          </p:spPr>
-        </p:pic>
-        <p:pic>
-          <p:nvPicPr>
-            <p:cNvPr id="4" name="Imagem 3"/>
-            <p:cNvPicPr>
-              <a:picLocks noChangeAspect="1"/>
-            </p:cNvPicPr>
-            <p:nvPr/>
-          </p:nvPicPr>
-          <p:blipFill>
-            <a:blip r:embed="rId3"/>
-            <a:stretch>
-              <a:fillRect/>
-            </a:stretch>
-          </p:blipFill>
-          <p:spPr>
-            <a:xfrm>
-              <a:off x="7977023" y="3276348"/>
-              <a:ext cx="3171825" cy="1211598"/>
-            </a:xfrm>
-            <a:prstGeom prst="rect">
-              <a:avLst/>
-            </a:prstGeom>
-          </p:spPr>
-        </p:pic>
-      </p:grpSp>
+          <a:prstGeom prst="rect">
+            <a:avLst/>
+          </a:prstGeom>
+        </p:spPr>
+      </p:pic>
+      <p:pic>
+        <p:nvPicPr>
+          <p:cNvPr id="8" name="Imagem 7"/>
+          <p:cNvPicPr>
+            <a:picLocks noChangeAspect="1"/>
+          </p:cNvPicPr>
+          <p:nvPr/>
+        </p:nvPicPr>
+        <p:blipFill rotWithShape="1">
+          <a:blip r:embed="rId3"/>
+          <a:srcRect b="69944"/>
+          <a:stretch/>
+        </p:blipFill>
+        <p:spPr>
+          <a:xfrm>
+            <a:off x="7090611" y="3681774"/>
+            <a:ext cx="4979589" cy="1512526"/>
+          </a:xfrm>
+          <a:prstGeom prst="rect">
+            <a:avLst/>
+          </a:prstGeom>
+        </p:spPr>
+      </p:pic>
     </p:spTree>
     <p:extLst>
       <p:ext uri="{BB962C8B-B14F-4D97-AF65-F5344CB8AC3E}">
@@ -8600,7 +8682,7 @@
 </p:sld>
 </file>
 
-<file path=ppt/slides/slide35.xml><?xml version="1.0" encoding="utf-8"?>
+<file path=ppt/slides/slide36.xml><?xml version="1.0" encoding="utf-8"?>
 <p:sld xmlns:a="http://schemas.openxmlformats.org/drawingml/2006/main" xmlns:r="http://schemas.openxmlformats.org/officeDocument/2006/relationships" xmlns:p="http://schemas.openxmlformats.org/presentationml/2006/main">
   <p:cSld>
     <p:spTree>
@@ -8770,7 +8852,7 @@
 </p:sld>
 </file>
 
-<file path=ppt/slides/slide36.xml><?xml version="1.0" encoding="utf-8"?>
+<file path=ppt/slides/slide37.xml><?xml version="1.0" encoding="utf-8"?>
 <p:sld xmlns:a="http://schemas.openxmlformats.org/drawingml/2006/main" xmlns:r="http://schemas.openxmlformats.org/officeDocument/2006/relationships" xmlns:p="http://schemas.openxmlformats.org/presentationml/2006/main">
   <p:cSld>
     <p:spTree>
@@ -8845,13 +8927,7 @@
               <a:rPr lang="pt-BR">
                 <a:hlinkClick r:id="rId2"/>
               </a:rPr>
-              <a:t>https</a:t>
-            </a:r>
-            <a:r>
-              <a:rPr lang="pt-BR">
-                <a:hlinkClick r:id="rId2"/>
-              </a:rPr>
-              <a:t>://</a:t>
+              <a:t>https://</a:t>
             </a:r>
             <a:r>
               <a:rPr lang="pt-BR" smtClean="0">
@@ -9008,72 +9084,8 @@
           <a:lstStyle/>
           <a:p>
             <a:r>
-              <a:rPr lang="pt-BR" dirty="0"/>
-              <a:t>Você pode </a:t>
-            </a:r>
-            <a:r>
-              <a:rPr lang="pt-BR" dirty="0" smtClean="0"/>
-              <a:t>verificar </a:t>
-            </a:r>
-            <a:r>
-              <a:rPr lang="pt-BR" dirty="0"/>
-              <a:t>qual </a:t>
-            </a:r>
-            <a:r>
-              <a:rPr lang="pt-BR" dirty="0" smtClean="0"/>
-              <a:t>é a versão </a:t>
-            </a:r>
-            <a:r>
-              <a:rPr lang="pt-BR" dirty="0"/>
-              <a:t>do JDK </a:t>
-            </a:r>
-            <a:r>
-              <a:rPr lang="pt-BR" dirty="0" smtClean="0"/>
-              <a:t>instalada, </a:t>
-            </a:r>
-            <a:r>
-              <a:rPr lang="pt-BR" dirty="0"/>
-              <a:t>digitando </a:t>
-            </a:r>
-            <a:r>
-              <a:rPr lang="pt-BR" b="1" i="1" dirty="0" err="1"/>
-              <a:t>java</a:t>
-            </a:r>
-            <a:r>
-              <a:rPr lang="pt-BR" b="1" i="1" dirty="0"/>
-              <a:t> -</a:t>
-            </a:r>
-            <a:r>
-              <a:rPr lang="pt-BR" b="1" i="1" dirty="0" err="1"/>
-              <a:t>version</a:t>
-            </a:r>
-            <a:r>
-              <a:rPr lang="pt-BR" dirty="0"/>
-              <a:t> </a:t>
-            </a:r>
-            <a:r>
-              <a:rPr lang="pt-BR" dirty="0" smtClean="0"/>
-              <a:t>no </a:t>
-            </a:r>
-            <a:r>
-              <a:rPr lang="pt-BR" dirty="0" err="1" smtClean="0"/>
-              <a:t>Prompt</a:t>
-            </a:r>
-            <a:r>
-              <a:rPr lang="pt-BR" dirty="0" smtClean="0"/>
-              <a:t> de Comando.</a:t>
-            </a:r>
-          </a:p>
-          <a:p>
-            <a:endParaRPr lang="pt-BR" dirty="0"/>
-          </a:p>
-          <a:p>
-            <a:endParaRPr lang="pt-BR" dirty="0" smtClean="0"/>
-          </a:p>
-          <a:p>
-            <a:r>
-              <a:rPr lang="pt-BR" dirty="0" smtClean="0"/>
-              <a:t>A versão recomendada é a Java 8. As versões mais novas apresentam problemas com a versão atual do SDK </a:t>
+              <a:rPr lang="pt-BR" dirty="0" smtClean="0"/>
+              <a:t>Para emular um jogo em um dispositivo móvel </a:t>
             </a:r>
             <a:r>
               <a:rPr lang="pt-BR" dirty="0" err="1" smtClean="0"/>
@@ -9081,59 +9093,146 @@
             </a:r>
             <a:r>
               <a:rPr lang="pt-BR" dirty="0" smtClean="0"/>
-              <a:t>. </a:t>
-            </a:r>
-            <a:r>
-              <a:rPr lang="pt-BR" dirty="0"/>
-              <a:t>Se a versão instalada for </a:t>
-            </a:r>
-            <a:r>
-              <a:rPr lang="pt-BR" dirty="0" smtClean="0"/>
-              <a:t>8u171, </a:t>
-            </a:r>
-            <a:r>
-              <a:rPr lang="pt-BR" dirty="0"/>
-              <a:t>você verá uma </a:t>
+              <a:t>, você precisará do módulo </a:t>
+            </a:r>
+            <a:r>
+              <a:rPr lang="pt-BR" b="1" i="1" dirty="0" err="1"/>
+              <a:t>Android</a:t>
+            </a:r>
+            <a:r>
+              <a:rPr lang="pt-BR" b="1" i="1" dirty="0"/>
+              <a:t> Build </a:t>
+            </a:r>
+            <a:r>
+              <a:rPr lang="pt-BR" b="1" i="1" dirty="0" err="1" smtClean="0"/>
+              <a:t>Support</a:t>
+            </a:r>
+            <a:r>
+              <a:rPr lang="pt-BR" dirty="0" smtClean="0"/>
+              <a:t> instalado.</a:t>
+            </a:r>
+          </a:p>
+          <a:p>
+            <a:r>
+              <a:rPr lang="pt-BR" dirty="0" smtClean="0"/>
+              <a:t>Para verificar se ele está instalado ou adicioná-lo posteriormente, abra </a:t>
+            </a:r>
+            <a:r>
+              <a:rPr lang="pt-BR" dirty="0"/>
+              <a:t>o </a:t>
+            </a:r>
+            <a:r>
+              <a:rPr lang="pt-BR" b="1" i="1" dirty="0" err="1"/>
+              <a:t>Unity</a:t>
+            </a:r>
+            <a:r>
+              <a:rPr lang="pt-BR" b="1" i="1" dirty="0"/>
+              <a:t> Hub</a:t>
+            </a:r>
+            <a:r>
+              <a:rPr lang="pt-BR" dirty="0"/>
+              <a:t>, </a:t>
+            </a:r>
+            <a:r>
+              <a:rPr lang="pt-BR" dirty="0" smtClean="0"/>
+              <a:t>clique </a:t>
+            </a:r>
+            <a:r>
+              <a:rPr lang="pt-BR" dirty="0"/>
+              <a:t>em </a:t>
+            </a:r>
+            <a:r>
+              <a:rPr lang="pt-BR" b="1" i="1" dirty="0" err="1"/>
+              <a:t>Installs</a:t>
+            </a:r>
+            <a:r>
+              <a:rPr lang="pt-BR" dirty="0"/>
+              <a:t>, </a:t>
+            </a:r>
+            <a:r>
+              <a:rPr lang="pt-BR" dirty="0" smtClean="0"/>
+              <a:t>clique </a:t>
+            </a:r>
+            <a:r>
+              <a:rPr lang="pt-BR" dirty="0"/>
+              <a:t>no </a:t>
+            </a:r>
+            <a:r>
+              <a:rPr lang="pt-BR" b="1" i="1" dirty="0"/>
+              <a:t>botão de opções</a:t>
+            </a:r>
+            <a:r>
+              <a:rPr lang="pt-BR" dirty="0"/>
+              <a:t> correspondente a versão desejada do </a:t>
             </a:r>
             <a:r>
               <a:rPr lang="pt-BR" dirty="0" err="1"/>
-              <a:t>string</a:t>
-            </a:r>
-            <a:r>
-              <a:rPr lang="pt-BR" dirty="0"/>
-              <a:t> que inclui o texto. </a:t>
-            </a:r>
-            <a:r>
-              <a:rPr lang="pt-BR" dirty="0" smtClean="0"/>
-              <a:t>1.8.0_171.</a:t>
-            </a:r>
-            <a:endParaRPr lang="pt-BR" b="1" i="1" dirty="0"/>
-          </a:p>
-        </p:txBody>
-      </p:sp>
-      <p:pic>
-        <p:nvPicPr>
-          <p:cNvPr id="2" name="Imagem 1"/>
-          <p:cNvPicPr>
-            <a:picLocks noChangeAspect="1"/>
-          </p:cNvPicPr>
-          <p:nvPr/>
-        </p:nvPicPr>
-        <p:blipFill rotWithShape="1">
-          <a:blip r:embed="rId2"/>
-          <a:srcRect b="40620"/>
-          <a:stretch/>
-        </p:blipFill>
-        <p:spPr>
-          <a:xfrm>
-            <a:off x="3382694" y="2586257"/>
-            <a:ext cx="5257800" cy="1142499"/>
-          </a:xfrm>
-          <a:prstGeom prst="rect">
-            <a:avLst/>
-          </a:prstGeom>
-        </p:spPr>
-      </p:pic>
+              <a:t>Unity</a:t>
+            </a:r>
+            <a:r>
+              <a:rPr lang="pt-BR" dirty="0"/>
+              <a:t>, </a:t>
+            </a:r>
+            <a:r>
+              <a:rPr lang="pt-BR" dirty="0" smtClean="0"/>
+              <a:t>escolha </a:t>
+            </a:r>
+            <a:r>
+              <a:rPr lang="pt-BR" dirty="0"/>
+              <a:t>a opção </a:t>
+            </a:r>
+            <a:r>
+              <a:rPr lang="pt-BR" b="1" i="1" dirty="0"/>
+              <a:t>Adicionar Módulo</a:t>
+            </a:r>
+            <a:r>
+              <a:rPr lang="pt-BR" dirty="0"/>
+              <a:t>, </a:t>
+            </a:r>
+            <a:r>
+              <a:rPr lang="pt-BR" dirty="0" smtClean="0"/>
+              <a:t>verifique e marque, se necessário, </a:t>
+            </a:r>
+            <a:r>
+              <a:rPr lang="pt-BR" dirty="0"/>
+              <a:t>a opção </a:t>
+            </a:r>
+            <a:r>
+              <a:rPr lang="pt-BR" b="1" i="1" dirty="0" err="1"/>
+              <a:t>Android</a:t>
+            </a:r>
+            <a:r>
+              <a:rPr lang="pt-BR" b="1" i="1" dirty="0"/>
+              <a:t> Build </a:t>
+            </a:r>
+            <a:r>
+              <a:rPr lang="pt-BR" b="1" i="1" dirty="0" err="1"/>
+              <a:t>Support</a:t>
+            </a:r>
+            <a:r>
+              <a:rPr lang="pt-BR" dirty="0"/>
+              <a:t> e </a:t>
+            </a:r>
+            <a:r>
+              <a:rPr lang="pt-BR" dirty="0" smtClean="0"/>
+              <a:t>clique </a:t>
+            </a:r>
+            <a:r>
+              <a:rPr lang="pt-BR" dirty="0"/>
+              <a:t>em </a:t>
+            </a:r>
+            <a:r>
+              <a:rPr lang="pt-BR" b="1" i="1" dirty="0" err="1" smtClean="0"/>
+              <a:t>Done</a:t>
+            </a:r>
+            <a:r>
+              <a:rPr lang="pt-BR" dirty="0" smtClean="0"/>
+              <a:t>.</a:t>
+            </a:r>
+            <a:endParaRPr lang="pt-BR" dirty="0"/>
+          </a:p>
+        </p:txBody>
+      </p:sp>
     </p:spTree>
     <p:extLst>
       <p:ext uri="{BB962C8B-B14F-4D97-AF65-F5344CB8AC3E}">
@@ -9192,51 +9291,38 @@
               <a:rPr lang="pt-BR" dirty="0"/>
               <a:t>1. Verificar/Instalar o JDK</a:t>
             </a:r>
-          </a:p>
-        </p:txBody>
-      </p:sp>
-      <p:sp>
-        <p:nvSpPr>
-          <p:cNvPr id="6" name="Espaço Reservado para Conteúdo 5"/>
-          <p:cNvSpPr>
-            <a:spLocks noGrp="1"/>
-          </p:cNvSpPr>
-          <p:nvPr>
-            <p:ph idx="1"/>
-          </p:nvPr>
-        </p:nvSpPr>
-        <p:spPr/>
-        <p:txBody>
-          <a:bodyPr>
-            <a:normAutofit/>
-          </a:bodyPr>
-          <a:lstStyle/>
-          <a:p>
-            <a:r>
-              <a:rPr lang="pt-BR" dirty="0" smtClean="0"/>
-              <a:t>Caso não tenha o Java 8 instalado na máquina, faça o download e instale o </a:t>
-            </a:r>
-            <a:r>
-              <a:rPr lang="pt-BR" b="1" i="1" dirty="0" smtClean="0"/>
-              <a:t>JDK 8</a:t>
-            </a:r>
-            <a:r>
-              <a:rPr lang="pt-BR" dirty="0" smtClean="0"/>
-              <a:t> acessando o link abaixo:</a:t>
-            </a:r>
-          </a:p>
-          <a:p>
-            <a:r>
-              <a:rPr lang="pt-BR" b="1" i="1" dirty="0"/>
-              <a:t>http://www.oracle.com/technetwork/pt/java/javase/downloads/jdk8-downloads-2133151.html</a:t>
-            </a:r>
-          </a:p>
-        </p:txBody>
-      </p:sp>
+            <a:endParaRPr lang="pt-BR" dirty="0"/>
+          </a:p>
+        </p:txBody>
+      </p:sp>
+      <p:pic>
+        <p:nvPicPr>
+          <p:cNvPr id="2" name="Imagem 1"/>
+          <p:cNvPicPr>
+            <a:picLocks noChangeAspect="1"/>
+          </p:cNvPicPr>
+          <p:nvPr/>
+        </p:nvPicPr>
+        <p:blipFill>
+          <a:blip r:embed="rId2"/>
+          <a:stretch>
+            <a:fillRect/>
+          </a:stretch>
+        </p:blipFill>
+        <p:spPr>
+          <a:xfrm>
+            <a:off x="2355396" y="1291051"/>
+            <a:ext cx="7481209" cy="4914890"/>
+          </a:xfrm>
+          <a:prstGeom prst="rect">
+            <a:avLst/>
+          </a:prstGeom>
+        </p:spPr>
+      </p:pic>
     </p:spTree>
     <p:extLst>
       <p:ext uri="{BB962C8B-B14F-4D97-AF65-F5344CB8AC3E}">
-        <p14:creationId xmlns:p14="http://schemas.microsoft.com/office/powerpoint/2010/main" val="3079141151"/>
+        <p14:creationId xmlns:p14="http://schemas.microsoft.com/office/powerpoint/2010/main" val="1372092429"/>
       </p:ext>
     </p:extLst>
   </p:cSld>
@@ -9288,22 +9374,9 @@
           <a:lstStyle/>
           <a:p>
             <a:r>
-              <a:rPr lang="pt-BR" dirty="0" smtClean="0"/>
-              <a:t>2. </a:t>
-            </a:r>
-            <a:r>
-              <a:rPr lang="pt-BR" dirty="0"/>
-              <a:t>Instalar o </a:t>
-            </a:r>
-            <a:r>
-              <a:rPr lang="pt-BR" dirty="0" smtClean="0"/>
-              <a:t>SDK do </a:t>
-            </a:r>
-            <a:r>
-              <a:rPr lang="pt-BR" dirty="0" err="1" smtClean="0"/>
-              <a:t>Android</a:t>
-            </a:r>
-            <a:endParaRPr lang="pt-BR" dirty="0"/>
+              <a:rPr lang="pt-BR" dirty="0"/>
+              <a:t>1. Verificar/Instalar o JDK</a:t>
+            </a:r>
           </a:p>
         </p:txBody>
       </p:sp>
@@ -9317,35 +9390,69 @@
             <p:ph idx="1"/>
           </p:nvPr>
         </p:nvSpPr>
-        <p:spPr/>
+        <p:spPr>
+          <a:xfrm>
+            <a:off x="317694" y="1291053"/>
+            <a:ext cx="11705493" cy="5080250"/>
+          </a:xfrm>
+        </p:spPr>
         <p:txBody>
           <a:bodyPr>
             <a:normAutofit/>
           </a:bodyPr>
           <a:lstStyle/>
           <a:p>
-            <a:pPr algn="l"/>
-            <a:r>
-              <a:rPr lang="pt-BR" dirty="0" smtClean="0"/>
-              <a:t>Existem três métodos básicos de instalar o SDK do </a:t>
-            </a:r>
-            <a:r>
-              <a:rPr lang="pt-BR" dirty="0" err="1" smtClean="0"/>
-              <a:t>Android</a:t>
-            </a:r>
-            <a:r>
-              <a:rPr lang="pt-BR" dirty="0" smtClean="0"/>
-              <a:t>:</a:t>
-            </a:r>
-          </a:p>
-          <a:p>
-            <a:pPr marL="514350" indent="-514350" algn="l">
-              <a:buFont typeface="+mj-lt"/>
-              <a:buAutoNum type="alphaLcPeriod"/>
+            <a:r>
+              <a:rPr lang="pt-BR" dirty="0" smtClean="0"/>
+              <a:t>Também é necessário que os seguintes itens estejam instalados em sua máquina:</a:t>
+            </a:r>
+          </a:p>
+          <a:p>
+            <a:pPr marL="457200" indent="-457200" algn="l">
+              <a:buFont typeface="Arial" panose="020B0604020202020204" pitchFamily="34" charset="0"/>
+              <a:buChar char="•"/>
             </a:pPr>
             <a:r>
-              <a:rPr lang="pt-BR" dirty="0" smtClean="0"/>
-              <a:t>Instalar o </a:t>
+              <a:rPr lang="pt-BR" b="1" i="1" dirty="0" smtClean="0"/>
+              <a:t>JDK</a:t>
+            </a:r>
+            <a:r>
+              <a:rPr lang="pt-BR" dirty="0" smtClean="0"/>
+              <a:t>;</a:t>
+            </a:r>
+          </a:p>
+          <a:p>
+            <a:pPr marL="457200" indent="-457200" algn="l">
+              <a:buFont typeface="Arial" panose="020B0604020202020204" pitchFamily="34" charset="0"/>
+              <a:buChar char="•"/>
+            </a:pPr>
+            <a:r>
+              <a:rPr lang="pt-BR" b="1" i="1" dirty="0" smtClean="0"/>
+              <a:t>SDK</a:t>
+            </a:r>
+            <a:r>
+              <a:rPr lang="pt-BR" dirty="0" smtClean="0"/>
+              <a:t>; e</a:t>
+            </a:r>
+          </a:p>
+          <a:p>
+            <a:pPr marL="457200" indent="-457200" algn="l">
+              <a:buFont typeface="Arial" panose="020B0604020202020204" pitchFamily="34" charset="0"/>
+              <a:buChar char="•"/>
+            </a:pPr>
+            <a:r>
+              <a:rPr lang="pt-BR" b="1" i="1" dirty="0" smtClean="0"/>
+              <a:t>NDK</a:t>
+            </a:r>
+            <a:r>
+              <a:rPr lang="pt-BR" dirty="0" smtClean="0"/>
+              <a:t>.</a:t>
+            </a:r>
+          </a:p>
+          <a:p>
+            <a:r>
+              <a:rPr lang="pt-BR" dirty="0" smtClean="0"/>
+              <a:t>É recomendável que você utilize as versões instaladas pelo módulo </a:t>
             </a:r>
             <a:r>
               <a:rPr lang="pt-BR" b="1" i="1" dirty="0" err="1" smtClean="0"/>
@@ -9353,28 +9460,6 @@
             </a:r>
             <a:r>
               <a:rPr lang="pt-BR" b="1" i="1" dirty="0" smtClean="0"/>
-              <a:t> Studio</a:t>
-            </a:r>
-            <a:r>
-              <a:rPr lang="pt-BR" dirty="0" smtClean="0"/>
-              <a:t>;</a:t>
-            </a:r>
-          </a:p>
-          <a:p>
-            <a:pPr marL="514350" indent="-514350" algn="l">
-              <a:buFont typeface="+mj-lt"/>
-              <a:buAutoNum type="alphaLcPeriod"/>
-            </a:pPr>
-            <a:r>
-              <a:rPr lang="pt-BR" dirty="0" smtClean="0"/>
-              <a:t>Adicionar o módulo </a:t>
-            </a:r>
-            <a:r>
-              <a:rPr lang="pt-BR" b="1" i="1" dirty="0" err="1" smtClean="0"/>
-              <a:t>Android</a:t>
-            </a:r>
-            <a:r>
-              <a:rPr lang="pt-BR" b="1" i="1" dirty="0" smtClean="0"/>
               <a:t> Build </a:t>
             </a:r>
             <a:r>
@@ -9383,107 +9468,14 @@
             </a:r>
             <a:r>
               <a:rPr lang="pt-BR" dirty="0" smtClean="0"/>
-              <a:t> </a:t>
-            </a:r>
-            <a:r>
-              <a:rPr lang="pt-BR" dirty="0"/>
-              <a:t>no </a:t>
-            </a:r>
-            <a:r>
-              <a:rPr lang="pt-BR" b="1" i="1" dirty="0" err="1" smtClean="0"/>
+              <a:t> do </a:t>
+            </a:r>
+            <a:r>
+              <a:rPr lang="pt-BR" dirty="0" err="1" smtClean="0"/>
               <a:t>Unity</a:t>
             </a:r>
             <a:r>
-              <a:rPr lang="pt-BR" b="1" i="1" dirty="0" smtClean="0"/>
-              <a:t> 2019</a:t>
-            </a:r>
-            <a:r>
-              <a:rPr lang="pt-BR" dirty="0" smtClean="0"/>
-              <a:t>;</a:t>
-            </a:r>
-            <a:endParaRPr lang="pt-BR" dirty="0" smtClean="0"/>
-          </a:p>
-          <a:p>
-            <a:pPr marL="514350" indent="-514350" algn="l">
-              <a:buFont typeface="+mj-lt"/>
-              <a:buAutoNum type="alphaLcPeriod"/>
-            </a:pPr>
-            <a:r>
-              <a:rPr lang="pt-BR" dirty="0" smtClean="0"/>
-              <a:t>Instalar o </a:t>
-            </a:r>
-            <a:r>
-              <a:rPr lang="pt-BR" i="1" dirty="0" err="1" smtClean="0"/>
-              <a:t>workload</a:t>
-            </a:r>
-            <a:r>
-              <a:rPr lang="pt-BR" dirty="0" smtClean="0"/>
-              <a:t> </a:t>
-            </a:r>
-            <a:r>
-              <a:rPr lang="pt-BR" b="1" i="1" dirty="0" smtClean="0"/>
-              <a:t>Desenvolvimento mobile com </a:t>
-            </a:r>
-            <a:r>
-              <a:rPr lang="pt-BR" b="1" i="1" dirty="0" err="1" smtClean="0"/>
-              <a:t>.Net</a:t>
-            </a:r>
-            <a:r>
-              <a:rPr lang="pt-BR" dirty="0" smtClean="0"/>
-              <a:t> no </a:t>
-            </a:r>
-            <a:r>
-              <a:rPr lang="pt-BR" b="1" i="1" dirty="0" smtClean="0"/>
-              <a:t>Visual Studio </a:t>
-            </a:r>
-            <a:r>
-              <a:rPr lang="pt-BR" b="1" i="1" dirty="0" err="1" smtClean="0"/>
-              <a:t>Community</a:t>
-            </a:r>
-            <a:r>
-              <a:rPr lang="pt-BR" b="1" i="1" dirty="0" smtClean="0"/>
-              <a:t> 2017</a:t>
-            </a:r>
-            <a:r>
-              <a:rPr lang="pt-BR" dirty="0" smtClean="0"/>
-              <a:t>; ou</a:t>
-            </a:r>
-          </a:p>
-          <a:p>
-            <a:pPr marL="514350" indent="-514350" algn="l">
-              <a:buFont typeface="+mj-lt"/>
-              <a:buAutoNum type="alphaLcPeriod"/>
-            </a:pPr>
-            <a:r>
-              <a:rPr lang="pt-BR" dirty="0" smtClean="0"/>
-              <a:t>Instalar o </a:t>
-            </a:r>
-            <a:r>
-              <a:rPr lang="pt-BR" b="1" i="1" dirty="0" err="1" smtClean="0"/>
-              <a:t>Android</a:t>
-            </a:r>
-            <a:r>
-              <a:rPr lang="pt-BR" b="1" i="1" dirty="0" smtClean="0"/>
-              <a:t> </a:t>
-            </a:r>
-            <a:r>
-              <a:rPr lang="pt-BR" b="1" i="1" dirty="0" err="1" smtClean="0"/>
-              <a:t>Command</a:t>
-            </a:r>
-            <a:r>
-              <a:rPr lang="pt-BR" b="1" i="1" dirty="0" smtClean="0"/>
-              <a:t> </a:t>
-            </a:r>
-            <a:r>
-              <a:rPr lang="pt-BR" b="1" i="1" dirty="0" err="1" smtClean="0"/>
-              <a:t>Line</a:t>
-            </a:r>
-            <a:r>
-              <a:rPr lang="pt-BR" b="1" i="1" dirty="0" smtClean="0"/>
-              <a:t> Tools</a:t>
-            </a:r>
-            <a:r>
-              <a:rPr lang="pt-BR" dirty="0" smtClean="0"/>
+              <a:rPr lang="pt-BR" dirty="0"/>
               <a:t>.</a:t>
             </a:r>
             <a:endParaRPr lang="pt-BR" dirty="0"/>
@@ -9493,7 +9485,7 @@
     </p:spTree>
     <p:extLst>
       <p:ext uri="{BB962C8B-B14F-4D97-AF65-F5344CB8AC3E}">
-        <p14:creationId xmlns:p14="http://schemas.microsoft.com/office/powerpoint/2010/main" val="3627359156"/>
+        <p14:creationId xmlns:p14="http://schemas.microsoft.com/office/powerpoint/2010/main" val="1236464607"/>
       </p:ext>
     </p:extLst>
   </p:cSld>
@@ -9545,131 +9537,180 @@
           <a:lstStyle/>
           <a:p>
             <a:r>
-              <a:rPr lang="pt-BR" dirty="0" smtClean="0"/>
-              <a:t>2. </a:t>
-            </a:r>
-            <a:r>
-              <a:rPr lang="pt-BR" dirty="0"/>
-              <a:t>Instalar o </a:t>
-            </a:r>
-            <a:r>
-              <a:rPr lang="pt-BR" dirty="0" smtClean="0"/>
-              <a:t>SDK do </a:t>
+              <a:rPr lang="pt-BR" dirty="0"/>
+              <a:t>1. Verificar/Instalar o JDK</a:t>
+            </a:r>
+          </a:p>
+        </p:txBody>
+      </p:sp>
+      <p:sp>
+        <p:nvSpPr>
+          <p:cNvPr id="6" name="Espaço Reservado para Conteúdo 5"/>
+          <p:cNvSpPr>
+            <a:spLocks noGrp="1"/>
+          </p:cNvSpPr>
+          <p:nvPr>
+            <p:ph idx="1"/>
+          </p:nvPr>
+        </p:nvSpPr>
+        <p:spPr>
+          <a:xfrm>
+            <a:off x="317694" y="1291053"/>
+            <a:ext cx="11705493" cy="5080250"/>
+          </a:xfrm>
+        </p:spPr>
+        <p:txBody>
+          <a:bodyPr>
+            <a:normAutofit lnSpcReduction="10000"/>
+          </a:bodyPr>
+          <a:lstStyle/>
+          <a:p>
+            <a:r>
+              <a:rPr lang="pt-BR" dirty="0" smtClean="0"/>
+              <a:t>Caso queira utilizar outro JDK manualmente, você </a:t>
+            </a:r>
+            <a:r>
+              <a:rPr lang="pt-BR" dirty="0"/>
+              <a:t>pode </a:t>
+            </a:r>
+            <a:r>
+              <a:rPr lang="pt-BR" dirty="0" smtClean="0"/>
+              <a:t>verificar </a:t>
+            </a:r>
+            <a:r>
+              <a:rPr lang="pt-BR" dirty="0"/>
+              <a:t>qual </a:t>
+            </a:r>
+            <a:r>
+              <a:rPr lang="pt-BR" dirty="0" smtClean="0"/>
+              <a:t>é a versão </a:t>
+            </a:r>
+            <a:r>
+              <a:rPr lang="pt-BR" dirty="0"/>
+              <a:t>do JDK </a:t>
+            </a:r>
+            <a:r>
+              <a:rPr lang="pt-BR" dirty="0" smtClean="0"/>
+              <a:t>instalada, </a:t>
+            </a:r>
+            <a:r>
+              <a:rPr lang="pt-BR" dirty="0"/>
+              <a:t>digitando </a:t>
+            </a:r>
+            <a:r>
+              <a:rPr lang="pt-BR" dirty="0" smtClean="0"/>
+              <a:t/>
+            </a:r>
+            <a:br>
+              <a:rPr lang="pt-BR" dirty="0" smtClean="0"/>
+            </a:br>
+            <a:r>
+              <a:rPr lang="pt-BR" b="1" i="1" dirty="0" err="1" smtClean="0"/>
+              <a:t>java</a:t>
+            </a:r>
+            <a:r>
+              <a:rPr lang="pt-BR" b="1" i="1" dirty="0" smtClean="0"/>
+              <a:t> </a:t>
+            </a:r>
+            <a:r>
+              <a:rPr lang="pt-BR" b="1" i="1" dirty="0"/>
+              <a:t>-</a:t>
+            </a:r>
+            <a:r>
+              <a:rPr lang="pt-BR" b="1" i="1" dirty="0" err="1"/>
+              <a:t>version</a:t>
+            </a:r>
+            <a:r>
+              <a:rPr lang="pt-BR" dirty="0"/>
+              <a:t> </a:t>
+            </a:r>
+            <a:r>
+              <a:rPr lang="pt-BR" dirty="0" smtClean="0"/>
+              <a:t>no </a:t>
+            </a:r>
+            <a:r>
+              <a:rPr lang="pt-BR" dirty="0" err="1" smtClean="0"/>
+              <a:t>Prompt</a:t>
+            </a:r>
+            <a:r>
+              <a:rPr lang="pt-BR" dirty="0" smtClean="0"/>
+              <a:t> de Comando.</a:t>
+            </a:r>
+          </a:p>
+          <a:p>
+            <a:endParaRPr lang="pt-BR" dirty="0"/>
+          </a:p>
+          <a:p>
+            <a:endParaRPr lang="pt-BR" dirty="0" smtClean="0"/>
+          </a:p>
+          <a:p>
+            <a:r>
+              <a:rPr lang="pt-BR" dirty="0" smtClean="0"/>
+              <a:t>A versão recomendada é a Java 8. As versões mais novas apresentam problemas com a versão atual do SDK </a:t>
             </a:r>
             <a:r>
               <a:rPr lang="pt-BR" dirty="0" err="1" smtClean="0"/>
               <a:t>Android</a:t>
             </a:r>
-            <a:endParaRPr lang="pt-BR" dirty="0"/>
-          </a:p>
-        </p:txBody>
-      </p:sp>
-      <p:sp>
-        <p:nvSpPr>
-          <p:cNvPr id="6" name="Espaço Reservado para Conteúdo 5"/>
-          <p:cNvSpPr>
-            <a:spLocks noGrp="1"/>
-          </p:cNvSpPr>
-          <p:nvPr>
-            <p:ph idx="1"/>
-          </p:nvPr>
-        </p:nvSpPr>
-        <p:spPr/>
-        <p:txBody>
-          <a:bodyPr>
-            <a:normAutofit/>
-          </a:bodyPr>
-          <a:lstStyle/>
-          <a:p>
-            <a:r>
-              <a:rPr lang="pt-BR" dirty="0" smtClean="0"/>
-              <a:t>Os dois primeiros métodos são bem simples e toda a configuração é feita automaticamente.</a:t>
-            </a:r>
-            <a:r>
-              <a:rPr lang="pt-BR" dirty="0"/>
-              <a:t> </a:t>
-            </a:r>
-            <a:r>
-              <a:rPr lang="pt-BR" dirty="0" smtClean="0"/>
-              <a:t>Instalar o </a:t>
-            </a:r>
-            <a:r>
-              <a:rPr lang="pt-BR" b="1" i="1" dirty="0" err="1" smtClean="0"/>
-              <a:t>Android</a:t>
-            </a:r>
-            <a:r>
-              <a:rPr lang="pt-BR" b="1" i="1" dirty="0" smtClean="0"/>
-              <a:t> </a:t>
-            </a:r>
-            <a:r>
-              <a:rPr lang="pt-BR" b="1" i="1" dirty="0" err="1" smtClean="0"/>
-              <a:t>Command</a:t>
-            </a:r>
-            <a:r>
-              <a:rPr lang="pt-BR" b="1" i="1" dirty="0" smtClean="0"/>
-              <a:t> </a:t>
-            </a:r>
-            <a:r>
-              <a:rPr lang="pt-BR" b="1" i="1" dirty="0" err="1" smtClean="0"/>
-              <a:t>Line</a:t>
-            </a:r>
-            <a:r>
-              <a:rPr lang="pt-BR" dirty="0" smtClean="0"/>
-              <a:t> é uma alternativa para quem não quer instalar o </a:t>
-            </a:r>
-            <a:r>
-              <a:rPr lang="pt-BR" dirty="0" err="1" smtClean="0"/>
-              <a:t>Android</a:t>
-            </a:r>
-            <a:r>
-              <a:rPr lang="pt-BR" dirty="0" smtClean="0"/>
-              <a:t> Studio, nem o Visual Studio. Contudo esse método requer conhecimentos básicos com o </a:t>
-            </a:r>
-            <a:r>
-              <a:rPr lang="pt-BR" dirty="0" err="1" smtClean="0"/>
-              <a:t>Prompt</a:t>
-            </a:r>
-            <a:r>
-              <a:rPr lang="pt-BR" dirty="0" smtClean="0"/>
-              <a:t> de Comandos.</a:t>
-            </a:r>
-          </a:p>
-          <a:p>
-            <a:r>
-              <a:rPr lang="pt-BR" dirty="0" smtClean="0"/>
-              <a:t>Neste passo a passo será mostrado como instalar o </a:t>
-            </a:r>
-            <a:r>
-              <a:rPr lang="pt-BR" b="1" i="1" dirty="0" err="1" smtClean="0"/>
-              <a:t>Android</a:t>
-            </a:r>
-            <a:r>
-              <a:rPr lang="pt-BR" b="1" i="1" dirty="0" smtClean="0"/>
-              <a:t> </a:t>
-            </a:r>
-            <a:r>
-              <a:rPr lang="pt-BR" b="1" i="1" dirty="0" err="1" smtClean="0"/>
-              <a:t>Command</a:t>
-            </a:r>
-            <a:r>
-              <a:rPr lang="pt-BR" b="1" i="1" dirty="0" smtClean="0"/>
-              <a:t> </a:t>
-            </a:r>
-            <a:r>
-              <a:rPr lang="pt-BR" b="1" i="1" dirty="0" err="1" smtClean="0"/>
-              <a:t>Line</a:t>
-            </a:r>
-            <a:r>
-              <a:rPr lang="pt-BR" dirty="0" smtClean="0"/>
-              <a:t>.</a:t>
-            </a:r>
-          </a:p>
-        </p:txBody>
-      </p:sp>
+            <a:r>
+              <a:rPr lang="pt-BR" dirty="0" smtClean="0"/>
+              <a:t>. </a:t>
+            </a:r>
+            <a:r>
+              <a:rPr lang="pt-BR" dirty="0"/>
+              <a:t>Se a versão instalada for </a:t>
+            </a:r>
+            <a:r>
+              <a:rPr lang="pt-BR" dirty="0" smtClean="0"/>
+              <a:t>8u171, </a:t>
+            </a:r>
+            <a:r>
+              <a:rPr lang="pt-BR" dirty="0"/>
+              <a:t>você verá uma </a:t>
+            </a:r>
+            <a:r>
+              <a:rPr lang="pt-BR" dirty="0" err="1"/>
+              <a:t>string</a:t>
+            </a:r>
+            <a:r>
+              <a:rPr lang="pt-BR" dirty="0"/>
+              <a:t> que inclui o texto. </a:t>
+            </a:r>
+            <a:r>
+              <a:rPr lang="pt-BR" dirty="0" smtClean="0"/>
+              <a:t>1.8.0_171.</a:t>
+            </a:r>
+            <a:endParaRPr lang="pt-BR" b="1" i="1" dirty="0"/>
+          </a:p>
+        </p:txBody>
+      </p:sp>
+      <p:pic>
+        <p:nvPicPr>
+          <p:cNvPr id="2" name="Imagem 1"/>
+          <p:cNvPicPr>
+            <a:picLocks noChangeAspect="1"/>
+          </p:cNvPicPr>
+          <p:nvPr/>
+        </p:nvPicPr>
+        <p:blipFill rotWithShape="1">
+          <a:blip r:embed="rId2"/>
+          <a:srcRect b="40620"/>
+          <a:stretch/>
+        </p:blipFill>
+        <p:spPr>
+          <a:xfrm>
+            <a:off x="3382694" y="2881217"/>
+            <a:ext cx="5257800" cy="1142499"/>
+          </a:xfrm>
+          <a:prstGeom prst="rect">
+            <a:avLst/>
+          </a:prstGeom>
+        </p:spPr>
+      </p:pic>
     </p:spTree>
     <p:extLst>
       <p:ext uri="{BB962C8B-B14F-4D97-AF65-F5344CB8AC3E}">
-        <p14:creationId xmlns:p14="http://schemas.microsoft.com/office/powerpoint/2010/main" val="3991023608"/>
+        <p14:creationId xmlns:p14="http://schemas.microsoft.com/office/powerpoint/2010/main" val="12513107"/>
       </p:ext>
     </p:extLst>
   </p:cSld>
@@ -9721,22 +9762,9 @@
           <a:lstStyle/>
           <a:p>
             <a:r>
-              <a:rPr lang="pt-BR" dirty="0" smtClean="0"/>
-              <a:t>2. </a:t>
-            </a:r>
-            <a:r>
-              <a:rPr lang="pt-BR" dirty="0"/>
-              <a:t>Instalar o </a:t>
-            </a:r>
-            <a:r>
-              <a:rPr lang="pt-BR" dirty="0" smtClean="0"/>
-              <a:t>SDK do </a:t>
-            </a:r>
-            <a:r>
-              <a:rPr lang="pt-BR" dirty="0" err="1" smtClean="0"/>
-              <a:t>Android</a:t>
-            </a:r>
-            <a:endParaRPr lang="pt-BR" dirty="0"/>
+              <a:rPr lang="pt-BR" dirty="0"/>
+              <a:t>1. Verificar/Instalar o JDK</a:t>
+            </a:r>
           </a:p>
         </p:txBody>
       </p:sp>
@@ -9759,73 +9787,29 @@
           <a:p>
             <a:r>
               <a:rPr lang="pt-BR" dirty="0" smtClean="0"/>
-              <a:t>Faça o download do </a:t>
-            </a:r>
-            <a:r>
-              <a:rPr lang="pt-BR" b="1" i="1" dirty="0" err="1" smtClean="0"/>
-              <a:t>Android</a:t>
+              <a:t>Caso não tenha o Java 8 instalado na máquina, faça o download e instale o </a:t>
             </a:r>
             <a:r>
               <a:rPr lang="pt-BR" b="1" i="1" dirty="0" smtClean="0"/>
-              <a:t> </a:t>
-            </a:r>
-            <a:r>
-              <a:rPr lang="pt-BR" b="1" i="1" dirty="0" err="1" smtClean="0"/>
-              <a:t>Command</a:t>
-            </a:r>
-            <a:r>
-              <a:rPr lang="pt-BR" b="1" i="1" dirty="0" smtClean="0"/>
-              <a:t> </a:t>
-            </a:r>
-            <a:r>
-              <a:rPr lang="pt-BR" b="1" i="1" dirty="0" err="1" smtClean="0"/>
-              <a:t>Line</a:t>
-            </a:r>
-            <a:r>
-              <a:rPr lang="pt-BR" dirty="0" smtClean="0"/>
-              <a:t> no site abaixo:</a:t>
+              <a:t>JDK 8</a:t>
+            </a:r>
+            <a:r>
+              <a:rPr lang="pt-BR" dirty="0" smtClean="0"/>
+              <a:t> acessando o link abaixo:</a:t>
             </a:r>
           </a:p>
           <a:p>
             <a:r>
               <a:rPr lang="pt-BR" b="1" i="1" dirty="0"/>
-              <a:t>https://developer.android.com/studio</a:t>
-            </a:r>
-            <a:r>
-              <a:rPr lang="pt-BR" b="1" i="1" dirty="0" smtClean="0"/>
-              <a:t>/</a:t>
-            </a:r>
-          </a:p>
-        </p:txBody>
-      </p:sp>
-      <p:pic>
-        <p:nvPicPr>
-          <p:cNvPr id="2" name="Imagem 1"/>
-          <p:cNvPicPr>
-            <a:picLocks noChangeAspect="1"/>
-          </p:cNvPicPr>
-          <p:nvPr/>
-        </p:nvPicPr>
-        <p:blipFill>
-          <a:blip r:embed="rId2"/>
-          <a:stretch>
-            <a:fillRect/>
-          </a:stretch>
-        </p:blipFill>
-        <p:spPr>
-          <a:xfrm>
-            <a:off x="3299911" y="2833324"/>
-            <a:ext cx="5592178" cy="3296013"/>
-          </a:xfrm>
-          <a:prstGeom prst="rect">
-            <a:avLst/>
-          </a:prstGeom>
-        </p:spPr>
-      </p:pic>
+              <a:t>http://www.oracle.com/technetwork/pt/java/javase/downloads/jdk8-downloads-2133151.html</a:t>
+            </a:r>
+          </a:p>
+        </p:txBody>
+      </p:sp>
     </p:spTree>
     <p:extLst>
       <p:ext uri="{BB962C8B-B14F-4D97-AF65-F5344CB8AC3E}">
-        <p14:creationId xmlns:p14="http://schemas.microsoft.com/office/powerpoint/2010/main" val="3725044473"/>
+        <p14:creationId xmlns:p14="http://schemas.microsoft.com/office/powerpoint/2010/main" val="3079141151"/>
       </p:ext>
     </p:extLst>
   </p:cSld>
@@ -9885,12 +9869,8 @@
               <a:t>Instalar o </a:t>
             </a:r>
             <a:r>
-              <a:rPr lang="pt-BR" dirty="0" smtClean="0"/>
-              <a:t>SDK do </a:t>
-            </a:r>
-            <a:r>
-              <a:rPr lang="pt-BR" dirty="0" err="1" smtClean="0"/>
-              <a:t>Android</a:t>
+              <a:rPr lang="pt-BR" dirty="0" err="1"/>
+              <a:t>sdkmanager</a:t>
             </a:r>
             <a:endParaRPr lang="pt-BR" dirty="0"/>
           </a:p>
@@ -9915,29 +9895,73 @@
           <a:p>
             <a:r>
               <a:rPr lang="pt-BR" dirty="0" smtClean="0"/>
-              <a:t>Descompacte o arquivo e salve o diretório em seu local de preferência. Exemplo: se você salvar o diretório com o nome “</a:t>
-            </a:r>
-            <a:r>
-              <a:rPr lang="pt-BR" dirty="0" err="1" smtClean="0"/>
-              <a:t>android-sdk</a:t>
-            </a:r>
-            <a:r>
-              <a:rPr lang="pt-BR" dirty="0" smtClean="0"/>
-              <a:t>” no drive C, a estrutura ficará desta maneira:</a:t>
-            </a:r>
-          </a:p>
-          <a:p>
+              <a:t>Faça o download do </a:t>
+            </a:r>
+            <a:r>
+              <a:rPr lang="pt-BR" b="1" i="1" dirty="0" err="1" smtClean="0"/>
+              <a:t>Android</a:t>
+            </a:r>
             <a:r>
               <a:rPr lang="pt-BR" b="1" i="1" dirty="0" smtClean="0"/>
-              <a:t>C:\android-sdk\tools</a:t>
-            </a:r>
-          </a:p>
-        </p:txBody>
-      </p:sp>
+              <a:t> </a:t>
+            </a:r>
+            <a:r>
+              <a:rPr lang="pt-BR" b="1" i="1" dirty="0" err="1" smtClean="0"/>
+              <a:t>Command</a:t>
+            </a:r>
+            <a:r>
+              <a:rPr lang="pt-BR" b="1" i="1" dirty="0" smtClean="0"/>
+              <a:t> </a:t>
+            </a:r>
+            <a:r>
+              <a:rPr lang="pt-BR" b="1" i="1" dirty="0" err="1" smtClean="0"/>
+              <a:t>Line</a:t>
+            </a:r>
+            <a:r>
+              <a:rPr lang="pt-BR" dirty="0" smtClean="0"/>
+              <a:t> no site abaixo:</a:t>
+            </a:r>
+          </a:p>
+          <a:p>
+            <a:r>
+              <a:rPr lang="pt-BR" b="1" i="1" dirty="0"/>
+              <a:t>https://developer.android.com/studio</a:t>
+            </a:r>
+            <a:r>
+              <a:rPr lang="pt-BR" b="1" i="1" dirty="0" smtClean="0"/>
+              <a:t>/</a:t>
+            </a:r>
+          </a:p>
+        </p:txBody>
+      </p:sp>
+      <p:pic>
+        <p:nvPicPr>
+          <p:cNvPr id="2" name="Imagem 1"/>
+          <p:cNvPicPr>
+            <a:picLocks noChangeAspect="1"/>
+          </p:cNvPicPr>
+          <p:nvPr/>
+        </p:nvPicPr>
+        <p:blipFill>
+          <a:blip r:embed="rId2"/>
+          <a:stretch>
+            <a:fillRect/>
+          </a:stretch>
+        </p:blipFill>
+        <p:spPr>
+          <a:xfrm>
+            <a:off x="3299911" y="2833324"/>
+            <a:ext cx="5592178" cy="3296013"/>
+          </a:xfrm>
+          <a:prstGeom prst="rect">
+            <a:avLst/>
+          </a:prstGeom>
+        </p:spPr>
+      </p:pic>
     </p:spTree>
     <p:extLst>
       <p:ext uri="{BB962C8B-B14F-4D97-AF65-F5344CB8AC3E}">
-        <p14:creationId xmlns:p14="http://schemas.microsoft.com/office/powerpoint/2010/main" val="2856552240"/>
+        <p14:creationId xmlns:p14="http://schemas.microsoft.com/office/powerpoint/2010/main" val="3725044473"/>
       </p:ext>
     </p:extLst>
   </p:cSld>

</xml_diff>

<commit_message>
atualização dos slides para 2019; inserção do slide de referências
</commit_message>
<xml_diff>
--- a/building-games-for-Android.pptx
+++ b/building-games-for-Android.pptx
@@ -5,7 +5,7 @@
     <p:sldMasterId id="2147483648" r:id="rId1"/>
   </p:sldMasterIdLst>
   <p:notesMasterIdLst>
-    <p:notesMasterId r:id="rId39"/>
+    <p:notesMasterId r:id="rId40"/>
   </p:notesMasterIdLst>
   <p:sldIdLst>
     <p:sldId id="256" r:id="rId2"/>
@@ -43,8 +43,9 @@
     <p:sldId id="319" r:id="rId34"/>
     <p:sldId id="347" r:id="rId35"/>
     <p:sldId id="344" r:id="rId36"/>
-    <p:sldId id="348" r:id="rId37"/>
-    <p:sldId id="352" r:id="rId38"/>
+    <p:sldId id="358" r:id="rId37"/>
+    <p:sldId id="357" r:id="rId38"/>
+    <p:sldId id="352" r:id="rId39"/>
   </p:sldIdLst>
   <p:sldSz cx="12192000" cy="6858000"/>
   <p:notesSz cx="6858000" cy="9144000"/>
@@ -233,7 +234,7 @@
           <a:p>
             <a:fld id="{94D3EB41-CF60-4C9F-BD83-AE56FA0945EB}" type="datetimeFigureOut">
               <a:rPr lang="pt-BR" smtClean="0"/>
-              <a:t>22/07/2019</a:t>
+              <a:t>23/07/2019</a:t>
             </a:fld>
             <a:endParaRPr lang="pt-BR"/>
           </a:p>
@@ -743,7 +744,7 @@
           <a:p>
             <a:fld id="{9642BF85-54FF-46CE-B398-87F998CFD60B}" type="datetimeFigureOut">
               <a:rPr lang="pt-BR" smtClean="0"/>
-              <a:t>22/07/2019</a:t>
+              <a:t>23/07/2019</a:t>
             </a:fld>
             <a:endParaRPr lang="pt-BR"/>
           </a:p>
@@ -911,7 +912,7 @@
           <a:p>
             <a:fld id="{9642BF85-54FF-46CE-B398-87F998CFD60B}" type="datetimeFigureOut">
               <a:rPr lang="pt-BR" smtClean="0"/>
-              <a:t>22/07/2019</a:t>
+              <a:t>23/07/2019</a:t>
             </a:fld>
             <a:endParaRPr lang="pt-BR"/>
           </a:p>
@@ -1089,7 +1090,7 @@
           <a:p>
             <a:fld id="{9642BF85-54FF-46CE-B398-87F998CFD60B}" type="datetimeFigureOut">
               <a:rPr lang="pt-BR" smtClean="0"/>
-              <a:t>22/07/2019</a:t>
+              <a:t>23/07/2019</a:t>
             </a:fld>
             <a:endParaRPr lang="pt-BR"/>
           </a:p>
@@ -1426,7 +1427,7 @@
           <a:p>
             <a:fld id="{9642BF85-54FF-46CE-B398-87F998CFD60B}" type="datetimeFigureOut">
               <a:rPr lang="pt-BR" smtClean="0"/>
-              <a:t>22/07/2019</a:t>
+              <a:t>23/07/2019</a:t>
             </a:fld>
             <a:endParaRPr lang="pt-BR"/>
           </a:p>
@@ -1697,7 +1698,7 @@
           <a:p>
             <a:fld id="{9642BF85-54FF-46CE-B398-87F998CFD60B}" type="datetimeFigureOut">
               <a:rPr lang="pt-BR" smtClean="0"/>
-              <a:t>22/07/2019</a:t>
+              <a:t>23/07/2019</a:t>
             </a:fld>
             <a:endParaRPr lang="pt-BR"/>
           </a:p>
@@ -1943,7 +1944,7 @@
           <a:p>
             <a:fld id="{9642BF85-54FF-46CE-B398-87F998CFD60B}" type="datetimeFigureOut">
               <a:rPr lang="pt-BR" smtClean="0"/>
-              <a:t>22/07/2019</a:t>
+              <a:t>23/07/2019</a:t>
             </a:fld>
             <a:endParaRPr lang="pt-BR"/>
           </a:p>
@@ -2307,7 +2308,7 @@
           <a:p>
             <a:fld id="{9642BF85-54FF-46CE-B398-87F998CFD60B}" type="datetimeFigureOut">
               <a:rPr lang="pt-BR" smtClean="0"/>
-              <a:t>22/07/2019</a:t>
+              <a:t>23/07/2019</a:t>
             </a:fld>
             <a:endParaRPr lang="pt-BR"/>
           </a:p>
@@ -2441,7 +2442,7 @@
           <a:p>
             <a:fld id="{9642BF85-54FF-46CE-B398-87F998CFD60B}" type="datetimeFigureOut">
               <a:rPr lang="pt-BR" smtClean="0"/>
-              <a:t>22/07/2019</a:t>
+              <a:t>23/07/2019</a:t>
             </a:fld>
             <a:endParaRPr lang="pt-BR"/>
           </a:p>
@@ -2536,7 +2537,7 @@
           <a:p>
             <a:fld id="{9642BF85-54FF-46CE-B398-87F998CFD60B}" type="datetimeFigureOut">
               <a:rPr lang="pt-BR" smtClean="0"/>
-              <a:t>22/07/2019</a:t>
+              <a:t>23/07/2019</a:t>
             </a:fld>
             <a:endParaRPr lang="pt-BR"/>
           </a:p>
@@ -2811,7 +2812,7 @@
           <a:p>
             <a:fld id="{9642BF85-54FF-46CE-B398-87F998CFD60B}" type="datetimeFigureOut">
               <a:rPr lang="pt-BR" smtClean="0"/>
-              <a:t>22/07/2019</a:t>
+              <a:t>23/07/2019</a:t>
             </a:fld>
             <a:endParaRPr lang="pt-BR"/>
           </a:p>
@@ -3063,7 +3064,7 @@
           <a:p>
             <a:fld id="{9642BF85-54FF-46CE-B398-87F998CFD60B}" type="datetimeFigureOut">
               <a:rPr lang="pt-BR" smtClean="0"/>
-              <a:t>22/07/2019</a:t>
+              <a:t>23/07/2019</a:t>
             </a:fld>
             <a:endParaRPr lang="pt-BR"/>
           </a:p>
@@ -3283,7 +3284,7 @@
           <a:p>
             <a:fld id="{9642BF85-54FF-46CE-B398-87F998CFD60B}" type="datetimeFigureOut">
               <a:rPr lang="pt-BR" smtClean="0"/>
-              <a:t>22/07/2019</a:t>
+              <a:t>23/07/2019</a:t>
             </a:fld>
             <a:endParaRPr lang="pt-BR"/>
           </a:p>
@@ -3948,11 +3949,7 @@
             </a:r>
             <a:r>
               <a:rPr lang="pt-BR" dirty="0"/>
-              <a:t>Instalar </a:t>
-            </a:r>
-            <a:r>
-              <a:rPr lang="pt-BR" dirty="0"/>
-              <a:t>os </a:t>
+              <a:t>Instalar os </a:t>
             </a:r>
             <a:r>
               <a:rPr lang="pt-BR" dirty="0" smtClean="0"/>
@@ -3989,11 +3986,7 @@
             </a:r>
             <a:r>
               <a:rPr lang="pt-BR" dirty="0" smtClean="0"/>
-              <a:t>, por meio do </a:t>
-            </a:r>
-            <a:r>
-              <a:rPr lang="pt-BR" dirty="0" smtClean="0"/>
-              <a:t>Windows </a:t>
+              <a:t>, por meio do Windows </a:t>
             </a:r>
             <a:r>
               <a:rPr lang="pt-BR" dirty="0" err="1" smtClean="0"/>
@@ -4001,11 +3994,7 @@
             </a:r>
             <a:r>
               <a:rPr lang="pt-BR" dirty="0" smtClean="0"/>
-              <a:t>, </a:t>
-            </a:r>
-            <a:r>
-              <a:rPr lang="pt-BR" dirty="0" smtClean="0"/>
-              <a:t>para instalar os pacotes necessários para criar os dispositivos virtuais e emulá-los. Os comandos básico do </a:t>
+              <a:t>, para instalar os pacotes necessários para criar os dispositivos virtuais e emulá-los. Os comandos básico do </a:t>
             </a:r>
             <a:r>
               <a:rPr lang="pt-BR" dirty="0" err="1" smtClean="0"/>
@@ -4137,11 +4126,7 @@
           <a:p>
             <a:r>
               <a:rPr lang="pt-BR" dirty="0" smtClean="0"/>
-              <a:t>Para realizar o download e instalação da maioria dos pacotes necessários, digite o seguinte comando no </a:t>
-            </a:r>
-            <a:r>
-              <a:rPr lang="pt-BR" dirty="0" smtClean="0"/>
-              <a:t>Windows </a:t>
+              <a:t>Para realizar o download e instalação da maioria dos pacotes necessários, digite o seguinte comando no Windows </a:t>
             </a:r>
             <a:r>
               <a:rPr lang="pt-BR" dirty="0" err="1" smtClean="0"/>
@@ -4151,7 +4136,6 @@
               <a:rPr lang="pt-BR" dirty="0" smtClean="0"/>
               <a:t>:</a:t>
             </a:r>
-            <a:endParaRPr lang="pt-BR" dirty="0" smtClean="0"/>
           </a:p>
           <a:p>
             <a:r>
@@ -4230,11 +4214,7 @@
             </a:r>
             <a:r>
               <a:rPr lang="pt-BR" dirty="0"/>
-              <a:t>Instalar </a:t>
-            </a:r>
-            <a:r>
-              <a:rPr lang="pt-BR" dirty="0"/>
-              <a:t>os </a:t>
+              <a:t>Instalar os </a:t>
             </a:r>
             <a:r>
               <a:rPr lang="pt-BR" dirty="0" smtClean="0"/>
@@ -4292,21 +4272,13 @@
           <a:p>
             <a:r>
               <a:rPr lang="pt-BR" dirty="0" smtClean="0"/>
-              <a:t>é possível visualizar os pacotes instalados e os pacotes disponíveis, incluindo as imagens para a criação de dispositivos </a:t>
-            </a:r>
-            <a:r>
-              <a:rPr lang="pt-BR" dirty="0" smtClean="0"/>
-              <a:t>virtuais.</a:t>
-            </a:r>
-          </a:p>
-          <a:p>
-            <a:r>
-              <a:rPr lang="pt-BR" dirty="0" smtClean="0"/>
-              <a:t>Os </a:t>
-            </a:r>
-            <a:r>
-              <a:rPr lang="pt-BR" dirty="0" smtClean="0"/>
-              <a:t>pacotes </a:t>
+              <a:t>é possível visualizar os pacotes instalados e os pacotes disponíveis, incluindo as imagens para a criação de dispositivos virtuais.</a:t>
+            </a:r>
+          </a:p>
+          <a:p>
+            <a:r>
+              <a:rPr lang="pt-BR" dirty="0" smtClean="0"/>
+              <a:t>Os pacotes </a:t>
             </a:r>
             <a:r>
               <a:rPr lang="pt-BR" b="1" i="1" dirty="0" smtClean="0"/>
@@ -4977,11 +4949,7 @@
             </a:r>
             <a:r>
               <a:rPr lang="pt-BR" dirty="0"/>
-              <a:t>Instalar </a:t>
-            </a:r>
-            <a:r>
-              <a:rPr lang="pt-BR" dirty="0"/>
-              <a:t>os </a:t>
+              <a:t>Instalar os </a:t>
             </a:r>
             <a:r>
               <a:rPr lang="pt-BR" dirty="0" err="1"/>
@@ -5156,11 +5124,7 @@
             </a:r>
             <a:r>
               <a:rPr lang="pt-BR" dirty="0"/>
-              <a:t>Instalar </a:t>
-            </a:r>
-            <a:r>
-              <a:rPr lang="pt-BR" dirty="0"/>
-              <a:t>os </a:t>
+              <a:t>Instalar os </a:t>
             </a:r>
             <a:r>
               <a:rPr lang="pt-BR" dirty="0" err="1"/>
@@ -5201,11 +5165,7 @@
             <a:pPr algn="l"/>
             <a:r>
               <a:rPr lang="pt-BR" b="1" i="1" dirty="0" smtClean="0"/>
-              <a:t>“</a:t>
-            </a:r>
-            <a:r>
-              <a:rPr lang="pt-BR" b="1" i="1" dirty="0" smtClean="0"/>
-              <a:t>imagem”</a:t>
+              <a:t>“imagem”</a:t>
             </a:r>
             <a:r>
               <a:rPr lang="pt-BR" dirty="0" smtClean="0"/>
@@ -5433,11 +5393,7 @@
             </a:r>
             <a:r>
               <a:rPr lang="pt-BR" dirty="0"/>
-              <a:t>Instalar </a:t>
-            </a:r>
-            <a:r>
-              <a:rPr lang="pt-BR" dirty="0"/>
-              <a:t>os </a:t>
+              <a:t>Instalar os </a:t>
             </a:r>
             <a:r>
               <a:rPr lang="pt-BR" dirty="0" err="1"/>
@@ -7013,11 +6969,7 @@
             </a:r>
             <a:r>
               <a:rPr lang="pt-BR" dirty="0" smtClean="0"/>
-              <a:t>e, se necessário, </a:t>
-            </a:r>
-            <a:r>
-              <a:rPr lang="pt-BR" dirty="0" smtClean="0"/>
-              <a:t>altere as configurações referentes a localização do SDK do </a:t>
+              <a:t>e, se necessário, altere as configurações referentes a localização do SDK do </a:t>
             </a:r>
             <a:r>
               <a:rPr lang="pt-BR" dirty="0" err="1" smtClean="0"/>
@@ -7029,19 +6981,7 @@
             </a:r>
             <a:r>
               <a:rPr lang="pt-BR" dirty="0" smtClean="0"/>
-              <a:t> </a:t>
-            </a:r>
-            <a:r>
-              <a:rPr lang="pt-BR" dirty="0" smtClean="0"/>
-              <a:t>do JDK do </a:t>
-            </a:r>
-            <a:r>
-              <a:rPr lang="pt-BR" dirty="0" smtClean="0"/>
-              <a:t>Java e do NDK </a:t>
-            </a:r>
-            <a:r>
-              <a:rPr lang="pt-BR" dirty="0" smtClean="0"/>
-              <a:t>na caixa </a:t>
+              <a:t> do JDK do Java e do NDK na caixa </a:t>
             </a:r>
             <a:r>
               <a:rPr lang="pt-BR" dirty="0"/>
@@ -7197,7 +7137,6 @@
               <a:rPr lang="pt-BR" dirty="0" smtClean="0"/>
               <a:t>;</a:t>
             </a:r>
-            <a:endParaRPr lang="pt-BR" dirty="0" smtClean="0"/>
           </a:p>
           <a:p>
             <a:pPr marL="514350" indent="-514350" algn="l">
@@ -8311,12 +8250,12 @@
         <p:spPr>
           <a:xfrm>
             <a:off x="838198" y="1825624"/>
-            <a:ext cx="6027823" cy="4312417"/>
+            <a:ext cx="6027823" cy="4693163"/>
           </a:xfrm>
         </p:spPr>
         <p:txBody>
           <a:bodyPr>
-            <a:normAutofit fontScale="92500" lnSpcReduction="20000"/>
+            <a:normAutofit/>
           </a:bodyPr>
           <a:lstStyle/>
           <a:p>
@@ -8399,168 +8338,24 @@
             </a:r>
             <a:r>
               <a:rPr lang="en-US" dirty="0" smtClean="0"/>
-              <a:t>;</a:t>
-            </a:r>
+              <a:t>; e</a:t>
+            </a:r>
+            <a:endParaRPr lang="en-US" dirty="0" smtClean="0"/>
           </a:p>
           <a:p>
             <a:r>
               <a:rPr lang="en-US" b="1" i="1" dirty="0" smtClean="0"/>
-              <a:t>Product Name</a:t>
-            </a:r>
-            <a:r>
-              <a:rPr lang="en-US" dirty="0" smtClean="0"/>
-              <a:t>; e</a:t>
-            </a:r>
-            <a:endParaRPr lang="en-US" dirty="0"/>
-          </a:p>
-          <a:p>
+              <a:t>Product </a:t>
+            </a:r>
             <a:r>
               <a:rPr lang="en-US" b="1" i="1" dirty="0" smtClean="0"/>
-              <a:t>Package Name</a:t>
-            </a:r>
-            <a:r>
-              <a:rPr lang="en-US" dirty="0" smtClean="0"/>
-              <a:t> (</a:t>
-            </a:r>
-            <a:r>
-              <a:rPr lang="en-US" dirty="0" err="1" smtClean="0"/>
-              <a:t>respeite</a:t>
-            </a:r>
-            <a:r>
-              <a:rPr lang="en-US" dirty="0" smtClean="0"/>
-              <a:t> o </a:t>
-            </a:r>
-            <a:r>
-              <a:rPr lang="en-US" dirty="0" err="1" smtClean="0"/>
-              <a:t>formato</a:t>
-            </a:r>
-            <a:r>
-              <a:rPr lang="en-US" dirty="0" smtClean="0"/>
-              <a:t> DNS </a:t>
-            </a:r>
-            <a:r>
-              <a:rPr lang="en-US" dirty="0" err="1" smtClean="0"/>
-              <a:t>reverso</a:t>
-            </a:r>
-            <a:r>
-              <a:rPr lang="en-US" dirty="0" smtClean="0"/>
-              <a:t>) </a:t>
-            </a:r>
-            <a:r>
-              <a:rPr lang="en-US" dirty="0" err="1" smtClean="0"/>
-              <a:t>na</a:t>
-            </a:r>
-            <a:r>
-              <a:rPr lang="en-US" dirty="0" smtClean="0"/>
-              <a:t> </a:t>
-            </a:r>
-            <a:r>
-              <a:rPr lang="en-US" dirty="0" err="1" smtClean="0"/>
-              <a:t>seção</a:t>
-            </a:r>
-            <a:r>
-              <a:rPr lang="en-US" dirty="0" smtClean="0"/>
-              <a:t> </a:t>
-            </a:r>
-            <a:r>
-              <a:rPr lang="en-US" b="1" i="1" dirty="0" smtClean="0"/>
-              <a:t>Other Settings</a:t>
-            </a:r>
-            <a:r>
-              <a:rPr lang="en-US" dirty="0" smtClean="0"/>
+              <a:t>Name</a:t>
+            </a:r>
+            <a:r>
+              <a:rPr lang="en-US" dirty="0"/>
               <a:t>.</a:t>
             </a:r>
             <a:endParaRPr lang="en-US" dirty="0" smtClean="0"/>
-          </a:p>
-          <a:p>
-            <a:pPr marL="0" indent="0">
-              <a:buNone/>
-            </a:pPr>
-            <a:r>
-              <a:rPr lang="en-US" dirty="0" err="1"/>
-              <a:t>Mantenha</a:t>
-            </a:r>
-            <a:r>
-              <a:rPr lang="en-US" dirty="0"/>
-              <a:t> as </a:t>
-            </a:r>
-            <a:r>
-              <a:rPr lang="en-US" dirty="0" err="1"/>
-              <a:t>demais</a:t>
-            </a:r>
-            <a:r>
-              <a:rPr lang="en-US" dirty="0"/>
-              <a:t> </a:t>
-            </a:r>
-            <a:r>
-              <a:rPr lang="en-US" dirty="0" err="1" smtClean="0"/>
-              <a:t>opções</a:t>
-            </a:r>
-            <a:r>
-              <a:rPr lang="en-US" dirty="0" smtClean="0"/>
-              <a:t> d</a:t>
-            </a:r>
-            <a:r>
-              <a:rPr lang="pt-BR" dirty="0" smtClean="0"/>
-              <a:t>a </a:t>
-            </a:r>
-            <a:r>
-              <a:rPr lang="pt-BR" dirty="0"/>
-              <a:t>caixa de diálogo </a:t>
-            </a:r>
-            <a:r>
-              <a:rPr lang="pt-BR" b="1" i="1" dirty="0"/>
-              <a:t>Build Settings</a:t>
-            </a:r>
-            <a:r>
-              <a:rPr lang="en-US" dirty="0" smtClean="0"/>
-              <a:t> </a:t>
-            </a:r>
-            <a:r>
-              <a:rPr lang="en-US" dirty="0"/>
-              <a:t>com </a:t>
-            </a:r>
-            <a:r>
-              <a:rPr lang="en-US" dirty="0" err="1"/>
-              <a:t>os</a:t>
-            </a:r>
-            <a:r>
-              <a:rPr lang="en-US" dirty="0"/>
-              <a:t> </a:t>
-            </a:r>
-            <a:r>
-              <a:rPr lang="en-US" dirty="0" err="1"/>
-              <a:t>valores</a:t>
-            </a:r>
-            <a:r>
-              <a:rPr lang="en-US" dirty="0"/>
-              <a:t> </a:t>
-            </a:r>
-            <a:r>
-              <a:rPr lang="en-US" dirty="0" err="1"/>
-              <a:t>padrão</a:t>
-            </a:r>
-            <a:r>
-              <a:rPr lang="en-US" dirty="0"/>
-              <a:t> e clique no </a:t>
-            </a:r>
-            <a:r>
-              <a:rPr lang="en-US" dirty="0" err="1"/>
-              <a:t>botão</a:t>
-            </a:r>
-            <a:r>
-              <a:rPr lang="en-US" dirty="0"/>
-              <a:t> </a:t>
-            </a:r>
-            <a:r>
-              <a:rPr lang="en-US" b="1" i="1" dirty="0" smtClean="0"/>
-              <a:t>Build And Run</a:t>
-            </a:r>
-            <a:r>
-              <a:rPr lang="en-US" dirty="0" smtClean="0"/>
-              <a:t>.</a:t>
-            </a:r>
-            <a:endParaRPr lang="en-US" dirty="0"/>
           </a:p>
         </p:txBody>
       </p:sp>
@@ -8631,31 +8426,8 @@
         </p:blipFill>
         <p:spPr>
           <a:xfrm>
-            <a:off x="7090611" y="1825624"/>
-            <a:ext cx="4979589" cy="1387476"/>
-          </a:xfrm>
-          <a:prstGeom prst="rect">
-            <a:avLst/>
-          </a:prstGeom>
-        </p:spPr>
-      </p:pic>
-      <p:pic>
-        <p:nvPicPr>
-          <p:cNvPr id="8" name="Imagem 7"/>
-          <p:cNvPicPr>
-            <a:picLocks noChangeAspect="1"/>
-          </p:cNvPicPr>
-          <p:nvPr/>
-        </p:nvPicPr>
-        <p:blipFill rotWithShape="1">
-          <a:blip r:embed="rId3"/>
-          <a:srcRect b="69944"/>
-          <a:stretch/>
-        </p:blipFill>
-        <p:spPr>
-          <a:xfrm>
-            <a:off x="7090611" y="3681774"/>
-            <a:ext cx="4979589" cy="1512526"/>
+            <a:off x="7090611" y="1825623"/>
+            <a:ext cx="4932577" cy="1374377"/>
           </a:xfrm>
           <a:prstGeom prst="rect">
             <a:avLst/>
@@ -8701,50 +8473,24 @@
       </p:grpSpPr>
       <p:sp>
         <p:nvSpPr>
-          <p:cNvPr id="5" name="Título 4"/>
-          <p:cNvSpPr>
-            <a:spLocks noGrp="1"/>
-          </p:cNvSpPr>
-          <p:nvPr>
-            <p:ph type="title"/>
-          </p:nvPr>
-        </p:nvSpPr>
-        <p:spPr/>
-        <p:txBody>
-          <a:bodyPr>
-            <a:normAutofit fontScale="90000"/>
-          </a:bodyPr>
-          <a:lstStyle/>
-          <a:p>
-            <a:r>
-              <a:rPr lang="pt-BR" dirty="0"/>
-              <a:t>5</a:t>
-            </a:r>
-            <a:r>
-              <a:rPr lang="pt-BR" dirty="0" smtClean="0"/>
-              <a:t>. </a:t>
-            </a:r>
-            <a:r>
-              <a:rPr lang="pt-BR" dirty="0"/>
-              <a:t>Instalar e executar o jogo no emulador</a:t>
-            </a:r>
-          </a:p>
-        </p:txBody>
-      </p:sp>
-      <p:sp>
-        <p:nvSpPr>
-          <p:cNvPr id="6" name="Espaço Reservado para Conteúdo 5"/>
-          <p:cNvSpPr>
-            <a:spLocks noGrp="1"/>
-          </p:cNvSpPr>
-          <p:nvPr>
-            <p:ph idx="1"/>
+          <p:cNvPr id="12" name="Content Placeholder 11">
+            <a:extLst>
+              <a:ext uri="{FF2B5EF4-FFF2-40B4-BE49-F238E27FC236}">
+                <a16:creationId xmlns:a16="http://schemas.microsoft.com/office/drawing/2014/main" id="{B0873720-DB04-4E01-807D-83B22CC60437}"/>
+              </a:ext>
+            </a:extLst>
+          </p:cNvPr>
+          <p:cNvSpPr>
+            <a:spLocks noGrp="1"/>
+          </p:cNvSpPr>
+          <p:nvPr>
+            <p:ph sz="half" idx="1"/>
           </p:nvPr>
         </p:nvSpPr>
         <p:spPr>
           <a:xfrm>
-            <a:off x="317694" y="1291051"/>
-            <a:ext cx="11705493" cy="5254127"/>
+            <a:off x="838198" y="1825625"/>
+            <a:ext cx="6027823" cy="3915580"/>
           </a:xfrm>
         </p:spPr>
         <p:txBody>
@@ -8753,89 +8499,236 @@
           </a:bodyPr>
           <a:lstStyle/>
           <a:p>
-            <a:r>
-              <a:rPr lang="pt-BR" dirty="0" smtClean="0"/>
-              <a:t>Para instalar o aplicativo no dispositivo virtual, basta arrastar o arquivo .</a:t>
-            </a:r>
-            <a:r>
-              <a:rPr lang="pt-BR" dirty="0" err="1" smtClean="0"/>
-              <a:t>apk</a:t>
-            </a:r>
-            <a:r>
-              <a:rPr lang="pt-BR" dirty="0" smtClean="0"/>
-              <a:t>, gerado no passo anterior, para o dispositivo:</a:t>
-            </a:r>
-            <a:endParaRPr lang="pt-BR" dirty="0"/>
-          </a:p>
-        </p:txBody>
-      </p:sp>
-      <p:grpSp>
-        <p:nvGrpSpPr>
-          <p:cNvPr id="8" name="Agrupar 7"/>
-          <p:cNvGrpSpPr/>
+            <a:pPr marL="0" indent="0">
+              <a:buNone/>
+            </a:pPr>
+            <a:r>
+              <a:rPr lang="en-US" dirty="0" smtClean="0"/>
+              <a:t>No </a:t>
+            </a:r>
+            <a:r>
+              <a:rPr lang="en-US" dirty="0" err="1" smtClean="0"/>
+              <a:t>painel</a:t>
+            </a:r>
+            <a:r>
+              <a:rPr lang="en-US" dirty="0" smtClean="0"/>
+              <a:t> </a:t>
+            </a:r>
+            <a:r>
+              <a:rPr lang="en-US" b="1" i="1" dirty="0" smtClean="0"/>
+              <a:t>Project Settings</a:t>
+            </a:r>
+            <a:r>
+              <a:rPr lang="en-US" dirty="0" smtClean="0"/>
+              <a:t>, item </a:t>
+            </a:r>
+            <a:r>
+              <a:rPr lang="en-US" b="1" i="1" dirty="0" smtClean="0"/>
+              <a:t>Player</a:t>
+            </a:r>
+            <a:r>
+              <a:rPr lang="en-US" dirty="0" smtClean="0"/>
+              <a:t>, </a:t>
+            </a:r>
+            <a:r>
+              <a:rPr lang="en-US" dirty="0" err="1" smtClean="0"/>
+              <a:t>seção</a:t>
+            </a:r>
+            <a:r>
+              <a:rPr lang="en-US" dirty="0" smtClean="0"/>
+              <a:t> Other Settings </a:t>
+            </a:r>
+            <a:r>
+              <a:rPr lang="en-US" dirty="0" err="1" smtClean="0"/>
+              <a:t>altere</a:t>
+            </a:r>
+            <a:r>
+              <a:rPr lang="en-US" dirty="0" smtClean="0"/>
+              <a:t> </a:t>
+            </a:r>
+            <a:r>
+              <a:rPr lang="en-US" dirty="0" err="1" smtClean="0"/>
+              <a:t>os</a:t>
+            </a:r>
+            <a:r>
+              <a:rPr lang="en-US" dirty="0" smtClean="0"/>
+              <a:t> </a:t>
+            </a:r>
+            <a:r>
+              <a:rPr lang="en-US" dirty="0" err="1" smtClean="0"/>
+              <a:t>valores</a:t>
+            </a:r>
+            <a:r>
+              <a:rPr lang="en-US" dirty="0" smtClean="0"/>
+              <a:t> das </a:t>
+            </a:r>
+            <a:r>
+              <a:rPr lang="en-US" dirty="0" err="1" smtClean="0"/>
+              <a:t>seguintes</a:t>
+            </a:r>
+            <a:r>
+              <a:rPr lang="en-US" dirty="0" smtClean="0"/>
+              <a:t> </a:t>
+            </a:r>
+            <a:r>
+              <a:rPr lang="en-US" dirty="0" err="1" smtClean="0"/>
+              <a:t>propriedades</a:t>
+            </a:r>
+            <a:r>
+              <a:rPr lang="en-US" dirty="0" smtClean="0"/>
+              <a:t>:</a:t>
+            </a:r>
+            <a:endParaRPr lang="en-US" dirty="0" smtClean="0"/>
+          </a:p>
+          <a:p>
+            <a:r>
+              <a:rPr lang="en-US" b="1" i="1" dirty="0" smtClean="0"/>
+              <a:t>Package </a:t>
+            </a:r>
+            <a:r>
+              <a:rPr lang="en-US" b="1" i="1" dirty="0" smtClean="0"/>
+              <a:t>Name</a:t>
+            </a:r>
+            <a:r>
+              <a:rPr lang="en-US" dirty="0" smtClean="0"/>
+              <a:t> (</a:t>
+            </a:r>
+            <a:r>
+              <a:rPr lang="en-US" dirty="0" err="1" smtClean="0"/>
+              <a:t>respeite</a:t>
+            </a:r>
+            <a:r>
+              <a:rPr lang="en-US" dirty="0" smtClean="0"/>
+              <a:t> o </a:t>
+            </a:r>
+            <a:r>
+              <a:rPr lang="en-US" dirty="0" err="1" smtClean="0"/>
+              <a:t>formato</a:t>
+            </a:r>
+            <a:r>
+              <a:rPr lang="en-US" dirty="0" smtClean="0"/>
+              <a:t> DNS </a:t>
+            </a:r>
+            <a:r>
+              <a:rPr lang="en-US" dirty="0" err="1" smtClean="0"/>
+              <a:t>reverso</a:t>
+            </a:r>
+            <a:r>
+              <a:rPr lang="en-US" dirty="0" smtClean="0"/>
+              <a:t>)</a:t>
+            </a:r>
+            <a:r>
+              <a:rPr lang="en-US" dirty="0" smtClean="0"/>
+              <a:t>; e</a:t>
+            </a:r>
+          </a:p>
+          <a:p>
+            <a:r>
+              <a:rPr lang="en-US" b="1" i="1" dirty="0" smtClean="0"/>
+              <a:t>Target Architectures</a:t>
+            </a:r>
+            <a:r>
+              <a:rPr lang="en-US" dirty="0" smtClean="0"/>
+              <a:t> (</a:t>
+            </a:r>
+            <a:r>
+              <a:rPr lang="en-US" dirty="0" err="1" smtClean="0"/>
+              <a:t>selecione</a:t>
+            </a:r>
+            <a:r>
+              <a:rPr lang="en-US" dirty="0" smtClean="0"/>
+              <a:t> a </a:t>
+            </a:r>
+            <a:r>
+              <a:rPr lang="en-US" dirty="0" err="1" smtClean="0"/>
+              <a:t>opção</a:t>
+            </a:r>
+            <a:r>
+              <a:rPr lang="en-US" dirty="0" smtClean="0"/>
+              <a:t> x86).</a:t>
+            </a:r>
+            <a:endParaRPr lang="en-US" dirty="0" smtClean="0"/>
+          </a:p>
+        </p:txBody>
+      </p:sp>
+      <p:sp>
+        <p:nvSpPr>
+          <p:cNvPr id="6" name="Título 4"/>
+          <p:cNvSpPr txBox="1">
+            <a:spLocks/>
+          </p:cNvSpPr>
           <p:nvPr/>
-        </p:nvGrpSpPr>
-        <p:grpSpPr>
+        </p:nvSpPr>
+        <p:spPr>
           <a:xfrm>
-            <a:off x="3346002" y="2502568"/>
-            <a:ext cx="5499997" cy="3884027"/>
-            <a:chOff x="1998490" y="984414"/>
-            <a:chExt cx="8308562" cy="5867400"/>
+            <a:off x="0" y="224449"/>
+            <a:ext cx="12023188" cy="858764"/>
           </a:xfrm>
-        </p:grpSpPr>
-        <p:pic>
-          <p:nvPicPr>
-            <p:cNvPr id="3" name="Imagem 2"/>
-            <p:cNvPicPr>
-              <a:picLocks noChangeAspect="1"/>
-            </p:cNvPicPr>
-            <p:nvPr/>
-          </p:nvPicPr>
-          <p:blipFill>
-            <a:blip r:embed="rId2"/>
-            <a:stretch>
-              <a:fillRect/>
-            </a:stretch>
-          </p:blipFill>
-          <p:spPr>
-            <a:xfrm>
-              <a:off x="1998490" y="2856748"/>
-              <a:ext cx="4171950" cy="2524125"/>
-            </a:xfrm>
-            <a:prstGeom prst="rect">
-              <a:avLst/>
-            </a:prstGeom>
-          </p:spPr>
-        </p:pic>
-        <p:pic>
-          <p:nvPicPr>
-            <p:cNvPr id="4" name="Imagem 3"/>
-            <p:cNvPicPr>
-              <a:picLocks noChangeAspect="1"/>
-            </p:cNvPicPr>
-            <p:nvPr/>
-          </p:nvPicPr>
-          <p:blipFill>
-            <a:blip r:embed="rId3"/>
-            <a:stretch>
-              <a:fillRect/>
-            </a:stretch>
-          </p:blipFill>
-          <p:spPr>
-            <a:xfrm>
-              <a:off x="6954252" y="984414"/>
-              <a:ext cx="3352800" cy="5867400"/>
-            </a:xfrm>
-            <a:prstGeom prst="rect">
-              <a:avLst/>
-            </a:prstGeom>
-          </p:spPr>
-        </p:pic>
-      </p:grpSp>
+          <a:prstGeom prst="rect">
+            <a:avLst/>
+          </a:prstGeom>
+        </p:spPr>
+        <p:txBody>
+          <a:bodyPr vert="horz" lIns="91440" tIns="45720" rIns="91440" bIns="45720" rtlCol="0" anchor="ctr">
+            <a:normAutofit/>
+          </a:bodyPr>
+          <a:lstStyle>
+            <a:lvl1pPr algn="l" defTabSz="914400" rtl="0" eaLnBrk="1" latinLnBrk="0" hangingPunct="1">
+              <a:lnSpc>
+                <a:spcPct val="90000"/>
+              </a:lnSpc>
+              <a:spcBef>
+                <a:spcPct val="0"/>
+              </a:spcBef>
+              <a:buNone/>
+              <a:defRPr sz="4400" kern="1200">
+                <a:solidFill>
+                  <a:schemeClr val="accent1">
+                    <a:lumMod val="50000"/>
+                  </a:schemeClr>
+                </a:solidFill>
+                <a:latin typeface="Helvetica" panose="020B0604020202020204" pitchFamily="34" charset="0"/>
+                <a:ea typeface="+mj-ea"/>
+                <a:cs typeface="Helvetica" panose="020B0604020202020204" pitchFamily="34" charset="0"/>
+              </a:defRPr>
+            </a:lvl1pPr>
+          </a:lstStyle>
+          <a:p>
+            <a:pPr algn="ctr"/>
+            <a:r>
+              <a:rPr lang="pt-BR" sz="5400" dirty="0" smtClean="0"/>
+              <a:t>4. Gerar o arquivo APK do jogo</a:t>
+            </a:r>
+            <a:endParaRPr lang="pt-BR" sz="5400" dirty="0"/>
+          </a:p>
+        </p:txBody>
+      </p:sp>
+      <p:pic>
+        <p:nvPicPr>
+          <p:cNvPr id="3" name="Imagem 2"/>
+          <p:cNvPicPr>
+            <a:picLocks noChangeAspect="1"/>
+          </p:cNvPicPr>
+          <p:nvPr/>
+        </p:nvPicPr>
+        <p:blipFill rotWithShape="1">
+          <a:blip r:embed="rId2"/>
+          <a:stretch/>
+        </p:blipFill>
+        <p:spPr>
+          <a:xfrm>
+            <a:off x="7090612" y="1825625"/>
+            <a:ext cx="4604860" cy="3948995"/>
+          </a:xfrm>
+          <a:prstGeom prst="rect">
+            <a:avLst/>
+          </a:prstGeom>
+        </p:spPr>
+      </p:pic>
     </p:spTree>
     <p:extLst>
       <p:ext uri="{BB962C8B-B14F-4D97-AF65-F5344CB8AC3E}">
-        <p14:creationId xmlns:p14="http://schemas.microsoft.com/office/powerpoint/2010/main" val="2179465921"/>
+        <p14:creationId xmlns:p14="http://schemas.microsoft.com/office/powerpoint/2010/main" val="1637962596"/>
       </p:ext>
     </p:extLst>
   </p:cSld>
@@ -8871,6 +8764,238 @@
       </p:grpSpPr>
       <p:sp>
         <p:nvSpPr>
+          <p:cNvPr id="12" name="Content Placeholder 11">
+            <a:extLst>
+              <a:ext uri="{FF2B5EF4-FFF2-40B4-BE49-F238E27FC236}">
+                <a16:creationId xmlns:a16="http://schemas.microsoft.com/office/drawing/2014/main" id="{B0873720-DB04-4E01-807D-83B22CC60437}"/>
+              </a:ext>
+            </a:extLst>
+          </p:cNvPr>
+          <p:cNvSpPr>
+            <a:spLocks noGrp="1"/>
+          </p:cNvSpPr>
+          <p:nvPr>
+            <p:ph sz="half" idx="1"/>
+          </p:nvPr>
+        </p:nvSpPr>
+        <p:spPr>
+          <a:xfrm>
+            <a:off x="838198" y="1825624"/>
+            <a:ext cx="5919953" cy="4312417"/>
+          </a:xfrm>
+        </p:spPr>
+        <p:txBody>
+          <a:bodyPr>
+            <a:normAutofit/>
+          </a:bodyPr>
+          <a:lstStyle/>
+          <a:p>
+            <a:pPr marL="0" indent="0">
+              <a:buNone/>
+            </a:pPr>
+            <a:r>
+              <a:rPr lang="en-US" dirty="0" err="1"/>
+              <a:t>Mantenha</a:t>
+            </a:r>
+            <a:r>
+              <a:rPr lang="en-US" dirty="0"/>
+              <a:t> as </a:t>
+            </a:r>
+            <a:r>
+              <a:rPr lang="en-US" dirty="0" err="1"/>
+              <a:t>demais</a:t>
+            </a:r>
+            <a:r>
+              <a:rPr lang="en-US" dirty="0"/>
+              <a:t> </a:t>
+            </a:r>
+            <a:r>
+              <a:rPr lang="en-US" dirty="0" err="1"/>
+              <a:t>opções</a:t>
+            </a:r>
+            <a:r>
+              <a:rPr lang="en-US" dirty="0"/>
+              <a:t> d</a:t>
+            </a:r>
+            <a:r>
+              <a:rPr lang="pt-BR" dirty="0"/>
+              <a:t>a caixa de diálogo </a:t>
+            </a:r>
+            <a:r>
+              <a:rPr lang="pt-BR" b="1" i="1" dirty="0"/>
+              <a:t>Build Settings</a:t>
+            </a:r>
+            <a:r>
+              <a:rPr lang="en-US" dirty="0"/>
+              <a:t> com </a:t>
+            </a:r>
+            <a:r>
+              <a:rPr lang="en-US" dirty="0" err="1"/>
+              <a:t>os</a:t>
+            </a:r>
+            <a:r>
+              <a:rPr lang="en-US" dirty="0"/>
+              <a:t> </a:t>
+            </a:r>
+            <a:r>
+              <a:rPr lang="en-US" dirty="0" err="1"/>
+              <a:t>valores</a:t>
+            </a:r>
+            <a:r>
+              <a:rPr lang="en-US" dirty="0"/>
+              <a:t> </a:t>
+            </a:r>
+            <a:r>
+              <a:rPr lang="en-US" dirty="0" err="1"/>
+              <a:t>padrão</a:t>
+            </a:r>
+            <a:r>
+              <a:rPr lang="en-US" dirty="0"/>
+              <a:t> e clique no </a:t>
+            </a:r>
+            <a:r>
+              <a:rPr lang="en-US" dirty="0" err="1"/>
+              <a:t>botão</a:t>
+            </a:r>
+            <a:r>
+              <a:rPr lang="en-US" dirty="0"/>
+              <a:t> </a:t>
+            </a:r>
+            <a:r>
+              <a:rPr lang="en-US" b="1" i="1" dirty="0"/>
+              <a:t>Build And Run</a:t>
+            </a:r>
+            <a:r>
+              <a:rPr lang="en-US" dirty="0"/>
+              <a:t>.</a:t>
+            </a:r>
+            <a:endParaRPr lang="en-US" dirty="0"/>
+          </a:p>
+        </p:txBody>
+      </p:sp>
+      <p:sp>
+        <p:nvSpPr>
+          <p:cNvPr id="6" name="Título 4"/>
+          <p:cNvSpPr txBox="1">
+            <a:spLocks/>
+          </p:cNvSpPr>
+          <p:nvPr/>
+        </p:nvSpPr>
+        <p:spPr>
+          <a:xfrm>
+            <a:off x="0" y="224449"/>
+            <a:ext cx="12023188" cy="858764"/>
+          </a:xfrm>
+          <a:prstGeom prst="rect">
+            <a:avLst/>
+          </a:prstGeom>
+        </p:spPr>
+        <p:txBody>
+          <a:bodyPr vert="horz" lIns="91440" tIns="45720" rIns="91440" bIns="45720" rtlCol="0" anchor="ctr">
+            <a:normAutofit fontScale="92500"/>
+          </a:bodyPr>
+          <a:lstStyle>
+            <a:lvl1pPr algn="l" defTabSz="914400" rtl="0" eaLnBrk="1" latinLnBrk="0" hangingPunct="1">
+              <a:lnSpc>
+                <a:spcPct val="90000"/>
+              </a:lnSpc>
+              <a:spcBef>
+                <a:spcPct val="0"/>
+              </a:spcBef>
+              <a:buNone/>
+              <a:defRPr sz="4400" kern="1200">
+                <a:solidFill>
+                  <a:schemeClr val="accent1">
+                    <a:lumMod val="50000"/>
+                  </a:schemeClr>
+                </a:solidFill>
+                <a:latin typeface="Helvetica" panose="020B0604020202020204" pitchFamily="34" charset="0"/>
+                <a:ea typeface="+mj-ea"/>
+                <a:cs typeface="Helvetica" panose="020B0604020202020204" pitchFamily="34" charset="0"/>
+              </a:defRPr>
+            </a:lvl1pPr>
+          </a:lstStyle>
+          <a:p>
+            <a:pPr algn="ctr"/>
+            <a:r>
+              <a:rPr lang="pt-BR" sz="5400" dirty="0"/>
+              <a:t>5</a:t>
+            </a:r>
+            <a:r>
+              <a:rPr lang="pt-BR" sz="5400" dirty="0" smtClean="0"/>
+              <a:t>. </a:t>
+            </a:r>
+            <a:r>
+              <a:rPr lang="pt-BR" sz="5400" dirty="0"/>
+              <a:t>Instalar e executar o jogo no emulador</a:t>
+            </a:r>
+            <a:endParaRPr lang="pt-BR" sz="5400" dirty="0"/>
+          </a:p>
+        </p:txBody>
+      </p:sp>
+      <p:pic>
+        <p:nvPicPr>
+          <p:cNvPr id="2" name="Imagem 1"/>
+          <p:cNvPicPr>
+            <a:picLocks noChangeAspect="1"/>
+          </p:cNvPicPr>
+          <p:nvPr/>
+        </p:nvPicPr>
+        <p:blipFill>
+          <a:blip r:embed="rId2"/>
+          <a:stretch>
+            <a:fillRect/>
+          </a:stretch>
+        </p:blipFill>
+        <p:spPr>
+          <a:xfrm>
+            <a:off x="6994423" y="1825624"/>
+            <a:ext cx="4214351" cy="4067649"/>
+          </a:xfrm>
+          <a:prstGeom prst="rect">
+            <a:avLst/>
+          </a:prstGeom>
+        </p:spPr>
+      </p:pic>
+    </p:spTree>
+    <p:extLst>
+      <p:ext uri="{BB962C8B-B14F-4D97-AF65-F5344CB8AC3E}">
+        <p14:creationId xmlns:p14="http://schemas.microsoft.com/office/powerpoint/2010/main" val="1312413537"/>
+      </p:ext>
+    </p:extLst>
+  </p:cSld>
+  <p:clrMapOvr>
+    <a:masterClrMapping/>
+  </p:clrMapOvr>
+  <p:timing>
+    <p:tnLst>
+      <p:par>
+        <p:cTn id="1" dur="indefinite" restart="never" nodeType="tmRoot"/>
+      </p:par>
+    </p:tnLst>
+  </p:timing>
+</p:sld>
+</file>
+
+<file path=ppt/slides/slide38.xml><?xml version="1.0" encoding="utf-8"?>
+<p:sld xmlns:a="http://schemas.openxmlformats.org/drawingml/2006/main" xmlns:r="http://schemas.openxmlformats.org/officeDocument/2006/relationships" xmlns:p="http://schemas.openxmlformats.org/presentationml/2006/main">
+  <p:cSld>
+    <p:spTree>
+      <p:nvGrpSpPr>
+        <p:cNvPr id="1" name=""/>
+        <p:cNvGrpSpPr/>
+        <p:nvPr/>
+      </p:nvGrpSpPr>
+      <p:grpSpPr>
+        <a:xfrm>
+          <a:off x="0" y="0"/>
+          <a:ext cx="0" cy="0"/>
+          <a:chOff x="0" y="0"/>
+          <a:chExt cx="0" cy="0"/>
+        </a:xfrm>
+      </p:grpSpPr>
+      <p:sp>
+        <p:nvSpPr>
           <p:cNvPr id="5" name="Título 4"/>
           <p:cNvSpPr>
             <a:spLocks noGrp="1"/>
@@ -8882,22 +9007,15 @@
         <p:spPr/>
         <p:txBody>
           <a:bodyPr>
-            <a:normAutofit fontScale="90000"/>
+            <a:normAutofit/>
           </a:bodyPr>
           <a:lstStyle/>
           <a:p>
             <a:r>
-              <a:rPr lang="pt-BR" dirty="0"/>
-              <a:t>5</a:t>
-            </a:r>
-            <a:r>
-              <a:rPr lang="pt-BR" dirty="0" smtClean="0"/>
-              <a:t>. </a:t>
-            </a:r>
-            <a:r>
-              <a:rPr lang="pt-BR" dirty="0"/>
-              <a:t>Instalar e executar o jogo no emulador</a:t>
-            </a:r>
+              <a:rPr lang="pt-BR" dirty="0" smtClean="0"/>
+              <a:t>Referências</a:t>
+            </a:r>
+            <a:endParaRPr lang="pt-BR" dirty="0"/>
           </a:p>
         </p:txBody>
       </p:sp>
@@ -8919,80 +9037,246 @@
         </p:spPr>
         <p:txBody>
           <a:bodyPr>
-            <a:normAutofit/>
+            <a:normAutofit fontScale="92500" lnSpcReduction="20000"/>
           </a:bodyPr>
           <a:lstStyle/>
           <a:p>
-            <a:r>
-              <a:rPr lang="pt-BR">
+            <a:pPr marL="514350" indent="-514350" algn="l">
+              <a:buFont typeface="+mj-lt"/>
+              <a:buAutoNum type="arabicPeriod"/>
+            </a:pPr>
+            <a:r>
+              <a:rPr lang="en-US" dirty="0" smtClean="0"/>
+              <a:t>Oracle. </a:t>
+            </a:r>
+            <a:r>
+              <a:rPr lang="en-US" b="1" dirty="0" smtClean="0"/>
+              <a:t>Java </a:t>
+            </a:r>
+            <a:r>
+              <a:rPr lang="en-US" b="1" dirty="0"/>
+              <a:t>SE Development Kit 8 </a:t>
+            </a:r>
+            <a:r>
+              <a:rPr lang="en-US" b="1" dirty="0" smtClean="0"/>
+              <a:t>Downloads</a:t>
+            </a:r>
+            <a:r>
+              <a:rPr lang="en-US" dirty="0" smtClean="0"/>
+              <a:t>. </a:t>
+            </a:r>
+            <a:r>
+              <a:rPr lang="en-US" dirty="0" err="1" smtClean="0"/>
+              <a:t>Disponível</a:t>
+            </a:r>
+            <a:r>
+              <a:rPr lang="en-US" dirty="0" smtClean="0"/>
+              <a:t> </a:t>
+            </a:r>
+            <a:r>
+              <a:rPr lang="en-US" dirty="0" err="1" smtClean="0"/>
+              <a:t>em</a:t>
+            </a:r>
+            <a:r>
+              <a:rPr lang="en-US" dirty="0" smtClean="0"/>
+              <a:t>: </a:t>
+            </a:r>
+            <a:r>
+              <a:rPr lang="pt-BR" dirty="0" smtClean="0">
                 <a:hlinkClick r:id="rId2"/>
               </a:rPr>
-              <a:t>https://</a:t>
-            </a:r>
-            <a:r>
-              <a:rPr lang="pt-BR" smtClean="0">
-                <a:hlinkClick r:id="rId2"/>
+              <a:t>http://www.oracle.com/technetwork/pt/java/javase/downloads/jdk8-downloads-2133151.html</a:t>
+            </a:r>
+            <a:r>
+              <a:rPr lang="pt-BR" dirty="0" smtClean="0"/>
+              <a:t>.</a:t>
+            </a:r>
+          </a:p>
+          <a:p>
+            <a:pPr marL="514350" indent="-514350" algn="l">
+              <a:buFont typeface="+mj-lt"/>
+              <a:buAutoNum type="arabicPeriod"/>
+            </a:pPr>
+            <a:r>
+              <a:rPr lang="pt-BR" dirty="0" err="1" smtClean="0"/>
+              <a:t>Android</a:t>
+            </a:r>
+            <a:r>
+              <a:rPr lang="pt-BR" dirty="0" smtClean="0"/>
+              <a:t> Studio. </a:t>
+            </a:r>
+            <a:r>
+              <a:rPr lang="pt-BR" b="1" dirty="0" smtClean="0"/>
+              <a:t>Download </a:t>
+            </a:r>
+            <a:r>
+              <a:rPr lang="pt-BR" b="1" dirty="0" err="1" smtClean="0"/>
+              <a:t>Android</a:t>
+            </a:r>
+            <a:r>
+              <a:rPr lang="pt-BR" b="1" dirty="0" smtClean="0"/>
+              <a:t> Studio</a:t>
+            </a:r>
+            <a:r>
+              <a:rPr lang="pt-BR" dirty="0" smtClean="0"/>
+              <a:t>. Disponível em: </a:t>
+            </a:r>
+            <a:r>
+              <a:rPr lang="pt-BR" dirty="0" smtClean="0">
+                <a:hlinkClick r:id="rId3"/>
+              </a:rPr>
+              <a:t>https</a:t>
+            </a:r>
+            <a:r>
+              <a:rPr lang="pt-BR" dirty="0">
+                <a:hlinkClick r:id="rId3"/>
+              </a:rPr>
+              <a:t>://developer.android.com/studio</a:t>
+            </a:r>
+            <a:r>
+              <a:rPr lang="pt-BR" dirty="0" smtClean="0">
+                <a:hlinkClick r:id="rId3"/>
+              </a:rPr>
+              <a:t>/</a:t>
+            </a:r>
+            <a:r>
+              <a:rPr lang="pt-BR" dirty="0" smtClean="0"/>
+              <a:t>.</a:t>
+            </a:r>
+          </a:p>
+          <a:p>
+            <a:pPr marL="514350" indent="-514350" algn="l">
+              <a:buFont typeface="+mj-lt"/>
+              <a:buAutoNum type="arabicPeriod"/>
+            </a:pPr>
+            <a:r>
+              <a:rPr lang="pt-BR" dirty="0" err="1" smtClean="0"/>
+              <a:t>Android</a:t>
+            </a:r>
+            <a:r>
+              <a:rPr lang="pt-BR" dirty="0" smtClean="0"/>
+              <a:t> Studio. </a:t>
+            </a:r>
+            <a:r>
+              <a:rPr lang="pt-BR" b="1" dirty="0" err="1" smtClean="0"/>
+              <a:t>User</a:t>
+            </a:r>
+            <a:r>
+              <a:rPr lang="pt-BR" b="1" dirty="0" smtClean="0"/>
+              <a:t> </a:t>
+            </a:r>
+            <a:r>
+              <a:rPr lang="pt-BR" b="1" dirty="0" err="1" smtClean="0"/>
+              <a:t>Guide</a:t>
+            </a:r>
+            <a:r>
+              <a:rPr lang="pt-BR" b="1" dirty="0" smtClean="0"/>
+              <a:t>: </a:t>
+            </a:r>
+            <a:r>
+              <a:rPr lang="pt-BR" b="1" dirty="0" err="1" smtClean="0"/>
+              <a:t>sdkmanager</a:t>
+            </a:r>
+            <a:r>
+              <a:rPr lang="pt-BR" dirty="0" smtClean="0"/>
+              <a:t>. Disponível em: </a:t>
+            </a:r>
+            <a:r>
+              <a:rPr lang="pt-BR" dirty="0" smtClean="0">
+                <a:hlinkClick r:id="rId4"/>
+              </a:rPr>
+              <a:t>https</a:t>
+            </a:r>
+            <a:r>
+              <a:rPr lang="pt-BR" dirty="0">
+                <a:hlinkClick r:id="rId4"/>
+              </a:rPr>
+              <a:t>://</a:t>
+            </a:r>
+            <a:r>
+              <a:rPr lang="pt-BR" dirty="0" smtClean="0">
+                <a:hlinkClick r:id="rId4"/>
+              </a:rPr>
+              <a:t>developer.android.com/studio/command-line/sdkmanager</a:t>
+            </a:r>
+            <a:r>
+              <a:rPr lang="pt-BR" dirty="0" smtClean="0"/>
+              <a:t>.</a:t>
+            </a:r>
+          </a:p>
+          <a:p>
+            <a:pPr marL="514350" indent="-514350" algn="l">
+              <a:buFont typeface="+mj-lt"/>
+              <a:buAutoNum type="arabicPeriod"/>
+            </a:pPr>
+            <a:r>
+              <a:rPr lang="pt-BR" dirty="0" err="1" smtClean="0"/>
+              <a:t>Android</a:t>
+            </a:r>
+            <a:r>
+              <a:rPr lang="pt-BR" dirty="0" smtClean="0"/>
+              <a:t> Studio. </a:t>
+            </a:r>
+            <a:r>
+              <a:rPr lang="pt-BR" b="1" dirty="0" err="1" smtClean="0"/>
+              <a:t>User</a:t>
+            </a:r>
+            <a:r>
+              <a:rPr lang="pt-BR" b="1" dirty="0" smtClean="0"/>
+              <a:t> </a:t>
+            </a:r>
+            <a:r>
+              <a:rPr lang="pt-BR" b="1" dirty="0" err="1" smtClean="0"/>
+              <a:t>Guide</a:t>
+            </a:r>
+            <a:r>
+              <a:rPr lang="pt-BR" b="1" dirty="0"/>
+              <a:t>: </a:t>
+            </a:r>
+            <a:r>
+              <a:rPr lang="pt-BR" b="1" dirty="0" err="1"/>
+              <a:t>Android</a:t>
+            </a:r>
+            <a:r>
+              <a:rPr lang="pt-BR" b="1" dirty="0"/>
+              <a:t> Debug </a:t>
+            </a:r>
+            <a:r>
+              <a:rPr lang="pt-BR" b="1" dirty="0" smtClean="0"/>
+              <a:t>Bridge</a:t>
+            </a:r>
+            <a:r>
+              <a:rPr lang="pt-BR" dirty="0" smtClean="0"/>
+              <a:t>. Disponível em: </a:t>
+            </a:r>
+            <a:r>
+              <a:rPr lang="pt-BR" dirty="0" smtClean="0">
+                <a:hlinkClick r:id="rId5"/>
+              </a:rPr>
+              <a:t>https</a:t>
+            </a:r>
+            <a:r>
+              <a:rPr lang="pt-BR" dirty="0">
+                <a:hlinkClick r:id="rId5"/>
+              </a:rPr>
+              <a:t>://</a:t>
+            </a:r>
+            <a:r>
+              <a:rPr lang="pt-BR" dirty="0" smtClean="0">
+                <a:hlinkClick r:id="rId5"/>
               </a:rPr>
               <a:t>developer.android.com/studio/command-line/adb</a:t>
             </a:r>
-            <a:endParaRPr lang="pt-BR" smtClean="0"/>
-          </a:p>
-          <a:p>
-            <a:endParaRPr lang="pt-BR" smtClean="0"/>
-          </a:p>
-          <a:p>
-            <a:r>
-              <a:rPr lang="pt-BR" dirty="0" smtClean="0"/>
-              <a:t>C</a:t>
-            </a:r>
-            <a:r>
-              <a:rPr lang="pt-BR" dirty="0"/>
-              <a:t>:\Program Files (x86)\</a:t>
-            </a:r>
-            <a:r>
-              <a:rPr lang="pt-BR" dirty="0" err="1"/>
-              <a:t>Android</a:t>
-            </a:r>
-            <a:r>
-              <a:rPr lang="pt-BR" dirty="0"/>
-              <a:t>\</a:t>
-            </a:r>
-            <a:r>
-              <a:rPr lang="pt-BR" dirty="0" err="1"/>
-              <a:t>android-sdk</a:t>
-            </a:r>
-            <a:r>
-              <a:rPr lang="pt-BR" dirty="0"/>
-              <a:t>\</a:t>
-            </a:r>
-            <a:r>
-              <a:rPr lang="pt-BR" dirty="0" err="1"/>
-              <a:t>platform</a:t>
-            </a:r>
-            <a:r>
-              <a:rPr lang="pt-BR" dirty="0"/>
-              <a:t>-tools&gt;</a:t>
-            </a:r>
-            <a:r>
-              <a:rPr lang="pt-BR" dirty="0" err="1"/>
-              <a:t>adb</a:t>
-            </a:r>
-            <a:r>
-              <a:rPr lang="pt-BR" dirty="0"/>
-              <a:t> -s emulator-5554 </a:t>
-            </a:r>
-            <a:r>
-              <a:rPr lang="pt-BR" dirty="0" err="1"/>
-              <a:t>install</a:t>
-            </a:r>
-            <a:r>
-              <a:rPr lang="pt-BR" dirty="0"/>
-              <a:t> </a:t>
-            </a:r>
-            <a:r>
-              <a:rPr lang="pt-BR" dirty="0" err="1" smtClean="0"/>
-              <a:t>spaceshooter.apk</a:t>
-            </a:r>
+            <a:r>
+              <a:rPr lang="pt-BR" dirty="0" smtClean="0"/>
+              <a:t>.</a:t>
+            </a:r>
+          </a:p>
+          <a:p>
+            <a:pPr algn="l"/>
+            <a:endParaRPr lang="pt-BR" dirty="0" smtClean="0"/>
+          </a:p>
+          <a:p>
             <a:endParaRPr lang="pt-BR" dirty="0" smtClean="0"/>
           </a:p>
           <a:p>
@@ -9291,7 +9575,6 @@
               <a:rPr lang="pt-BR" dirty="0"/>
               <a:t>1. Verificar/Instalar o JDK</a:t>
             </a:r>
-            <a:endParaRPr lang="pt-BR" dirty="0"/>
           </a:p>
         </p:txBody>
       </p:sp>
@@ -9478,7 +9761,6 @@
               <a:rPr lang="pt-BR" dirty="0"/>
               <a:t>.</a:t>
             </a:r>
-            <a:endParaRPr lang="pt-BR" dirty="0"/>
           </a:p>
         </p:txBody>
       </p:sp>

</xml_diff>

<commit_message>
adaptação dos comandos para o Windows PowerShell: adição do .\ no início
</commit_message>
<xml_diff>
--- a/building-games-for-Android.pptx
+++ b/building-games-for-Android.pptx
@@ -234,7 +234,7 @@
           <a:p>
             <a:fld id="{94D3EB41-CF60-4C9F-BD83-AE56FA0945EB}" type="datetimeFigureOut">
               <a:rPr lang="pt-BR" smtClean="0"/>
-              <a:t>23/07/2019</a:t>
+              <a:t>24/07/2019</a:t>
             </a:fld>
             <a:endParaRPr lang="pt-BR"/>
           </a:p>
@@ -744,7 +744,7 @@
           <a:p>
             <a:fld id="{9642BF85-54FF-46CE-B398-87F998CFD60B}" type="datetimeFigureOut">
               <a:rPr lang="pt-BR" smtClean="0"/>
-              <a:t>23/07/2019</a:t>
+              <a:t>24/07/2019</a:t>
             </a:fld>
             <a:endParaRPr lang="pt-BR"/>
           </a:p>
@@ -912,7 +912,7 @@
           <a:p>
             <a:fld id="{9642BF85-54FF-46CE-B398-87F998CFD60B}" type="datetimeFigureOut">
               <a:rPr lang="pt-BR" smtClean="0"/>
-              <a:t>23/07/2019</a:t>
+              <a:t>24/07/2019</a:t>
             </a:fld>
             <a:endParaRPr lang="pt-BR"/>
           </a:p>
@@ -1090,7 +1090,7 @@
           <a:p>
             <a:fld id="{9642BF85-54FF-46CE-B398-87F998CFD60B}" type="datetimeFigureOut">
               <a:rPr lang="pt-BR" smtClean="0"/>
-              <a:t>23/07/2019</a:t>
+              <a:t>24/07/2019</a:t>
             </a:fld>
             <a:endParaRPr lang="pt-BR"/>
           </a:p>
@@ -1427,7 +1427,7 @@
           <a:p>
             <a:fld id="{9642BF85-54FF-46CE-B398-87F998CFD60B}" type="datetimeFigureOut">
               <a:rPr lang="pt-BR" smtClean="0"/>
-              <a:t>23/07/2019</a:t>
+              <a:t>24/07/2019</a:t>
             </a:fld>
             <a:endParaRPr lang="pt-BR"/>
           </a:p>
@@ -1698,7 +1698,7 @@
           <a:p>
             <a:fld id="{9642BF85-54FF-46CE-B398-87F998CFD60B}" type="datetimeFigureOut">
               <a:rPr lang="pt-BR" smtClean="0"/>
-              <a:t>23/07/2019</a:t>
+              <a:t>24/07/2019</a:t>
             </a:fld>
             <a:endParaRPr lang="pt-BR"/>
           </a:p>
@@ -1944,7 +1944,7 @@
           <a:p>
             <a:fld id="{9642BF85-54FF-46CE-B398-87F998CFD60B}" type="datetimeFigureOut">
               <a:rPr lang="pt-BR" smtClean="0"/>
-              <a:t>23/07/2019</a:t>
+              <a:t>24/07/2019</a:t>
             </a:fld>
             <a:endParaRPr lang="pt-BR"/>
           </a:p>
@@ -2308,7 +2308,7 @@
           <a:p>
             <a:fld id="{9642BF85-54FF-46CE-B398-87F998CFD60B}" type="datetimeFigureOut">
               <a:rPr lang="pt-BR" smtClean="0"/>
-              <a:t>23/07/2019</a:t>
+              <a:t>24/07/2019</a:t>
             </a:fld>
             <a:endParaRPr lang="pt-BR"/>
           </a:p>
@@ -2442,7 +2442,7 @@
           <a:p>
             <a:fld id="{9642BF85-54FF-46CE-B398-87F998CFD60B}" type="datetimeFigureOut">
               <a:rPr lang="pt-BR" smtClean="0"/>
-              <a:t>23/07/2019</a:t>
+              <a:t>24/07/2019</a:t>
             </a:fld>
             <a:endParaRPr lang="pt-BR"/>
           </a:p>
@@ -2537,7 +2537,7 @@
           <a:p>
             <a:fld id="{9642BF85-54FF-46CE-B398-87F998CFD60B}" type="datetimeFigureOut">
               <a:rPr lang="pt-BR" smtClean="0"/>
-              <a:t>23/07/2019</a:t>
+              <a:t>24/07/2019</a:t>
             </a:fld>
             <a:endParaRPr lang="pt-BR"/>
           </a:p>
@@ -2812,7 +2812,7 @@
           <a:p>
             <a:fld id="{9642BF85-54FF-46CE-B398-87F998CFD60B}" type="datetimeFigureOut">
               <a:rPr lang="pt-BR" smtClean="0"/>
-              <a:t>23/07/2019</a:t>
+              <a:t>24/07/2019</a:t>
             </a:fld>
             <a:endParaRPr lang="pt-BR"/>
           </a:p>
@@ -3064,7 +3064,7 @@
           <a:p>
             <a:fld id="{9642BF85-54FF-46CE-B398-87F998CFD60B}" type="datetimeFigureOut">
               <a:rPr lang="pt-BR" smtClean="0"/>
-              <a:t>23/07/2019</a:t>
+              <a:t>24/07/2019</a:t>
             </a:fld>
             <a:endParaRPr lang="pt-BR"/>
           </a:p>
@@ -3284,7 +3284,7 @@
           <a:p>
             <a:fld id="{9642BF85-54FF-46CE-B398-87F998CFD60B}" type="datetimeFigureOut">
               <a:rPr lang="pt-BR" smtClean="0"/>
-              <a:t>23/07/2019</a:t>
+              <a:t>24/07/2019</a:t>
             </a:fld>
             <a:endParaRPr lang="pt-BR"/>
           </a:p>
@@ -4140,11 +4140,19 @@
           <a:p>
             <a:r>
               <a:rPr lang="pt-BR" dirty="0" smtClean="0"/>
-              <a:t>C:\android-sdk\tools\bin&gt;</a:t>
+              <a:t>C:\android-sdk\tools\bin</a:t>
+            </a:r>
+            <a:r>
+              <a:rPr lang="pt-BR" dirty="0" smtClean="0"/>
+              <a:t>&gt;.\</a:t>
             </a:r>
             <a:r>
               <a:rPr lang="pt-BR" b="1" i="1" dirty="0" smtClean="0"/>
-              <a:t>sdkmanager --</a:t>
+              <a:t>sdkmanager </a:t>
+            </a:r>
+            <a:r>
+              <a:rPr lang="pt-BR" b="1" i="1" dirty="0" smtClean="0"/>
+              <a:t>--</a:t>
             </a:r>
             <a:r>
               <a:rPr lang="pt-BR" b="1" i="1" dirty="0" err="1" smtClean="0"/>
@@ -4249,11 +4257,19 @@
           <a:p>
             <a:r>
               <a:rPr lang="pt-BR" dirty="0" smtClean="0"/>
-              <a:t>C:\android-sdk\tools\bin&gt;</a:t>
+              <a:t>C:\android-sdk\tools\bin</a:t>
+            </a:r>
+            <a:r>
+              <a:rPr lang="pt-BR" dirty="0" smtClean="0"/>
+              <a:t>&gt;.\</a:t>
             </a:r>
             <a:r>
               <a:rPr lang="pt-BR" b="1" i="1" dirty="0" smtClean="0"/>
-              <a:t>sdkmanager --</a:t>
+              <a:t>sdkmanager </a:t>
+            </a:r>
+            <a:r>
+              <a:rPr lang="pt-BR" b="1" i="1" dirty="0" smtClean="0"/>
+              <a:t>--</a:t>
             </a:r>
             <a:r>
               <a:rPr lang="pt-BR" b="1" i="1" dirty="0" err="1" smtClean="0"/>
@@ -4414,7 +4430,11 @@
             </a:r>
             <a:r>
               <a:rPr lang="pt-BR" b="1" i="1" dirty="0" smtClean="0"/>
-              <a:t> “nome-do-pacote”</a:t>
+              <a:t> </a:t>
+            </a:r>
+            <a:r>
+              <a:rPr lang="pt-BR" b="1" i="1" dirty="0" smtClean="0"/>
+              <a:t>“nome-do-pacote”</a:t>
             </a:r>
           </a:p>
           <a:p>
@@ -4426,11 +4446,19 @@
           <a:p>
             <a:r>
               <a:rPr lang="pt-BR" dirty="0"/>
-              <a:t>C:\android-sdk\tools\bin&gt;</a:t>
+              <a:t>C:\android-sdk\tools\bin</a:t>
+            </a:r>
+            <a:r>
+              <a:rPr lang="pt-BR" dirty="0" smtClean="0"/>
+              <a:t>&gt;.\</a:t>
+            </a:r>
+            <a:r>
+              <a:rPr lang="pt-BR" b="1" i="1" dirty="0" smtClean="0"/>
+              <a:t>sdkmanager </a:t>
             </a:r>
             <a:r>
               <a:rPr lang="pt-BR" b="1" i="1" dirty="0"/>
-              <a:t>sdkmanager “</a:t>
+              <a:t>“</a:t>
             </a:r>
             <a:r>
               <a:rPr lang="pt-BR" b="1" i="1" dirty="0" smtClean="0"/>
@@ -4567,10 +4595,14 @@
             </a:r>
             <a:r>
               <a:rPr lang="pt-BR" dirty="0"/>
-              <a:t>:\android-sdk\tools\bin&gt;</a:t>
-            </a:r>
-            <a:r>
-              <a:rPr lang="pt-BR" b="1" i="1" dirty="0"/>
+              <a:t>:\android-sdk\tools\bin</a:t>
+            </a:r>
+            <a:r>
+              <a:rPr lang="pt-BR" dirty="0" smtClean="0"/>
+              <a:t>&gt;.\</a:t>
+            </a:r>
+            <a:r>
+              <a:rPr lang="pt-BR" b="1" i="1" dirty="0" smtClean="0"/>
               <a:t>sdkmanager </a:t>
             </a:r>
             <a:r>
@@ -4875,10 +4907,14 @@
           <a:p>
             <a:r>
               <a:rPr lang="pt-BR" dirty="0"/>
-              <a:t>C:\android-sdk\tools\bin&gt;</a:t>
-            </a:r>
-            <a:r>
-              <a:rPr lang="pt-BR" b="1" i="1" dirty="0"/>
+              <a:t>C:\android-sdk\tools\bin</a:t>
+            </a:r>
+            <a:r>
+              <a:rPr lang="pt-BR" dirty="0" smtClean="0"/>
+              <a:t>&gt;.\</a:t>
+            </a:r>
+            <a:r>
+              <a:rPr lang="pt-BR" b="1" i="1" dirty="0" smtClean="0"/>
               <a:t>avdmanager </a:t>
             </a:r>
             <a:r>
@@ -5444,10 +5480,14 @@
             </a:r>
             <a:r>
               <a:rPr lang="pt-BR" dirty="0"/>
-              <a:t>:\android-sdk\tools\bin&gt;</a:t>
-            </a:r>
-            <a:r>
-              <a:rPr lang="pt-BR" b="1" i="1" dirty="0"/>
+              <a:t>:\android-sdk\tools\bin</a:t>
+            </a:r>
+            <a:r>
+              <a:rPr lang="pt-BR" dirty="0" smtClean="0"/>
+              <a:t>&gt;.\</a:t>
+            </a:r>
+            <a:r>
+              <a:rPr lang="pt-BR" b="1" i="1" dirty="0" smtClean="0"/>
               <a:t>avdmanager </a:t>
             </a:r>
             <a:r>
@@ -5820,11 +5860,19 @@
             </a:r>
             <a:r>
               <a:rPr lang="pt-BR" dirty="0" smtClean="0"/>
-              <a:t>android-sdk\emulator&gt;</a:t>
+              <a:t>android-sdk\emulator</a:t>
+            </a:r>
+            <a:r>
+              <a:rPr lang="pt-BR" dirty="0" smtClean="0"/>
+              <a:t>&gt;.\</a:t>
             </a:r>
             <a:r>
               <a:rPr lang="pt-BR" b="1" i="1" dirty="0" smtClean="0"/>
-              <a:t>emulator -</a:t>
+              <a:t>emulator </a:t>
+            </a:r>
+            <a:r>
+              <a:rPr lang="pt-BR" b="1" i="1" dirty="0" smtClean="0"/>
+              <a:t>-</a:t>
             </a:r>
             <a:r>
               <a:rPr lang="pt-BR" b="1" i="1" dirty="0" err="1" smtClean="0"/>
@@ -6827,11 +6875,19 @@
           <a:p>
             <a:r>
               <a:rPr lang="pt-BR" dirty="0"/>
-              <a:t>C:\android-sdk\emulator&gt;</a:t>
+              <a:t>C:\android-sdk\emulator</a:t>
+            </a:r>
+            <a:r>
+              <a:rPr lang="pt-BR" dirty="0" smtClean="0"/>
+              <a:t>&gt;.\</a:t>
+            </a:r>
+            <a:r>
+              <a:rPr lang="pt-BR" b="1" i="1" dirty="0" smtClean="0"/>
+              <a:t>emulator </a:t>
             </a:r>
             <a:r>
               <a:rPr lang="pt-BR" b="1" i="1" dirty="0"/>
-              <a:t>emulator -</a:t>
+              <a:t>-</a:t>
             </a:r>
             <a:r>
               <a:rPr lang="pt-BR" b="1" i="1" dirty="0" err="1"/>
@@ -8340,16 +8396,11 @@
               <a:rPr lang="en-US" dirty="0" smtClean="0"/>
               <a:t>; e</a:t>
             </a:r>
-            <a:endParaRPr lang="en-US" dirty="0" smtClean="0"/>
           </a:p>
           <a:p>
             <a:r>
               <a:rPr lang="en-US" b="1" i="1" dirty="0" smtClean="0"/>
-              <a:t>Product </a:t>
-            </a:r>
-            <a:r>
-              <a:rPr lang="en-US" b="1" i="1" dirty="0" smtClean="0"/>
-              <a:t>Name</a:t>
+              <a:t>Product Name</a:t>
             </a:r>
             <a:r>
               <a:rPr lang="en-US" dirty="0"/>
@@ -8578,16 +8629,11 @@
               <a:rPr lang="en-US" dirty="0" smtClean="0"/>
               <a:t>:</a:t>
             </a:r>
-            <a:endParaRPr lang="en-US" dirty="0" smtClean="0"/>
           </a:p>
           <a:p>
             <a:r>
               <a:rPr lang="en-US" b="1" i="1" dirty="0" smtClean="0"/>
-              <a:t>Package </a:t>
-            </a:r>
-            <a:r>
-              <a:rPr lang="en-US" b="1" i="1" dirty="0" smtClean="0"/>
-              <a:t>Name</a:t>
+              <a:t>Package Name</a:t>
             </a:r>
             <a:r>
               <a:rPr lang="en-US" dirty="0" smtClean="0"/>
@@ -8615,11 +8661,7 @@
             </a:r>
             <a:r>
               <a:rPr lang="en-US" dirty="0" smtClean="0"/>
-              <a:t>)</a:t>
-            </a:r>
-            <a:r>
-              <a:rPr lang="en-US" dirty="0" smtClean="0"/>
-              <a:t>; e</a:t>
+              <a:t>); e</a:t>
             </a:r>
           </a:p>
           <a:p>
@@ -8647,7 +8689,6 @@
               <a:rPr lang="en-US" dirty="0" smtClean="0"/>
               <a:t> x86).</a:t>
             </a:r>
-            <a:endParaRPr lang="en-US" dirty="0" smtClean="0"/>
           </a:p>
         </p:txBody>
       </p:sp>
@@ -8869,7 +8910,6 @@
               <a:rPr lang="en-US" dirty="0"/>
               <a:t>.</a:t>
             </a:r>
-            <a:endParaRPr lang="en-US" dirty="0"/>
           </a:p>
         </p:txBody>
       </p:sp>
@@ -8929,7 +8969,6 @@
               <a:rPr lang="pt-BR" sz="5400" dirty="0"/>
               <a:t>Instalar e executar o jogo no emulador</a:t>
             </a:r>
-            <a:endParaRPr lang="pt-BR" sz="5400" dirty="0"/>
           </a:p>
         </p:txBody>
       </p:sp>

</xml_diff>